<commit_message>
Deployed b283852 with MkDocs version: 1.0.4
</commit_message>
<xml_diff>
--- a/diagrams.pptx
+++ b/diagrams.pptx
@@ -276,7 +276,7 @@
               <a:pPr>
                 <a:defRPr/>
               </a:pPr>
-              <a:t>8/22/19</a:t>
+              <a:t>8/23/19</a:t>
             </a:fld>
             <a:endParaRPr lang="en-US" dirty="0"/>
           </a:p>
@@ -8989,7 +8989,7 @@
             <a:effectLst/>
             <a:extLst>
               <a:ext uri="{C572A759-6A51-4108-AA02-DFA0A04FC94B}">
-                <ma14:wrappingTextBoxFlag xmlns:ma14="http://schemas.microsoft.com/office/mac/drawingml/2011/main" xmlns="" val="1"/>
+                <ma14:wrappingTextBoxFlag xmlns="" xmlns:ma14="http://schemas.microsoft.com/office/mac/drawingml/2011/main" val="1"/>
               </a:ext>
             </a:extLst>
           </p:spPr>
@@ -11119,7 +11119,7 @@
             <a:effectLst/>
             <a:extLst>
               <a:ext uri="{C572A759-6A51-4108-AA02-DFA0A04FC94B}">
-                <ma14:wrappingTextBoxFlag xmlns:ma14="http://schemas.microsoft.com/office/mac/drawingml/2011/main" xmlns="" val="1"/>
+                <ma14:wrappingTextBoxFlag xmlns="" xmlns:ma14="http://schemas.microsoft.com/office/mac/drawingml/2011/main" val="1"/>
               </a:ext>
             </a:extLst>
           </p:spPr>
@@ -12764,6 +12764,87 @@
       </p:grpSpPr>
       <p:sp>
         <p:nvSpPr>
+          <p:cNvPr id="55" name="Rounded Rectangle 54">
+            <a:extLst>
+              <a:ext uri="{FF2B5EF4-FFF2-40B4-BE49-F238E27FC236}">
+                <a16:creationId xmlns:a16="http://schemas.microsoft.com/office/drawing/2014/main" id="{BCDB838F-03AA-0041-B23E-D4E797C3F296}"/>
+              </a:ext>
+            </a:extLst>
+          </p:cNvPr>
+          <p:cNvSpPr/>
+          <p:nvPr/>
+        </p:nvSpPr>
+        <p:spPr>
+          <a:xfrm>
+            <a:off x="6631706" y="1596898"/>
+            <a:ext cx="2478145" cy="2045537"/>
+          </a:xfrm>
+          <a:prstGeom prst="roundRect">
+            <a:avLst>
+              <a:gd name="adj" fmla="val 3460"/>
+            </a:avLst>
+          </a:prstGeom>
+          <a:ln>
+            <a:noFill/>
+          </a:ln>
+        </p:spPr>
+        <p:style>
+          <a:lnRef idx="2">
+            <a:schemeClr val="accent1">
+              <a:shade val="50000"/>
+            </a:schemeClr>
+          </a:lnRef>
+          <a:fillRef idx="1">
+            <a:schemeClr val="accent1"/>
+          </a:fillRef>
+          <a:effectRef idx="0">
+            <a:schemeClr val="accent1"/>
+          </a:effectRef>
+          <a:fontRef idx="minor">
+            <a:schemeClr val="lt1"/>
+          </a:fontRef>
+        </p:style>
+        <p:txBody>
+          <a:bodyPr rtlCol="0" anchor="ctr"/>
+          <a:lstStyle/>
+          <a:p>
+            <a:pPr algn="ctr"/>
+            <a:endParaRPr lang="en-US"/>
+          </a:p>
+        </p:txBody>
+      </p:sp>
+      <p:pic>
+        <p:nvPicPr>
+          <p:cNvPr id="57" name="Picture 56">
+            <a:extLst>
+              <a:ext uri="{FF2B5EF4-FFF2-40B4-BE49-F238E27FC236}">
+                <a16:creationId xmlns:a16="http://schemas.microsoft.com/office/drawing/2014/main" id="{8E1A8EFC-A075-DB4B-B16F-8A2770920E88}"/>
+              </a:ext>
+            </a:extLst>
+          </p:cNvPr>
+          <p:cNvPicPr>
+            <a:picLocks noChangeAspect="1"/>
+          </p:cNvPicPr>
+          <p:nvPr/>
+        </p:nvPicPr>
+        <p:blipFill>
+          <a:blip r:embed="rId3"/>
+          <a:stretch>
+            <a:fillRect/>
+          </a:stretch>
+        </p:blipFill>
+        <p:spPr>
+          <a:xfrm>
+            <a:off x="7779916" y="2940407"/>
+            <a:ext cx="1302236" cy="544571"/>
+          </a:xfrm>
+          <a:prstGeom prst="rect">
+            <a:avLst/>
+          </a:prstGeom>
+        </p:spPr>
+      </p:pic>
+      <p:sp>
+        <p:nvSpPr>
           <p:cNvPr id="40" name="Rounded Rectangle 39">
             <a:extLst>
               <a:ext uri="{FF2B5EF4-FFF2-40B4-BE49-F238E27FC236}">
@@ -13602,12 +13683,12 @@
           <p:nvPr/>
         </p:nvPicPr>
         <p:blipFill>
-          <a:blip r:embed="rId3">
+          <a:blip r:embed="rId4">
             <a:biLevel thresh="75000"/>
             <a:extLst>
               <a:ext uri="{BEBA8EAE-BF5A-486C-A8C5-ECC9F3942E4B}">
                 <a14:imgProps xmlns:a14="http://schemas.microsoft.com/office/drawing/2010/main">
-                  <a14:imgLayer r:embed="rId4">
+                  <a14:imgLayer r:embed="rId5">
                     <a14:imgEffect>
                       <a14:artisticPhotocopy/>
                     </a14:imgEffect>
@@ -14506,7 +14587,7 @@
           <p:nvPr/>
         </p:nvPicPr>
         <p:blipFill>
-          <a:blip r:embed="rId5">
+          <a:blip r:embed="rId6">
             <a:extLst>
               <a:ext uri="{28A0092B-C50C-407E-A947-70E740481C1C}">
                 <a14:useLocalDpi xmlns:a14="http://schemas.microsoft.com/office/drawing/2010/main" val="0"/>
@@ -14566,7 +14647,7 @@
           <p:nvPr/>
         </p:nvPicPr>
         <p:blipFill>
-          <a:blip r:embed="rId6"/>
+          <a:blip r:embed="rId7"/>
           <a:stretch>
             <a:fillRect/>
           </a:stretch>
@@ -14596,7 +14677,7 @@
           <p:nvPr/>
         </p:nvPicPr>
         <p:blipFill>
-          <a:blip r:embed="rId7">
+          <a:blip r:embed="rId8">
             <a:extLst>
               <a:ext uri="{28A0092B-C50C-407E-A947-70E740481C1C}">
                 <a14:useLocalDpi xmlns:a14="http://schemas.microsoft.com/office/drawing/2010/main" val="0"/>
@@ -14746,7 +14827,7 @@
           <p:nvPr/>
         </p:nvPicPr>
         <p:blipFill>
-          <a:blip r:embed="rId8"/>
+          <a:blip r:embed="rId3"/>
           <a:stretch>
             <a:fillRect/>
           </a:stretch>
@@ -15756,6 +15837,66 @@
           </a:fontRef>
         </p:style>
       </p:cxnSp>
+      <p:pic>
+        <p:nvPicPr>
+          <p:cNvPr id="56" name="Picture 40">
+            <a:extLst>
+              <a:ext uri="{FF2B5EF4-FFF2-40B4-BE49-F238E27FC236}">
+                <a16:creationId xmlns:a16="http://schemas.microsoft.com/office/drawing/2014/main" id="{1A1BFCF5-E8F6-6A42-B2B8-BFD66819149B}"/>
+              </a:ext>
+            </a:extLst>
+          </p:cNvPr>
+          <p:cNvPicPr>
+            <a:picLocks noChangeAspect="1"/>
+          </p:cNvPicPr>
+          <p:nvPr/>
+        </p:nvPicPr>
+        <p:blipFill>
+          <a:blip r:embed="rId6">
+            <a:extLst>
+              <a:ext uri="{28A0092B-C50C-407E-A947-70E740481C1C}">
+                <a14:useLocalDpi xmlns:a14="http://schemas.microsoft.com/office/drawing/2010/main" val="0"/>
+              </a:ext>
+            </a:extLst>
+          </a:blip>
+          <a:srcRect/>
+          <a:stretch>
+            <a:fillRect/>
+          </a:stretch>
+        </p:blipFill>
+        <p:spPr bwMode="auto">
+          <a:xfrm>
+            <a:off x="6185507" y="2436123"/>
+            <a:ext cx="1414200" cy="524101"/>
+          </a:xfrm>
+          <a:prstGeom prst="rect">
+            <a:avLst/>
+          </a:prstGeom>
+          <a:noFill/>
+          <a:ln>
+            <a:noFill/>
+          </a:ln>
+          <a:extLst>
+            <a:ext uri="{909E8E84-426E-40DD-AFC4-6F175D3DCCD1}">
+              <a14:hiddenFill xmlns:a14="http://schemas.microsoft.com/office/drawing/2010/main">
+                <a:solidFill>
+                  <a:srgbClr val="FFFFFF"/>
+                </a:solidFill>
+              </a14:hiddenFill>
+            </a:ext>
+            <a:ext uri="{91240B29-F687-4F45-9708-019B960494DF}">
+              <a14:hiddenLine xmlns:a14="http://schemas.microsoft.com/office/drawing/2010/main" w="9525">
+                <a:solidFill>
+                  <a:srgbClr val="000000"/>
+                </a:solidFill>
+                <a:miter lim="800000"/>
+                <a:headEnd/>
+                <a:tailEnd/>
+              </a14:hiddenLine>
+            </a:ext>
+          </a:extLst>
+        </p:spPr>
+      </p:pic>
     </p:spTree>
     <p:extLst>
       <p:ext uri="{BB962C8B-B14F-4D97-AF65-F5344CB8AC3E}">

</xml_diff>

<commit_message>
Deployed c360f72 with MkDocs version: 1.0.4
</commit_message>
<xml_diff>
--- a/diagrams.pptx
+++ b/diagrams.pptx
@@ -276,7 +276,7 @@
               <a:pPr>
                 <a:defRPr/>
               </a:pPr>
-              <a:t>8/23/19</a:t>
+              <a:t>8/26/19</a:t>
             </a:fld>
             <a:endParaRPr lang="en-US" dirty="0"/>
           </a:p>
@@ -8989,7 +8989,7 @@
             <a:effectLst/>
             <a:extLst>
               <a:ext uri="{C572A759-6A51-4108-AA02-DFA0A04FC94B}">
-                <ma14:wrappingTextBoxFlag xmlns="" xmlns:ma14="http://schemas.microsoft.com/office/mac/drawingml/2011/main" val="1"/>
+                <ma14:wrappingTextBoxFlag xmlns:ma14="http://schemas.microsoft.com/office/mac/drawingml/2011/main" xmlns="" val="1"/>
               </a:ext>
             </a:extLst>
           </p:spPr>
@@ -11119,7 +11119,7 @@
             <a:effectLst/>
             <a:extLst>
               <a:ext uri="{C572A759-6A51-4108-AA02-DFA0A04FC94B}">
-                <ma14:wrappingTextBoxFlag xmlns="" xmlns:ma14="http://schemas.microsoft.com/office/mac/drawingml/2011/main" val="1"/>
+                <ma14:wrappingTextBoxFlag xmlns:ma14="http://schemas.microsoft.com/office/mac/drawingml/2011/main" xmlns="" val="1"/>
               </a:ext>
             </a:extLst>
           </p:spPr>
@@ -16443,6 +16443,36 @@
           </a:p>
         </p:txBody>
       </p:sp>
+      <p:pic>
+        <p:nvPicPr>
+          <p:cNvPr id="12" name="Picture 11">
+            <a:extLst>
+              <a:ext uri="{FF2B5EF4-FFF2-40B4-BE49-F238E27FC236}">
+                <a16:creationId xmlns:a16="http://schemas.microsoft.com/office/drawing/2014/main" id="{78143322-85CF-C948-BB84-C013BE625A7D}"/>
+              </a:ext>
+            </a:extLst>
+          </p:cNvPr>
+          <p:cNvPicPr>
+            <a:picLocks noChangeAspect="1"/>
+          </p:cNvPicPr>
+          <p:nvPr/>
+        </p:nvPicPr>
+        <p:blipFill>
+          <a:blip r:embed="rId3"/>
+          <a:stretch>
+            <a:fillRect/>
+          </a:stretch>
+        </p:blipFill>
+        <p:spPr>
+          <a:xfrm>
+            <a:off x="2304341" y="4137249"/>
+            <a:ext cx="1010735" cy="680699"/>
+          </a:xfrm>
+          <a:prstGeom prst="rect">
+            <a:avLst/>
+          </a:prstGeom>
+        </p:spPr>
+      </p:pic>
     </p:spTree>
     <p:extLst>
       <p:ext uri="{BB962C8B-B14F-4D97-AF65-F5344CB8AC3E}">

</xml_diff>

<commit_message>
Deployed fc50f93 with MkDocs version: 1.0.4
</commit_message>
<xml_diff>
--- a/diagrams.pptx
+++ b/diagrams.pptx
@@ -6923,8 +6923,8 @@
         </p:nvSpPr>
         <p:spPr>
           <a:xfrm>
-            <a:off x="930245" y="2834579"/>
-            <a:ext cx="630301" cy="912814"/>
+            <a:off x="920954" y="2929836"/>
+            <a:ext cx="668773" cy="707694"/>
           </a:xfrm>
           <a:prstGeom prst="rect">
             <a:avLst/>
@@ -6938,13 +6938,9 @@
           <a:lstStyle/>
           <a:p>
             <a:r>
-              <a:rPr lang="en-US" sz="1333" dirty="0" err="1"/>
-              <a:t>mqtt</a:t>
-            </a:r>
-            <a:endParaRPr lang="en-US" sz="1333" dirty="0"/>
-          </a:p>
-          <a:p>
-            <a:endParaRPr lang="en-US" sz="1333" dirty="0"/>
+              <a:rPr lang="en-US" sz="1333" dirty="0"/>
+              <a:t>MQTT</a:t>
+            </a:r>
           </a:p>
           <a:p>
             <a:endParaRPr lang="en-US" sz="1333" dirty="0"/>
@@ -8471,45 +8467,7 @@
                 <a:ea typeface="+mn-ea"/>
                 <a:cs typeface="+mn-cs"/>
               </a:rPr>
-              <a:t>Order </a:t>
-            </a:r>
-            <a:r>
-              <a:rPr kumimoji="0" lang="en-US" sz="1200" b="0" i="0" u="none" strike="noStrike" kern="1200" cap="none" spc="0" normalizeH="0" baseline="0" noProof="0" dirty="0" err="1">
-                <a:ln>
-                  <a:noFill/>
-                </a:ln>
-                <a:solidFill>
-                  <a:srgbClr val="5596E6">
-                    <a:lumMod val="50000"/>
-                  </a:srgbClr>
-                </a:solidFill>
-                <a:effectLst/>
-                <a:uLnTx/>
-                <a:uFillTx/>
-                <a:latin typeface="Arial"/>
-                <a:ea typeface="+mn-ea"/>
-                <a:cs typeface="+mn-cs"/>
-              </a:rPr>
-              <a:t>Mgt</a:t>
-            </a:r>
-            <a:r>
-              <a:rPr kumimoji="0" lang="en-US" sz="1200" b="0" i="0" u="none" strike="noStrike" kern="1200" cap="none" spc="0" normalizeH="0" baseline="0" noProof="0" dirty="0">
-                <a:ln>
-                  <a:noFill/>
-                </a:ln>
-                <a:solidFill>
-                  <a:srgbClr val="5596E6">
-                    <a:lumMod val="50000"/>
-                  </a:srgbClr>
-                </a:solidFill>
-                <a:effectLst/>
-                <a:uLnTx/>
-                <a:uFillTx/>
-                <a:latin typeface="Arial"/>
-                <a:ea typeface="+mn-ea"/>
-                <a:cs typeface="+mn-cs"/>
-              </a:rPr>
-              <a:t> MS</a:t>
+              <a:t>Order Mgt MS</a:t>
             </a:r>
           </a:p>
         </p:txBody>
@@ -8641,45 +8599,7 @@
                 <a:ea typeface="+mn-ea"/>
                 <a:cs typeface="+mn-cs"/>
               </a:rPr>
-              <a:t> </a:t>
-            </a:r>
-            <a:r>
-              <a:rPr kumimoji="0" lang="en-US" sz="1200" b="0" i="0" u="none" strike="noStrike" kern="1200" cap="none" spc="0" normalizeH="0" baseline="0" noProof="0" dirty="0" err="1">
-                <a:ln>
-                  <a:noFill/>
-                </a:ln>
-                <a:solidFill>
-                  <a:srgbClr val="5596E6">
-                    <a:lumMod val="50000"/>
-                  </a:srgbClr>
-                </a:solidFill>
-                <a:effectLst/>
-                <a:uLnTx/>
-                <a:uFillTx/>
-                <a:latin typeface="Arial"/>
-                <a:ea typeface="+mn-ea"/>
-                <a:cs typeface="+mn-cs"/>
-              </a:rPr>
-              <a:t>Mgt</a:t>
-            </a:r>
-            <a:r>
-              <a:rPr kumimoji="0" lang="en-US" sz="1200" b="0" i="0" u="none" strike="noStrike" kern="1200" cap="none" spc="0" normalizeH="0" baseline="0" noProof="0" dirty="0">
-                <a:ln>
-                  <a:noFill/>
-                </a:ln>
-                <a:solidFill>
-                  <a:srgbClr val="5596E6">
-                    <a:lumMod val="50000"/>
-                  </a:srgbClr>
-                </a:solidFill>
-                <a:effectLst/>
-                <a:uLnTx/>
-                <a:uFillTx/>
-                <a:latin typeface="Arial"/>
-                <a:ea typeface="+mn-ea"/>
-                <a:cs typeface="+mn-cs"/>
-              </a:rPr>
-              <a:t> MS</a:t>
+              <a:t> Mgt MS</a:t>
             </a:r>
           </a:p>
         </p:txBody>
@@ -11638,7 +11558,7 @@
           <a:lstStyle/>
           <a:p>
             <a:r>
-              <a:rPr lang="en-US" sz="1050" dirty="0" err="1">
+              <a:rPr lang="en-US" sz="1050" dirty="0">
                 <a:solidFill>
                   <a:schemeClr val="tx1">
                     <a:lumMod val="50000"/>
@@ -11647,13 +11567,6 @@
               </a:rPr>
               <a:t>voyageEvt</a:t>
             </a:r>
-            <a:endParaRPr lang="en-US" sz="1050" dirty="0">
-              <a:solidFill>
-                <a:schemeClr val="tx1">
-                  <a:lumMod val="50000"/>
-                </a:schemeClr>
-              </a:solidFill>
-            </a:endParaRPr>
           </a:p>
         </p:txBody>
       </p:sp>
@@ -13752,7 +13665,7 @@
               <a:defRPr/>
             </a:pPr>
             <a:r>
-              <a:rPr lang="en-US" sz="1351" kern="0" dirty="0" err="1">
+              <a:rPr lang="en-US" sz="1351" kern="0" dirty="0">
                 <a:solidFill>
                   <a:srgbClr val="C8D2D2">
                     <a:lumMod val="25000"/>
@@ -13761,13 +13674,6 @@
               </a:rPr>
               <a:t>containerMetrics</a:t>
             </a:r>
-            <a:endParaRPr lang="en-US" sz="1351" kern="0" dirty="0">
-              <a:solidFill>
-                <a:srgbClr val="C8D2D2">
-                  <a:lumMod val="25000"/>
-                </a:srgbClr>
-              </a:solidFill>
-            </a:endParaRPr>
           </a:p>
         </p:txBody>
       </p:sp>
@@ -14261,22 +14167,13 @@
               </a:spcAft>
             </a:pPr>
             <a:r>
-              <a:rPr lang="en-US" sz="1333" dirty="0" err="1">
-                <a:solidFill>
-                  <a:prstClr val="white"/>
-                </a:solidFill>
-                <a:latin typeface="Arial"/>
-              </a:rPr>
-              <a:t>Reefeer</a:t>
-            </a:r>
-            <a:r>
               <a:rPr lang="en-US" sz="1333" dirty="0">
                 <a:solidFill>
                   <a:prstClr val="white"/>
                 </a:solidFill>
                 <a:latin typeface="Arial"/>
               </a:rPr>
-              <a:t> Simulator</a:t>
+              <a:t>Reefer Simulator</a:t>
             </a:r>
           </a:p>
         </p:txBody>
@@ -17309,7 +17206,7 @@
           <a:lstStyle/>
           <a:p>
             <a:r>
-              <a:rPr lang="en-US" dirty="0" err="1">
+              <a:rPr lang="en-US" dirty="0">
                 <a:solidFill>
                   <a:schemeClr val="accent1">
                     <a:lumMod val="25000"/>
@@ -17318,13 +17215,6 @@
               </a:rPr>
               <a:t>containerMetrics</a:t>
             </a:r>
-            <a:endParaRPr lang="en-US" dirty="0">
-              <a:solidFill>
-                <a:schemeClr val="accent1">
-                  <a:lumMod val="25000"/>
-                </a:schemeClr>
-              </a:solidFill>
-            </a:endParaRPr>
           </a:p>
         </p:txBody>
       </p:sp>

</xml_diff>

<commit_message>
Deployed dd9fcef with MkDocs version: 1.0.4
</commit_message>
<xml_diff>
--- a/diagrams.pptx
+++ b/diagrams.pptx
@@ -9,7 +9,7 @@
     <p:notesMasterId r:id="rId8"/>
   </p:notesMasterIdLst>
   <p:sldIdLst>
-    <p:sldId id="141168469" r:id="rId3"/>
+    <p:sldId id="141168470" r:id="rId3"/>
     <p:sldId id="2783" r:id="rId4"/>
     <p:sldId id="2801" r:id="rId5"/>
     <p:sldId id="2799" r:id="rId6"/>
@@ -276,7 +276,7 @@
               <a:pPr>
                 <a:defRPr/>
               </a:pPr>
-              <a:t>8/26/19</a:t>
+              <a:t>9/25/19</a:t>
             </a:fld>
             <a:endParaRPr lang="en-US" dirty="0"/>
           </a:p>
@@ -6464,8 +6464,8 @@
         </p:nvSpPr>
         <p:spPr bwMode="auto">
           <a:xfrm>
-            <a:off x="1970534" y="2200620"/>
-            <a:ext cx="1802485" cy="1528080"/>
+            <a:off x="1970534" y="1339793"/>
+            <a:ext cx="1802485" cy="2388908"/>
           </a:xfrm>
           <a:prstGeom prst="roundRect">
             <a:avLst>
@@ -6531,7 +6531,7 @@
         </p:blipFill>
         <p:spPr>
           <a:xfrm>
-            <a:off x="2199177" y="2294358"/>
+            <a:off x="2110019" y="1516994"/>
             <a:ext cx="972008" cy="414951"/>
           </a:xfrm>
           <a:prstGeom prst="rect">
@@ -6622,7 +6622,7 @@
         </p:blipFill>
         <p:spPr>
           <a:xfrm>
-            <a:off x="2905058" y="4525789"/>
+            <a:off x="2722139" y="4525789"/>
             <a:ext cx="1010735" cy="680699"/>
           </a:xfrm>
           <a:prstGeom prst="rect">
@@ -6713,7 +6713,7 @@
         </p:blipFill>
         <p:spPr>
           <a:xfrm>
-            <a:off x="4270529" y="4525789"/>
+            <a:off x="3781001" y="4525789"/>
             <a:ext cx="638156" cy="680700"/>
           </a:xfrm>
           <a:prstGeom prst="rect">
@@ -6923,8 +6923,8 @@
         </p:nvSpPr>
         <p:spPr>
           <a:xfrm>
-            <a:off x="920954" y="2929836"/>
-            <a:ext cx="668773" cy="707694"/>
+            <a:off x="930245" y="2834579"/>
+            <a:ext cx="630301" cy="912814"/>
           </a:xfrm>
           <a:prstGeom prst="rect">
             <a:avLst/>
@@ -6938,9 +6938,13 @@
           <a:lstStyle/>
           <a:p>
             <a:r>
-              <a:rPr lang="en-US" sz="1333" dirty="0"/>
-              <a:t>MQTT</a:t>
-            </a:r>
+              <a:rPr lang="en-US" sz="1333" dirty="0" err="1"/>
+              <a:t>mqtt</a:t>
+            </a:r>
+            <a:endParaRPr lang="en-US" sz="1333" dirty="0"/>
+          </a:p>
+          <a:p>
+            <a:endParaRPr lang="en-US" sz="1333" dirty="0"/>
           </a:p>
           <a:p>
             <a:endParaRPr lang="en-US" sz="1333" dirty="0"/>
@@ -7463,12 +7467,15 @@
           <p:nvPr/>
         </p:nvCxnSpPr>
         <p:spPr>
-          <a:xfrm rot="16200000" flipH="1">
-            <a:off x="1330181" y="2324305"/>
-            <a:ext cx="130081" cy="1150627"/>
-          </a:xfrm>
-          <a:prstGeom prst="bentConnector2">
-            <a:avLst/>
+          <a:xfrm rot="5400000" flipH="1" flipV="1">
+            <a:off x="1245054" y="2109100"/>
+            <a:ext cx="300332" cy="1150627"/>
+          </a:xfrm>
+          <a:prstGeom prst="bentConnector4">
+            <a:avLst>
+              <a:gd name="adj1" fmla="val -101488"/>
+              <a:gd name="adj2" fmla="val 79216"/>
+            </a:avLst>
           </a:prstGeom>
           <a:ln>
             <a:solidFill>
@@ -7510,9 +7517,9 @@
           <p:nvPr/>
         </p:nvCxnSpPr>
         <p:spPr>
-          <a:xfrm flipV="1">
-            <a:off x="3773019" y="2852153"/>
-            <a:ext cx="837687" cy="112507"/>
+          <a:xfrm>
+            <a:off x="3773019" y="2534247"/>
+            <a:ext cx="837687" cy="317907"/>
           </a:xfrm>
           <a:prstGeom prst="bentConnector3">
             <a:avLst>
@@ -7719,10 +7726,162 @@
           </a:prstGeom>
         </p:spPr>
       </p:pic>
+      <p:grpSp>
+        <p:nvGrpSpPr>
+          <p:cNvPr id="10" name="Group 9">
+            <a:extLst>
+              <a:ext uri="{FF2B5EF4-FFF2-40B4-BE49-F238E27FC236}">
+                <a16:creationId xmlns:a16="http://schemas.microsoft.com/office/drawing/2014/main" id="{3E8790C2-9FA5-C941-8C31-35920D782CC8}"/>
+              </a:ext>
+            </a:extLst>
+          </p:cNvPr>
+          <p:cNvGrpSpPr/>
+          <p:nvPr/>
+        </p:nvGrpSpPr>
+        <p:grpSpPr>
+          <a:xfrm>
+            <a:off x="2012425" y="2046458"/>
+            <a:ext cx="1588959" cy="550604"/>
+            <a:chOff x="1509318" y="2144439"/>
+            <a:chExt cx="1191719" cy="412953"/>
+          </a:xfrm>
+        </p:grpSpPr>
+        <p:pic>
+          <p:nvPicPr>
+            <p:cNvPr id="2" name="Picture 1">
+              <a:extLst>
+                <a:ext uri="{FF2B5EF4-FFF2-40B4-BE49-F238E27FC236}">
+                  <a16:creationId xmlns:a16="http://schemas.microsoft.com/office/drawing/2014/main" id="{D877B827-CA50-6643-A381-C0E8C368D177}"/>
+                </a:ext>
+              </a:extLst>
+            </p:cNvPr>
+            <p:cNvPicPr>
+              <a:picLocks noChangeAspect="1"/>
+            </p:cNvPicPr>
+            <p:nvPr/>
+          </p:nvPicPr>
+          <p:blipFill>
+            <a:blip r:embed="rId14"/>
+            <a:stretch>
+              <a:fillRect/>
+            </a:stretch>
+          </p:blipFill>
+          <p:spPr>
+            <a:xfrm>
+              <a:off x="1509318" y="2144439"/>
+              <a:ext cx="412953" cy="412953"/>
+            </a:xfrm>
+            <a:prstGeom prst="rect">
+              <a:avLst/>
+            </a:prstGeom>
+          </p:spPr>
+        </p:pic>
+        <p:sp>
+          <p:nvSpPr>
+            <p:cNvPr id="6" name="TextBox 5">
+              <a:extLst>
+                <a:ext uri="{FF2B5EF4-FFF2-40B4-BE49-F238E27FC236}">
+                  <a16:creationId xmlns:a16="http://schemas.microsoft.com/office/drawing/2014/main" id="{ADB6BAC3-C8C7-EB48-9B63-9D364DAE8C34}"/>
+                </a:ext>
+              </a:extLst>
+            </p:cNvPr>
+            <p:cNvSpPr txBox="1"/>
+            <p:nvPr/>
+          </p:nvSpPr>
+          <p:spPr>
+            <a:xfrm>
+              <a:off x="1814810" y="2170487"/>
+              <a:ext cx="886227" cy="346249"/>
+            </a:xfrm>
+            <a:prstGeom prst="rect">
+              <a:avLst/>
+            </a:prstGeom>
+            <a:noFill/>
+          </p:spPr>
+          <p:txBody>
+            <a:bodyPr wrap="square" rtlCol="0">
+              <a:spAutoFit/>
+            </a:bodyPr>
+            <a:lstStyle/>
+            <a:p>
+              <a:r>
+                <a:rPr lang="en-US" sz="1200" b="1" dirty="0">
+                  <a:solidFill>
+                    <a:schemeClr val="bg1">
+                      <a:lumMod val="50000"/>
+                    </a:schemeClr>
+                  </a:solidFill>
+                </a:rPr>
+                <a:t>Change Data Capture</a:t>
+              </a:r>
+            </a:p>
+          </p:txBody>
+        </p:sp>
+      </p:grpSp>
+      <p:pic>
+        <p:nvPicPr>
+          <p:cNvPr id="41" name="Picture 40">
+            <a:extLst>
+              <a:ext uri="{FF2B5EF4-FFF2-40B4-BE49-F238E27FC236}">
+                <a16:creationId xmlns:a16="http://schemas.microsoft.com/office/drawing/2014/main" id="{F2B7912A-BE94-7D4D-9BC3-0D9CBED29976}"/>
+              </a:ext>
+            </a:extLst>
+          </p:cNvPr>
+          <p:cNvPicPr>
+            <a:picLocks noChangeAspect="1"/>
+          </p:cNvPicPr>
+          <p:nvPr/>
+        </p:nvPicPr>
+        <p:blipFill>
+          <a:blip r:embed="rId8"/>
+          <a:stretch>
+            <a:fillRect/>
+          </a:stretch>
+        </p:blipFill>
+        <p:spPr>
+          <a:xfrm>
+            <a:off x="8900391" y="5122552"/>
+            <a:ext cx="400307" cy="365995"/>
+          </a:xfrm>
+          <a:prstGeom prst="rect">
+            <a:avLst/>
+          </a:prstGeom>
+        </p:spPr>
+      </p:pic>
+      <p:pic>
+        <p:nvPicPr>
+          <p:cNvPr id="8" name="Picture 7">
+            <a:extLst>
+              <a:ext uri="{FF2B5EF4-FFF2-40B4-BE49-F238E27FC236}">
+                <a16:creationId xmlns:a16="http://schemas.microsoft.com/office/drawing/2014/main" id="{35BF0026-00B6-DB46-918F-E5AC2DBB4634}"/>
+              </a:ext>
+            </a:extLst>
+          </p:cNvPr>
+          <p:cNvPicPr>
+            <a:picLocks noChangeAspect="1"/>
+          </p:cNvPicPr>
+          <p:nvPr/>
+        </p:nvPicPr>
+        <p:blipFill>
+          <a:blip r:embed="rId15"/>
+          <a:stretch>
+            <a:fillRect/>
+          </a:stretch>
+        </p:blipFill>
+        <p:spPr>
+          <a:xfrm flipH="1">
+            <a:off x="4563035" y="4525788"/>
+            <a:ext cx="781653" cy="639821"/>
+          </a:xfrm>
+          <a:prstGeom prst="rect">
+            <a:avLst/>
+          </a:prstGeom>
+        </p:spPr>
+      </p:pic>
     </p:spTree>
     <p:extLst>
       <p:ext uri="{BB962C8B-B14F-4D97-AF65-F5344CB8AC3E}">
-        <p14:creationId xmlns:p14="http://schemas.microsoft.com/office/powerpoint/2010/main" val="158977373"/>
+        <p14:creationId xmlns:p14="http://schemas.microsoft.com/office/powerpoint/2010/main" val="661409003"/>
       </p:ext>
     </p:extLst>
   </p:cSld>
@@ -8909,7 +9068,7 @@
             <a:effectLst/>
             <a:extLst>
               <a:ext uri="{C572A759-6A51-4108-AA02-DFA0A04FC94B}">
-                <ma14:wrappingTextBoxFlag xmlns:ma14="http://schemas.microsoft.com/office/mac/drawingml/2011/main" xmlns="" val="1"/>
+                <ma14:wrappingTextBoxFlag xmlns="" xmlns:ma14="http://schemas.microsoft.com/office/mac/drawingml/2011/main" val="1"/>
               </a:ext>
             </a:extLst>
           </p:spPr>
@@ -11039,7 +11198,7 @@
             <a:effectLst/>
             <a:extLst>
               <a:ext uri="{C572A759-6A51-4108-AA02-DFA0A04FC94B}">
-                <ma14:wrappingTextBoxFlag xmlns:ma14="http://schemas.microsoft.com/office/mac/drawingml/2011/main" xmlns="" val="1"/>
+                <ma14:wrappingTextBoxFlag xmlns="" xmlns:ma14="http://schemas.microsoft.com/office/mac/drawingml/2011/main" val="1"/>
               </a:ext>
             </a:extLst>
           </p:spPr>
@@ -15902,8 +16061,8 @@
         </p:nvSpPr>
         <p:spPr>
           <a:xfrm>
-            <a:off x="6118016" y="1168380"/>
-            <a:ext cx="3190876" cy="2757182"/>
+            <a:off x="6118016" y="1616526"/>
+            <a:ext cx="3066325" cy="1525409"/>
           </a:xfrm>
           <a:prstGeom prst="rect">
             <a:avLst/>
@@ -16053,7 +16212,7 @@
           <a:p>
             <a:pPr algn="ctr"/>
             <a:r>
-              <a:rPr lang="en-US" dirty="0"/>
+              <a:rPr lang="en-US" sz="1400" dirty="0"/>
               <a:t>Simulator</a:t>
             </a:r>
           </a:p>
@@ -16138,7 +16297,7 @@
         <p:spPr>
           <a:xfrm>
             <a:off x="2465614" y="2073727"/>
-            <a:ext cx="1645256" cy="1983112"/>
+            <a:ext cx="2093194" cy="516747"/>
           </a:xfrm>
           <a:prstGeom prst="bentConnector2">
             <a:avLst/>
@@ -16166,63 +16325,6 @@
           </a:fontRef>
         </p:style>
       </p:cxnSp>
-      <p:sp>
-        <p:nvSpPr>
-          <p:cNvPr id="59" name="Can 58">
-            <a:extLst>
-              <a:ext uri="{FF2B5EF4-FFF2-40B4-BE49-F238E27FC236}">
-                <a16:creationId xmlns:a16="http://schemas.microsoft.com/office/drawing/2014/main" id="{BF8D5F17-7886-6A49-A326-AB3283F367DA}"/>
-              </a:ext>
-            </a:extLst>
-          </p:cNvPr>
-          <p:cNvSpPr/>
-          <p:nvPr/>
-        </p:nvSpPr>
-        <p:spPr>
-          <a:xfrm>
-            <a:off x="3662932" y="4056839"/>
-            <a:ext cx="895875" cy="695584"/>
-          </a:xfrm>
-          <a:prstGeom prst="can">
-            <a:avLst/>
-          </a:prstGeom>
-          <a:solidFill>
-            <a:schemeClr val="accent5">
-              <a:lumMod val="75000"/>
-            </a:schemeClr>
-          </a:solidFill>
-          <a:ln>
-            <a:noFill/>
-          </a:ln>
-        </p:spPr>
-        <p:style>
-          <a:lnRef idx="2">
-            <a:schemeClr val="accent1">
-              <a:shade val="50000"/>
-            </a:schemeClr>
-          </a:lnRef>
-          <a:fillRef idx="1">
-            <a:schemeClr val="accent1"/>
-          </a:fillRef>
-          <a:effectRef idx="0">
-            <a:schemeClr val="accent1"/>
-          </a:effectRef>
-          <a:fontRef idx="minor">
-            <a:schemeClr val="lt1"/>
-          </a:fontRef>
-        </p:style>
-        <p:txBody>
-          <a:bodyPr rtlCol="0" anchor="ctr"/>
-          <a:lstStyle/>
-          <a:p>
-            <a:pPr algn="ctr"/>
-            <a:r>
-              <a:rPr lang="en-US" sz="1000" dirty="0"/>
-              <a:t>Container metrics</a:t>
-            </a:r>
-          </a:p>
-        </p:txBody>
-      </p:sp>
       <p:cxnSp>
         <p:nvCxnSpPr>
           <p:cNvPr id="71" name="Elbow Connector 70">
@@ -16241,8 +16343,8 @@
         </p:nvCxnSpPr>
         <p:spPr>
           <a:xfrm rot="10800000" flipV="1">
-            <a:off x="4558807" y="2100403"/>
-            <a:ext cx="1919392" cy="2304227"/>
+            <a:off x="5157329" y="2100404"/>
+            <a:ext cx="1320870" cy="837862"/>
           </a:xfrm>
           <a:prstGeom prst="bentConnector3">
             <a:avLst>
@@ -16342,10 +16444,10 @@
       </p:sp>
       <p:pic>
         <p:nvPicPr>
-          <p:cNvPr id="12" name="Picture 11">
+          <p:cNvPr id="13" name="Picture 12">
             <a:extLst>
               <a:ext uri="{FF2B5EF4-FFF2-40B4-BE49-F238E27FC236}">
-                <a16:creationId xmlns:a16="http://schemas.microsoft.com/office/drawing/2014/main" id="{78143322-85CF-C948-BB84-C013BE625A7D}"/>
+                <a16:creationId xmlns:a16="http://schemas.microsoft.com/office/drawing/2014/main" id="{B81AAF60-BF23-E149-AC44-3DFB94494F2F}"/>
               </a:ext>
             </a:extLst>
           </p:cNvPr>
@@ -16362,14 +16464,71 @@
         </p:blipFill>
         <p:spPr>
           <a:xfrm>
-            <a:off x="2304341" y="4137249"/>
-            <a:ext cx="1010735" cy="680699"/>
+            <a:off x="3492393" y="3041219"/>
+            <a:ext cx="638156" cy="680700"/>
           </a:xfrm>
           <a:prstGeom prst="rect">
             <a:avLst/>
           </a:prstGeom>
         </p:spPr>
       </p:pic>
+      <p:sp>
+        <p:nvSpPr>
+          <p:cNvPr id="59" name="Can 58">
+            <a:extLst>
+              <a:ext uri="{FF2B5EF4-FFF2-40B4-BE49-F238E27FC236}">
+                <a16:creationId xmlns:a16="http://schemas.microsoft.com/office/drawing/2014/main" id="{BF8D5F17-7886-6A49-A326-AB3283F367DA}"/>
+              </a:ext>
+            </a:extLst>
+          </p:cNvPr>
+          <p:cNvSpPr/>
+          <p:nvPr/>
+        </p:nvSpPr>
+        <p:spPr>
+          <a:xfrm>
+            <a:off x="3960287" y="2590474"/>
+            <a:ext cx="1197042" cy="695584"/>
+          </a:xfrm>
+          <a:prstGeom prst="can">
+            <a:avLst/>
+          </a:prstGeom>
+          <a:solidFill>
+            <a:schemeClr val="accent5">
+              <a:lumMod val="75000"/>
+            </a:schemeClr>
+          </a:solidFill>
+          <a:ln>
+            <a:noFill/>
+          </a:ln>
+        </p:spPr>
+        <p:style>
+          <a:lnRef idx="2">
+            <a:schemeClr val="accent1">
+              <a:shade val="50000"/>
+            </a:schemeClr>
+          </a:lnRef>
+          <a:fillRef idx="1">
+            <a:schemeClr val="accent1"/>
+          </a:fillRef>
+          <a:effectRef idx="0">
+            <a:schemeClr val="accent1"/>
+          </a:effectRef>
+          <a:fontRef idx="minor">
+            <a:schemeClr val="lt1"/>
+          </a:fontRef>
+        </p:style>
+        <p:txBody>
+          <a:bodyPr rtlCol="0" anchor="ctr"/>
+          <a:lstStyle/>
+          <a:p>
+            <a:pPr algn="ctr"/>
+            <a:r>
+              <a:rPr lang="en-US" sz="1000" dirty="0"/>
+              <a:t>Reefer telemetries</a:t>
+            </a:r>
+          </a:p>
+        </p:txBody>
+      </p:sp>
     </p:spTree>
     <p:extLst>
       <p:ext uri="{BB962C8B-B14F-4D97-AF65-F5344CB8AC3E}">
@@ -16479,7 +16638,7 @@
         <p:spPr>
           <a:xfrm>
             <a:off x="6118016" y="1168380"/>
-            <a:ext cx="4172556" cy="2757182"/>
+            <a:ext cx="3362160" cy="1973555"/>
           </a:xfrm>
           <a:prstGeom prst="rect">
             <a:avLst/>
@@ -16629,7 +16788,7 @@
           <a:p>
             <a:pPr algn="ctr"/>
             <a:r>
-              <a:rPr lang="en-US" dirty="0"/>
+              <a:rPr lang="en-US" sz="1400" dirty="0"/>
               <a:t>Simulator</a:t>
             </a:r>
           </a:p>
@@ -17192,7 +17351,7 @@
         <p:spPr>
           <a:xfrm>
             <a:off x="2700397" y="4904710"/>
-            <a:ext cx="1877437" cy="369332"/>
+            <a:ext cx="1967270" cy="369332"/>
           </a:xfrm>
           <a:prstGeom prst="rect">
             <a:avLst/>
@@ -17206,15 +17365,22 @@
           <a:lstStyle/>
           <a:p>
             <a:r>
-              <a:rPr lang="en-US" dirty="0">
+              <a:rPr lang="en-US" dirty="0" err="1">
                 <a:solidFill>
                   <a:schemeClr val="accent1">
                     <a:lumMod val="25000"/>
                   </a:schemeClr>
                 </a:solidFill>
               </a:rPr>
-              <a:t>containerMetrics</a:t>
-            </a:r>
+              <a:t>reeferTelemetries</a:t>
+            </a:r>
+            <a:endParaRPr lang="en-US" dirty="0">
+              <a:solidFill>
+                <a:schemeClr val="accent1">
+                  <a:lumMod val="25000"/>
+                </a:schemeClr>
+              </a:solidFill>
+            </a:endParaRPr>
           </a:p>
         </p:txBody>
       </p:sp>
@@ -17502,7 +17668,7 @@
         </p:nvSpPr>
         <p:spPr>
           <a:xfrm>
-            <a:off x="9228164" y="4329784"/>
+            <a:off x="6215189" y="3898535"/>
             <a:ext cx="895875" cy="695584"/>
           </a:xfrm>
           <a:prstGeom prst="can">
@@ -17540,7 +17706,7 @@
             <a:pPr algn="ctr"/>
             <a:r>
               <a:rPr lang="en-US" sz="1000" dirty="0"/>
-              <a:t>Container Inventory</a:t>
+              <a:t>Reefers Inventory</a:t>
             </a:r>
           </a:p>
         </p:txBody>
@@ -17656,6 +17822,63 @@
                 <a:cs typeface="Arial"/>
               </a:rPr>
               <a:t>Pandas DF</a:t>
+            </a:r>
+          </a:p>
+        </p:txBody>
+      </p:sp>
+      <p:sp>
+        <p:nvSpPr>
+          <p:cNvPr id="23" name="Can 22">
+            <a:extLst>
+              <a:ext uri="{FF2B5EF4-FFF2-40B4-BE49-F238E27FC236}">
+                <a16:creationId xmlns:a16="http://schemas.microsoft.com/office/drawing/2014/main" id="{E1EF536B-5978-0D45-B1D4-059E49B20183}"/>
+              </a:ext>
+            </a:extLst>
+          </p:cNvPr>
+          <p:cNvSpPr/>
+          <p:nvPr/>
+        </p:nvSpPr>
+        <p:spPr>
+          <a:xfrm>
+            <a:off x="7223460" y="3898535"/>
+            <a:ext cx="895875" cy="695584"/>
+          </a:xfrm>
+          <a:prstGeom prst="can">
+            <a:avLst/>
+          </a:prstGeom>
+          <a:solidFill>
+            <a:schemeClr val="accent5">
+              <a:lumMod val="75000"/>
+            </a:schemeClr>
+          </a:solidFill>
+          <a:ln>
+            <a:noFill/>
+          </a:ln>
+        </p:spPr>
+        <p:style>
+          <a:lnRef idx="2">
+            <a:schemeClr val="accent1">
+              <a:shade val="50000"/>
+            </a:schemeClr>
+          </a:lnRef>
+          <a:fillRef idx="1">
+            <a:schemeClr val="accent1"/>
+          </a:fillRef>
+          <a:effectRef idx="0">
+            <a:schemeClr val="accent1"/>
+          </a:effectRef>
+          <a:fontRef idx="minor">
+            <a:schemeClr val="lt1"/>
+          </a:fontRef>
+        </p:style>
+        <p:txBody>
+          <a:bodyPr rtlCol="0" anchor="ctr"/>
+          <a:lstStyle/>
+          <a:p>
+            <a:pPr algn="ctr"/>
+            <a:r>
+              <a:rPr lang="en-US" sz="1000" dirty="0"/>
+              <a:t>Products</a:t>
             </a:r>
           </a:p>
         </p:txBody>

</xml_diff>

<commit_message>
Deployed 0c434b4 with MkDocs version: 1.0.4
</commit_message>
<xml_diff>
--- a/diagrams.pptx
+++ b/diagrams.pptx
@@ -276,7 +276,7 @@
               <a:pPr>
                 <a:defRPr/>
               </a:pPr>
-              <a:t>9/25/19</a:t>
+              <a:t>11/5/19</a:t>
             </a:fld>
             <a:endParaRPr lang="en-US" dirty="0"/>
           </a:p>
@@ -5925,7 +5925,12 @@
             <p:ph type="title"/>
           </p:nvPr>
         </p:nvSpPr>
-        <p:spPr/>
+        <p:spPr>
+          <a:xfrm>
+            <a:off x="390788" y="60120"/>
+            <a:ext cx="10886813" cy="611466"/>
+          </a:xfrm>
+        </p:spPr>
         <p:txBody>
           <a:bodyPr/>
           <a:lstStyle/>
@@ -6410,7 +6415,7 @@
         </p:blipFill>
         <p:spPr>
           <a:xfrm>
-            <a:off x="4272409" y="3217910"/>
+            <a:off x="4365173" y="3217910"/>
             <a:ext cx="959343" cy="504271"/>
           </a:xfrm>
           <a:prstGeom prst="rect">
@@ -6556,7 +6561,7 @@
         <p:spPr bwMode="auto">
           <a:xfrm>
             <a:off x="4293515" y="1002437"/>
-            <a:ext cx="3797333" cy="1029112"/>
+            <a:ext cx="5708237" cy="1029112"/>
           </a:xfrm>
           <a:prstGeom prst="roundRect">
             <a:avLst>
@@ -6743,8 +6748,8 @@
         </p:blipFill>
         <p:spPr>
           <a:xfrm>
-            <a:off x="7707113" y="1718513"/>
-            <a:ext cx="400307" cy="365995"/>
+            <a:off x="9785928" y="1851441"/>
+            <a:ext cx="280628" cy="256574"/>
           </a:xfrm>
           <a:prstGeom prst="rect">
             <a:avLst/>
@@ -6938,10 +6943,9 @@
           <a:lstStyle/>
           <a:p>
             <a:r>
-              <a:rPr lang="en-US" sz="1333" dirty="0" err="1"/>
+              <a:rPr lang="en-US" sz="1333" dirty="0"/>
               <a:t>mqtt</a:t>
             </a:r>
-            <a:endParaRPr lang="en-US" sz="1333" dirty="0"/>
           </a:p>
           <a:p>
             <a:endParaRPr lang="en-US" sz="1333" dirty="0"/>
@@ -6957,53 +6961,6 @@
           </a:p>
         </p:txBody>
       </p:sp>
-      <p:pic>
-        <p:nvPicPr>
-          <p:cNvPr id="114" name="Picture 2" descr="object Object]">
-            <a:extLst>
-              <a:ext uri="{FF2B5EF4-FFF2-40B4-BE49-F238E27FC236}">
-                <a16:creationId xmlns:a16="http://schemas.microsoft.com/office/drawing/2014/main" id="{D854718E-B027-A54C-812F-F6BA85452DFC}"/>
-              </a:ext>
-            </a:extLst>
-          </p:cNvPr>
-          <p:cNvPicPr>
-            <a:picLocks noChangeAspect="1" noChangeArrowheads="1"/>
-          </p:cNvPicPr>
-          <p:nvPr/>
-        </p:nvPicPr>
-        <p:blipFill>
-          <a:blip r:embed="rId9">
-            <a:extLst>
-              <a:ext uri="{28A0092B-C50C-407E-A947-70E740481C1C}">
-                <a14:useLocalDpi xmlns:a14="http://schemas.microsoft.com/office/drawing/2010/main"/>
-              </a:ext>
-            </a:extLst>
-          </a:blip>
-          <a:srcRect/>
-          <a:stretch>
-            <a:fillRect/>
-          </a:stretch>
-        </p:blipFill>
-        <p:spPr bwMode="auto">
-          <a:xfrm>
-            <a:off x="5982702" y="4699961"/>
-            <a:ext cx="400305" cy="426955"/>
-          </a:xfrm>
-          <a:prstGeom prst="rect">
-            <a:avLst/>
-          </a:prstGeom>
-          <a:noFill/>
-          <a:extLst>
-            <a:ext uri="{909E8E84-426E-40DD-AFC4-6F175D3DCCD1}">
-              <a14:hiddenFill xmlns:a14="http://schemas.microsoft.com/office/drawing/2010/main">
-                <a:solidFill>
-                  <a:srgbClr val="FFFFFF"/>
-                </a:solidFill>
-              </a14:hiddenFill>
-            </a:ext>
-          </a:extLst>
-        </p:spPr>
-      </p:pic>
       <p:sp>
         <p:nvSpPr>
           <p:cNvPr id="115" name="AutoShape 4">
@@ -7021,7 +6978,7 @@
         <p:spPr bwMode="auto">
           <a:xfrm>
             <a:off x="5903641" y="4122171"/>
-            <a:ext cx="3383303" cy="1359856"/>
+            <a:ext cx="3147083" cy="1054855"/>
           </a:xfrm>
           <a:prstGeom prst="roundRect">
             <a:avLst>
@@ -7079,8 +7036,8 @@
         </p:nvSpPr>
         <p:spPr>
           <a:xfrm>
-            <a:off x="6017049" y="4206046"/>
-            <a:ext cx="838284" cy="493916"/>
+            <a:off x="6017049" y="4206045"/>
+            <a:ext cx="838284" cy="590019"/>
           </a:xfrm>
           <a:prstGeom prst="rect">
             <a:avLst/>
@@ -7159,7 +7116,7 @@
           <p:nvPr/>
         </p:nvPicPr>
         <p:blipFill>
-          <a:blip r:embed="rId10"/>
+          <a:blip r:embed="rId9"/>
           <a:stretch>
             <a:fillRect/>
           </a:stretch>
@@ -7168,52 +7125,6 @@
           <a:xfrm>
             <a:off x="7625738" y="3267985"/>
             <a:ext cx="406593" cy="406593"/>
-          </a:xfrm>
-          <a:prstGeom prst="rect">
-            <a:avLst/>
-          </a:prstGeom>
-        </p:spPr>
-      </p:pic>
-      <p:pic>
-        <p:nvPicPr>
-          <p:cNvPr id="120" name="Picture 119">
-            <a:extLst>
-              <a:ext uri="{FF2B5EF4-FFF2-40B4-BE49-F238E27FC236}">
-                <a16:creationId xmlns:a16="http://schemas.microsoft.com/office/drawing/2014/main" id="{2E2538D4-234B-3345-A51E-D3398ED6ED9A}"/>
-              </a:ext>
-            </a:extLst>
-          </p:cNvPr>
-          <p:cNvPicPr>
-            <a:picLocks noChangeAspect="1"/>
-          </p:cNvPicPr>
-          <p:nvPr/>
-        </p:nvPicPr>
-        <p:blipFill>
-          <a:blip r:embed="rId2">
-            <a:biLevel thresh="75000"/>
-            <a:extLst>
-              <a:ext uri="{BEBA8EAE-BF5A-486C-A8C5-ECC9F3942E4B}">
-                <a14:imgProps xmlns:a14="http://schemas.microsoft.com/office/drawing/2010/main">
-                  <a14:imgLayer r:embed="rId3">
-                    <a14:imgEffect>
-                      <a14:artisticPhotocopy/>
-                    </a14:imgEffect>
-                  </a14:imgLayer>
-                </a14:imgProps>
-              </a:ext>
-              <a:ext uri="{28A0092B-C50C-407E-A947-70E740481C1C}">
-                <a14:useLocalDpi xmlns:a14="http://schemas.microsoft.com/office/drawing/2010/main" val="0"/>
-              </a:ext>
-            </a:extLst>
-          </a:blip>
-          <a:stretch>
-            <a:fillRect/>
-          </a:stretch>
-        </p:blipFill>
-        <p:spPr>
-          <a:xfrm>
-            <a:off x="6988143" y="4739623"/>
-            <a:ext cx="959343" cy="504271"/>
           </a:xfrm>
           <a:prstGeom prst="rect">
             <a:avLst/>
@@ -7235,7 +7146,7 @@
         <p:spPr>
           <a:xfrm>
             <a:off x="7020727" y="4218047"/>
-            <a:ext cx="838284" cy="493916"/>
+            <a:ext cx="838284" cy="578018"/>
           </a:xfrm>
           <a:prstGeom prst="rect">
             <a:avLst/>
@@ -7314,15 +7225,15 @@
           <p:nvPr/>
         </p:nvPicPr>
         <p:blipFill>
-          <a:blip r:embed="rId11"/>
+          <a:blip r:embed="rId10"/>
           <a:stretch>
             <a:fillRect/>
           </a:stretch>
         </p:blipFill>
         <p:spPr>
           <a:xfrm>
-            <a:off x="5730176" y="5695221"/>
-            <a:ext cx="731649" cy="876903"/>
+            <a:off x="5916439" y="5779886"/>
+            <a:ext cx="652831" cy="782437"/>
           </a:xfrm>
           <a:prstGeom prst="rect">
             <a:avLst/>
@@ -7412,8 +7323,8 @@
         </p:blipFill>
         <p:spPr>
           <a:xfrm>
-            <a:off x="8572499" y="6180117"/>
-            <a:ext cx="400307" cy="365995"/>
+            <a:off x="5432394" y="6463966"/>
+            <a:ext cx="306393" cy="280131"/>
           </a:xfrm>
           <a:prstGeom prst="rect">
             <a:avLst/>
@@ -7435,7 +7346,7 @@
           <p:nvPr/>
         </p:nvPicPr>
         <p:blipFill>
-          <a:blip r:embed="rId12"/>
+          <a:blip r:embed="rId11"/>
           <a:stretch>
             <a:fillRect/>
           </a:stretch>
@@ -7477,9 +7388,9 @@
               <a:gd name="adj2" fmla="val 79216"/>
             </a:avLst>
           </a:prstGeom>
-          <a:ln>
+          <a:ln w="12700">
             <a:solidFill>
-              <a:schemeClr val="accent6"/>
+              <a:srgbClr val="7030A0"/>
             </a:solidFill>
             <a:tailEnd type="triangle"/>
           </a:ln>
@@ -7526,9 +7437,9 @@
               <a:gd name="adj1" fmla="val 50000"/>
             </a:avLst>
           </a:prstGeom>
-          <a:ln>
+          <a:ln w="12700">
             <a:solidFill>
-              <a:schemeClr val="accent6"/>
+              <a:srgbClr val="7030A0"/>
             </a:solidFill>
             <a:tailEnd type="triangle"/>
           </a:ln>
@@ -7575,9 +7486,9 @@
               <a:gd name="adj1" fmla="val 50000"/>
             </a:avLst>
           </a:prstGeom>
-          <a:ln>
+          <a:ln w="12700">
             <a:solidFill>
-              <a:schemeClr val="accent6"/>
+              <a:srgbClr val="7030A0"/>
             </a:solidFill>
             <a:tailEnd type="triangle"/>
           </a:ln>
@@ -7616,17 +7527,17 @@
         </p:nvCxnSpPr>
         <p:spPr>
           <a:xfrm rot="16200000" flipH="1">
-            <a:off x="6078876" y="2605756"/>
-            <a:ext cx="904261" cy="2128569"/>
+            <a:off x="6019822" y="2664810"/>
+            <a:ext cx="904262" cy="2010460"/>
           </a:xfrm>
           <a:prstGeom prst="bentConnector3">
             <a:avLst>
               <a:gd name="adj1" fmla="val 50000"/>
             </a:avLst>
           </a:prstGeom>
-          <a:ln>
+          <a:ln w="12700">
             <a:solidFill>
-              <a:schemeClr val="accent6"/>
+              <a:srgbClr val="7030A0"/>
             </a:solidFill>
             <a:tailEnd type="triangle"/>
           </a:ln>
@@ -7665,17 +7576,17 @@
         </p:nvCxnSpPr>
         <p:spPr>
           <a:xfrm rot="5400000" flipH="1" flipV="1">
-            <a:off x="5724808" y="2019026"/>
-            <a:ext cx="454848" cy="479897"/>
+            <a:off x="6202535" y="1541299"/>
+            <a:ext cx="454848" cy="1435349"/>
           </a:xfrm>
           <a:prstGeom prst="bentConnector3">
             <a:avLst>
               <a:gd name="adj1" fmla="val 50000"/>
             </a:avLst>
           </a:prstGeom>
-          <a:ln>
+          <a:ln w="12700">
             <a:solidFill>
-              <a:schemeClr val="accent6"/>
+              <a:srgbClr val="7030A0"/>
             </a:solidFill>
             <a:tailEnd type="triangle"/>
           </a:ln>
@@ -7711,14 +7622,14 @@
           <p:nvPr/>
         </p:nvPicPr>
         <p:blipFill>
-          <a:blip r:embed="rId13"/>
+          <a:blip r:embed="rId12"/>
           <a:stretch>
             <a:fillRect/>
           </a:stretch>
         </p:blipFill>
         <p:spPr>
           <a:xfrm>
-            <a:off x="8274372" y="4732223"/>
+            <a:off x="9384302" y="4330437"/>
             <a:ext cx="747725" cy="397229"/>
           </a:xfrm>
           <a:prstGeom prst="rect">
@@ -7761,7 +7672,7 @@
             <p:nvPr/>
           </p:nvPicPr>
           <p:blipFill>
-            <a:blip r:embed="rId14"/>
+            <a:blip r:embed="rId13"/>
             <a:stretch>
               <a:fillRect/>
             </a:stretch>
@@ -7840,8 +7751,8 @@
         </p:blipFill>
         <p:spPr>
           <a:xfrm>
-            <a:off x="8900391" y="5122552"/>
-            <a:ext cx="400307" cy="365995"/>
+            <a:off x="5747482" y="5051980"/>
+            <a:ext cx="244478" cy="223523"/>
           </a:xfrm>
           <a:prstGeom prst="rect">
             <a:avLst/>
@@ -7863,7 +7774,7 @@
           <p:nvPr/>
         </p:nvPicPr>
         <p:blipFill>
-          <a:blip r:embed="rId15"/>
+          <a:blip r:embed="rId14"/>
           <a:stretch>
             <a:fillRect/>
           </a:stretch>
@@ -7872,6 +7783,693 @@
           <a:xfrm flipH="1">
             <a:off x="4563035" y="4525788"/>
             <a:ext cx="781653" cy="639821"/>
+          </a:xfrm>
+          <a:prstGeom prst="rect">
+            <a:avLst/>
+          </a:prstGeom>
+        </p:spPr>
+      </p:pic>
+      <p:cxnSp>
+        <p:nvCxnSpPr>
+          <p:cNvPr id="43" name="Elbow Connector 42">
+            <a:extLst>
+              <a:ext uri="{FF2B5EF4-FFF2-40B4-BE49-F238E27FC236}">
+                <a16:creationId xmlns:a16="http://schemas.microsoft.com/office/drawing/2014/main" id="{D9195E4F-646A-A446-B310-3D0002AC4F1F}"/>
+              </a:ext>
+            </a:extLst>
+          </p:cNvPr>
+          <p:cNvCxnSpPr>
+            <a:cxnSpLocks/>
+            <a:stCxn id="54" idx="2"/>
+            <a:endCxn id="122" idx="0"/>
+          </p:cNvCxnSpPr>
+          <p:nvPr/>
+        </p:nvCxnSpPr>
+        <p:spPr>
+          <a:xfrm rot="16200000" flipH="1">
+            <a:off x="4573801" y="4110831"/>
+            <a:ext cx="2561977" cy="776132"/>
+          </a:xfrm>
+          <a:prstGeom prst="bentConnector3">
+            <a:avLst>
+              <a:gd name="adj1" fmla="val 90318"/>
+            </a:avLst>
+          </a:prstGeom>
+          <a:ln w="12700">
+            <a:solidFill>
+              <a:srgbClr val="7030A0"/>
+            </a:solidFill>
+            <a:tailEnd type="triangle"/>
+          </a:ln>
+          <a:effectLst/>
+        </p:spPr>
+        <p:style>
+          <a:lnRef idx="2">
+            <a:schemeClr val="accent1"/>
+          </a:lnRef>
+          <a:fillRef idx="0">
+            <a:schemeClr val="accent1"/>
+          </a:fillRef>
+          <a:effectRef idx="1">
+            <a:schemeClr val="accent1"/>
+          </a:effectRef>
+          <a:fontRef idx="minor">
+            <a:schemeClr val="tx1"/>
+          </a:fontRef>
+        </p:style>
+      </p:cxnSp>
+      <p:cxnSp>
+        <p:nvCxnSpPr>
+          <p:cNvPr id="47" name="Elbow Connector 46">
+            <a:extLst>
+              <a:ext uri="{FF2B5EF4-FFF2-40B4-BE49-F238E27FC236}">
+                <a16:creationId xmlns:a16="http://schemas.microsoft.com/office/drawing/2014/main" id="{31F0B669-2FBD-EA4E-B732-8BC3258D4F17}"/>
+              </a:ext>
+            </a:extLst>
+          </p:cNvPr>
+          <p:cNvCxnSpPr>
+            <a:cxnSpLocks/>
+            <a:stCxn id="139" idx="2"/>
+            <a:endCxn id="122" idx="3"/>
+          </p:cNvCxnSpPr>
+          <p:nvPr/>
+        </p:nvCxnSpPr>
+        <p:spPr>
+          <a:xfrm rot="5400000">
+            <a:off x="7441999" y="3854938"/>
+            <a:ext cx="1443439" cy="3188895"/>
+          </a:xfrm>
+          <a:prstGeom prst="bentConnector2">
+            <a:avLst/>
+          </a:prstGeom>
+          <a:ln w="12700">
+            <a:solidFill>
+              <a:srgbClr val="7030A0"/>
+            </a:solidFill>
+            <a:headEnd type="triangle"/>
+            <a:tailEnd type="triangle"/>
+          </a:ln>
+          <a:effectLst/>
+        </p:spPr>
+        <p:style>
+          <a:lnRef idx="2">
+            <a:schemeClr val="accent1"/>
+          </a:lnRef>
+          <a:fillRef idx="0">
+            <a:schemeClr val="accent1"/>
+          </a:fillRef>
+          <a:effectRef idx="1">
+            <a:schemeClr val="accent1"/>
+          </a:effectRef>
+          <a:fontRef idx="minor">
+            <a:schemeClr val="tx1"/>
+          </a:fontRef>
+        </p:style>
+      </p:cxnSp>
+      <p:grpSp>
+        <p:nvGrpSpPr>
+          <p:cNvPr id="17" name="Group 16">
+            <a:extLst>
+              <a:ext uri="{FF2B5EF4-FFF2-40B4-BE49-F238E27FC236}">
+                <a16:creationId xmlns:a16="http://schemas.microsoft.com/office/drawing/2014/main" id="{D3421A89-9A2B-3A45-88A8-5E6ABA6AE205}"/>
+              </a:ext>
+            </a:extLst>
+          </p:cNvPr>
+          <p:cNvGrpSpPr/>
+          <p:nvPr/>
+        </p:nvGrpSpPr>
+        <p:grpSpPr>
+          <a:xfrm>
+            <a:off x="2069154" y="2653495"/>
+            <a:ext cx="1238565" cy="337037"/>
+            <a:chOff x="2020283" y="2942844"/>
+            <a:chExt cx="1238565" cy="337037"/>
+          </a:xfrm>
+        </p:grpSpPr>
+        <p:pic>
+          <p:nvPicPr>
+            <p:cNvPr id="56" name="Picture 55">
+              <a:extLst>
+                <a:ext uri="{FF2B5EF4-FFF2-40B4-BE49-F238E27FC236}">
+                  <a16:creationId xmlns:a16="http://schemas.microsoft.com/office/drawing/2014/main" id="{688C8AA4-DBF6-204A-B409-D9EF9FCC3675}"/>
+                </a:ext>
+              </a:extLst>
+            </p:cNvPr>
+            <p:cNvPicPr>
+              <a:picLocks noChangeAspect="1"/>
+            </p:cNvPicPr>
+            <p:nvPr/>
+          </p:nvPicPr>
+          <p:blipFill>
+            <a:blip r:embed="rId2">
+              <a:biLevel thresh="75000"/>
+              <a:extLst>
+                <a:ext uri="{BEBA8EAE-BF5A-486C-A8C5-ECC9F3942E4B}">
+                  <a14:imgProps xmlns:a14="http://schemas.microsoft.com/office/drawing/2010/main">
+                    <a14:imgLayer r:embed="rId3">
+                      <a14:imgEffect>
+                        <a14:artisticPhotocopy/>
+                      </a14:imgEffect>
+                    </a14:imgLayer>
+                  </a14:imgProps>
+                </a:ext>
+                <a:ext uri="{28A0092B-C50C-407E-A947-70E740481C1C}">
+                  <a14:useLocalDpi xmlns:a14="http://schemas.microsoft.com/office/drawing/2010/main" val="0"/>
+                </a:ext>
+              </a:extLst>
+            </a:blip>
+            <a:stretch>
+              <a:fillRect/>
+            </a:stretch>
+          </p:blipFill>
+          <p:spPr>
+            <a:xfrm>
+              <a:off x="2020283" y="2942844"/>
+              <a:ext cx="641191" cy="337037"/>
+            </a:xfrm>
+            <a:prstGeom prst="rect">
+              <a:avLst/>
+            </a:prstGeom>
+          </p:spPr>
+        </p:pic>
+        <p:sp>
+          <p:nvSpPr>
+            <p:cNvPr id="16" name="TextBox 15">
+              <a:extLst>
+                <a:ext uri="{FF2B5EF4-FFF2-40B4-BE49-F238E27FC236}">
+                  <a16:creationId xmlns:a16="http://schemas.microsoft.com/office/drawing/2014/main" id="{2176F3C7-C119-B54B-B0AF-87DA246FF40B}"/>
+                </a:ext>
+              </a:extLst>
+            </p:cNvPr>
+            <p:cNvSpPr txBox="1"/>
+            <p:nvPr/>
+          </p:nvSpPr>
+          <p:spPr>
+            <a:xfrm>
+              <a:off x="2548397" y="2995434"/>
+              <a:ext cx="710451" cy="261610"/>
+            </a:xfrm>
+            <a:prstGeom prst="rect">
+              <a:avLst/>
+            </a:prstGeom>
+            <a:noFill/>
+          </p:spPr>
+          <p:txBody>
+            <a:bodyPr wrap="none" rtlCol="0">
+              <a:spAutoFit/>
+            </a:bodyPr>
+            <a:lstStyle/>
+            <a:p>
+              <a:r>
+                <a:rPr lang="en-US" sz="1100" dirty="0">
+                  <a:solidFill>
+                    <a:schemeClr val="tx1">
+                      <a:lumMod val="50000"/>
+                    </a:schemeClr>
+                  </a:solidFill>
+                </a:rPr>
+                <a:t>Connect</a:t>
+              </a:r>
+            </a:p>
+          </p:txBody>
+        </p:sp>
+      </p:grpSp>
+      <p:pic>
+        <p:nvPicPr>
+          <p:cNvPr id="114" name="Picture 2" descr="object Object]">
+            <a:extLst>
+              <a:ext uri="{FF2B5EF4-FFF2-40B4-BE49-F238E27FC236}">
+                <a16:creationId xmlns:a16="http://schemas.microsoft.com/office/drawing/2014/main" id="{D854718E-B027-A54C-812F-F6BA85452DFC}"/>
+              </a:ext>
+            </a:extLst>
+          </p:cNvPr>
+          <p:cNvPicPr>
+            <a:picLocks noChangeAspect="1" noChangeArrowheads="1"/>
+          </p:cNvPicPr>
+          <p:nvPr/>
+        </p:nvPicPr>
+        <p:blipFill>
+          <a:blip r:embed="rId15">
+            <a:extLst>
+              <a:ext uri="{28A0092B-C50C-407E-A947-70E740481C1C}">
+                <a14:useLocalDpi xmlns:a14="http://schemas.microsoft.com/office/drawing/2010/main"/>
+              </a:ext>
+            </a:extLst>
+          </a:blip>
+          <a:srcRect/>
+          <a:stretch>
+            <a:fillRect/>
+          </a:stretch>
+        </p:blipFill>
+        <p:spPr bwMode="auto">
+          <a:xfrm>
+            <a:off x="5982702" y="4699961"/>
+            <a:ext cx="400305" cy="426955"/>
+          </a:xfrm>
+          <a:prstGeom prst="rect">
+            <a:avLst/>
+          </a:prstGeom>
+          <a:noFill/>
+          <a:extLst>
+            <a:ext uri="{909E8E84-426E-40DD-AFC4-6F175D3DCCD1}">
+              <a14:hiddenFill xmlns:a14="http://schemas.microsoft.com/office/drawing/2010/main">
+                <a:solidFill>
+                  <a:srgbClr val="FFFFFF"/>
+                </a:solidFill>
+              </a14:hiddenFill>
+            </a:ext>
+          </a:extLst>
+        </p:spPr>
+      </p:pic>
+      <p:pic>
+        <p:nvPicPr>
+          <p:cNvPr id="18" name="Picture 17">
+            <a:extLst>
+              <a:ext uri="{FF2B5EF4-FFF2-40B4-BE49-F238E27FC236}">
+                <a16:creationId xmlns:a16="http://schemas.microsoft.com/office/drawing/2014/main" id="{D0803C71-8E69-A04D-9D50-1C7F1DEDC78D}"/>
+              </a:ext>
+            </a:extLst>
+          </p:cNvPr>
+          <p:cNvPicPr>
+            <a:picLocks noChangeAspect="1"/>
+          </p:cNvPicPr>
+          <p:nvPr/>
+        </p:nvPicPr>
+        <p:blipFill>
+          <a:blip r:embed="rId16"/>
+          <a:stretch>
+            <a:fillRect/>
+          </a:stretch>
+        </p:blipFill>
+        <p:spPr>
+          <a:xfrm>
+            <a:off x="7057286" y="5844899"/>
+            <a:ext cx="546100" cy="508000"/>
+          </a:xfrm>
+          <a:prstGeom prst="rect">
+            <a:avLst/>
+          </a:prstGeom>
+        </p:spPr>
+      </p:pic>
+      <p:cxnSp>
+        <p:nvCxnSpPr>
+          <p:cNvPr id="58" name="Elbow Connector 57">
+            <a:extLst>
+              <a:ext uri="{FF2B5EF4-FFF2-40B4-BE49-F238E27FC236}">
+                <a16:creationId xmlns:a16="http://schemas.microsoft.com/office/drawing/2014/main" id="{E2F17501-2C71-6D4C-A9EF-805C71B474E2}"/>
+              </a:ext>
+            </a:extLst>
+          </p:cNvPr>
+          <p:cNvCxnSpPr>
+            <a:cxnSpLocks/>
+            <a:stCxn id="57" idx="2"/>
+            <a:endCxn id="18" idx="3"/>
+          </p:cNvCxnSpPr>
+          <p:nvPr/>
+        </p:nvCxnSpPr>
+        <p:spPr>
+          <a:xfrm rot="5400000">
+            <a:off x="7333331" y="5066121"/>
+            <a:ext cx="1302834" cy="762723"/>
+          </a:xfrm>
+          <a:prstGeom prst="bentConnector2">
+            <a:avLst/>
+          </a:prstGeom>
+          <a:ln w="12700">
+            <a:solidFill>
+              <a:srgbClr val="7030A0"/>
+            </a:solidFill>
+            <a:headEnd type="triangle"/>
+            <a:tailEnd type="none"/>
+          </a:ln>
+          <a:effectLst/>
+        </p:spPr>
+        <p:style>
+          <a:lnRef idx="2">
+            <a:schemeClr val="accent1"/>
+          </a:lnRef>
+          <a:fillRef idx="0">
+            <a:schemeClr val="accent1"/>
+          </a:fillRef>
+          <a:effectRef idx="1">
+            <a:schemeClr val="accent1"/>
+          </a:effectRef>
+          <a:fontRef idx="minor">
+            <a:schemeClr val="tx1"/>
+          </a:fontRef>
+        </p:style>
+      </p:cxnSp>
+      <p:sp>
+        <p:nvSpPr>
+          <p:cNvPr id="71" name="Rectangle 70">
+            <a:extLst>
+              <a:ext uri="{FF2B5EF4-FFF2-40B4-BE49-F238E27FC236}">
+                <a16:creationId xmlns:a16="http://schemas.microsoft.com/office/drawing/2014/main" id="{31D7AA3F-988C-D849-A930-9FF95198BFE5}"/>
+              </a:ext>
+            </a:extLst>
+          </p:cNvPr>
+          <p:cNvSpPr/>
+          <p:nvPr/>
+        </p:nvSpPr>
+        <p:spPr>
+          <a:xfrm>
+            <a:off x="8212440" y="1273423"/>
+            <a:ext cx="838284" cy="578018"/>
+          </a:xfrm>
+          <a:prstGeom prst="rect">
+            <a:avLst/>
+          </a:prstGeom>
+          <a:solidFill>
+            <a:schemeClr val="accent2">
+              <a:lumMod val="60000"/>
+              <a:lumOff val="40000"/>
+            </a:schemeClr>
+          </a:solidFill>
+          <a:ln>
+            <a:noFill/>
+          </a:ln>
+          <a:effectLst>
+            <a:outerShdw blurRad="50800" dist="38100" dir="5400000" algn="t" rotWithShape="0">
+              <a:prstClr val="black">
+                <a:alpha val="40000"/>
+              </a:prstClr>
+            </a:outerShdw>
+          </a:effectLst>
+        </p:spPr>
+        <p:style>
+          <a:lnRef idx="2">
+            <a:schemeClr val="accent1">
+              <a:shade val="50000"/>
+            </a:schemeClr>
+          </a:lnRef>
+          <a:fillRef idx="1">
+            <a:schemeClr val="accent1"/>
+          </a:fillRef>
+          <a:effectRef idx="0">
+            <a:schemeClr val="accent1"/>
+          </a:effectRef>
+          <a:fontRef idx="minor">
+            <a:schemeClr val="lt1"/>
+          </a:fontRef>
+        </p:style>
+        <p:txBody>
+          <a:bodyPr rtlCol="0" anchor="t"/>
+          <a:lstStyle/>
+          <a:p>
+            <a:pPr defTabSz="914377" eaLnBrk="1" fontAlgn="auto" hangingPunct="1">
+              <a:spcBef>
+                <a:spcPts val="0"/>
+              </a:spcBef>
+              <a:spcAft>
+                <a:spcPts val="0"/>
+              </a:spcAft>
+            </a:pPr>
+            <a:r>
+              <a:rPr lang="en-US" sz="1067" dirty="0">
+                <a:solidFill>
+                  <a:schemeClr val="accent1">
+                    <a:lumMod val="50000"/>
+                  </a:schemeClr>
+                </a:solidFill>
+                <a:latin typeface="Arial"/>
+              </a:rPr>
+              <a:t>scoring model </a:t>
+            </a:r>
+          </a:p>
+        </p:txBody>
+      </p:sp>
+      <p:cxnSp>
+        <p:nvCxnSpPr>
+          <p:cNvPr id="73" name="Elbow Connector 72">
+            <a:extLst>
+              <a:ext uri="{FF2B5EF4-FFF2-40B4-BE49-F238E27FC236}">
+                <a16:creationId xmlns:a16="http://schemas.microsoft.com/office/drawing/2014/main" id="{7046057F-1BFF-6D49-9C79-7EC7E0810717}"/>
+              </a:ext>
+            </a:extLst>
+          </p:cNvPr>
+          <p:cNvCxnSpPr>
+            <a:cxnSpLocks/>
+            <a:stCxn id="71" idx="2"/>
+            <a:endCxn id="18" idx="3"/>
+          </p:cNvCxnSpPr>
+          <p:nvPr/>
+        </p:nvCxnSpPr>
+        <p:spPr>
+          <a:xfrm rot="5400000">
+            <a:off x="5993755" y="3461072"/>
+            <a:ext cx="4247458" cy="1028196"/>
+          </a:xfrm>
+          <a:prstGeom prst="curvedConnector2">
+            <a:avLst/>
+          </a:prstGeom>
+          <a:ln w="12700">
+            <a:solidFill>
+              <a:srgbClr val="7030A0"/>
+            </a:solidFill>
+            <a:headEnd type="triangle"/>
+            <a:tailEnd type="none"/>
+          </a:ln>
+          <a:effectLst/>
+        </p:spPr>
+        <p:style>
+          <a:lnRef idx="2">
+            <a:schemeClr val="accent1"/>
+          </a:lnRef>
+          <a:fillRef idx="0">
+            <a:schemeClr val="accent1"/>
+          </a:fillRef>
+          <a:effectRef idx="1">
+            <a:schemeClr val="accent1"/>
+          </a:effectRef>
+          <a:fontRef idx="minor">
+            <a:schemeClr val="tx1"/>
+          </a:fontRef>
+        </p:style>
+      </p:cxnSp>
+      <p:sp>
+        <p:nvSpPr>
+          <p:cNvPr id="57" name="Rectangle 56">
+            <a:extLst>
+              <a:ext uri="{FF2B5EF4-FFF2-40B4-BE49-F238E27FC236}">
+                <a16:creationId xmlns:a16="http://schemas.microsoft.com/office/drawing/2014/main" id="{D32931CF-A6BD-AA49-A6BF-5A16FEB15BE6}"/>
+              </a:ext>
+            </a:extLst>
+          </p:cNvPr>
+          <p:cNvSpPr/>
+          <p:nvPr/>
+        </p:nvSpPr>
+        <p:spPr>
+          <a:xfrm>
+            <a:off x="7946967" y="4218047"/>
+            <a:ext cx="838284" cy="578018"/>
+          </a:xfrm>
+          <a:prstGeom prst="rect">
+            <a:avLst/>
+          </a:prstGeom>
+          <a:solidFill>
+            <a:schemeClr val="accent2">
+              <a:lumMod val="60000"/>
+              <a:lumOff val="40000"/>
+            </a:schemeClr>
+          </a:solidFill>
+          <a:ln>
+            <a:noFill/>
+          </a:ln>
+          <a:effectLst>
+            <a:outerShdw blurRad="50800" dist="38100" dir="5400000" algn="t" rotWithShape="0">
+              <a:prstClr val="black">
+                <a:alpha val="40000"/>
+              </a:prstClr>
+            </a:outerShdw>
+          </a:effectLst>
+        </p:spPr>
+        <p:style>
+          <a:lnRef idx="2">
+            <a:schemeClr val="accent1">
+              <a:shade val="50000"/>
+            </a:schemeClr>
+          </a:lnRef>
+          <a:fillRef idx="1">
+            <a:schemeClr val="accent1"/>
+          </a:fillRef>
+          <a:effectRef idx="0">
+            <a:schemeClr val="accent1"/>
+          </a:effectRef>
+          <a:fontRef idx="minor">
+            <a:schemeClr val="lt1"/>
+          </a:fontRef>
+        </p:style>
+        <p:txBody>
+          <a:bodyPr rtlCol="0" anchor="t"/>
+          <a:lstStyle/>
+          <a:p>
+            <a:pPr defTabSz="914377" eaLnBrk="1" fontAlgn="auto" hangingPunct="1">
+              <a:spcBef>
+                <a:spcPts val="0"/>
+              </a:spcBef>
+              <a:spcAft>
+                <a:spcPts val="0"/>
+              </a:spcAft>
+            </a:pPr>
+            <a:r>
+              <a:rPr lang="en-US" sz="1067" dirty="0">
+                <a:solidFill>
+                  <a:schemeClr val="accent1">
+                    <a:lumMod val="50000"/>
+                  </a:schemeClr>
+                </a:solidFill>
+                <a:latin typeface="Arial"/>
+              </a:rPr>
+              <a:t>Python pickle model </a:t>
+            </a:r>
+          </a:p>
+        </p:txBody>
+      </p:sp>
+      <p:sp>
+        <p:nvSpPr>
+          <p:cNvPr id="74" name="AutoShape 4">
+            <a:extLst>
+              <a:ext uri="{FF2B5EF4-FFF2-40B4-BE49-F238E27FC236}">
+                <a16:creationId xmlns:a16="http://schemas.microsoft.com/office/drawing/2014/main" id="{E9F53470-66FA-A94D-950C-369F2AFFF3E8}"/>
+              </a:ext>
+            </a:extLst>
+          </p:cNvPr>
+          <p:cNvSpPr>
+            <a:spLocks noChangeArrowheads="1"/>
+          </p:cNvSpPr>
+          <p:nvPr/>
+        </p:nvSpPr>
+        <p:spPr bwMode="auto">
+          <a:xfrm>
+            <a:off x="9086209" y="4126507"/>
+            <a:ext cx="2082674" cy="1054855"/>
+          </a:xfrm>
+          <a:prstGeom prst="roundRect">
+            <a:avLst>
+              <a:gd name="adj" fmla="val 7117"/>
+            </a:avLst>
+          </a:prstGeom>
+          <a:noFill/>
+          <a:ln w="12700">
+            <a:solidFill>
+              <a:srgbClr val="5596E6">
+                <a:lumMod val="50000"/>
+              </a:srgbClr>
+            </a:solidFill>
+            <a:prstDash val="dash"/>
+            <a:round/>
+            <a:headEnd/>
+            <a:tailEnd/>
+          </a:ln>
+        </p:spPr>
+        <p:txBody>
+          <a:bodyPr lIns="0" tIns="0" rIns="0" bIns="0" anchor="b" anchorCtr="1"/>
+          <a:lstStyle/>
+          <a:p>
+            <a:pPr algn="ctr" defTabSz="1219170" eaLnBrk="1" fontAlgn="auto" hangingPunct="1">
+              <a:spcBef>
+                <a:spcPts val="0"/>
+              </a:spcBef>
+              <a:spcAft>
+                <a:spcPts val="0"/>
+              </a:spcAft>
+              <a:defRPr/>
+            </a:pPr>
+            <a:r>
+              <a:rPr lang="en-US" sz="1333" kern="0" dirty="0">
+                <a:solidFill>
+                  <a:srgbClr val="6D7777"/>
+                </a:solidFill>
+              </a:rPr>
+              <a:t>Big Data Cluster</a:t>
+            </a:r>
+          </a:p>
+        </p:txBody>
+      </p:sp>
+      <p:pic>
+        <p:nvPicPr>
+          <p:cNvPr id="75" name="Picture 74">
+            <a:extLst>
+              <a:ext uri="{FF2B5EF4-FFF2-40B4-BE49-F238E27FC236}">
+                <a16:creationId xmlns:a16="http://schemas.microsoft.com/office/drawing/2014/main" id="{4B643FF7-B957-8B47-A996-E31C144079EF}"/>
+              </a:ext>
+            </a:extLst>
+          </p:cNvPr>
+          <p:cNvPicPr>
+            <a:picLocks noChangeAspect="1"/>
+          </p:cNvPicPr>
+          <p:nvPr/>
+        </p:nvPicPr>
+        <p:blipFill>
+          <a:blip r:embed="rId8"/>
+          <a:stretch>
+            <a:fillRect/>
+          </a:stretch>
+        </p:blipFill>
+        <p:spPr>
+          <a:xfrm>
+            <a:off x="4161621" y="3607197"/>
+            <a:ext cx="280628" cy="256574"/>
+          </a:xfrm>
+          <a:prstGeom prst="rect">
+            <a:avLst/>
+          </a:prstGeom>
+        </p:spPr>
+      </p:pic>
+      <p:pic>
+        <p:nvPicPr>
+          <p:cNvPr id="76" name="Picture 75">
+            <a:extLst>
+              <a:ext uri="{FF2B5EF4-FFF2-40B4-BE49-F238E27FC236}">
+                <a16:creationId xmlns:a16="http://schemas.microsoft.com/office/drawing/2014/main" id="{73833B77-E00B-9946-8E53-54FCBFFE7CBF}"/>
+              </a:ext>
+            </a:extLst>
+          </p:cNvPr>
+          <p:cNvPicPr>
+            <a:picLocks noChangeAspect="1"/>
+          </p:cNvPicPr>
+          <p:nvPr/>
+        </p:nvPicPr>
+        <p:blipFill>
+          <a:blip r:embed="rId8"/>
+          <a:stretch>
+            <a:fillRect/>
+          </a:stretch>
+        </p:blipFill>
+        <p:spPr>
+          <a:xfrm>
+            <a:off x="1351938" y="5466926"/>
+            <a:ext cx="280628" cy="256574"/>
+          </a:xfrm>
+          <a:prstGeom prst="rect">
+            <a:avLst/>
+          </a:prstGeom>
+        </p:spPr>
+      </p:pic>
+      <p:pic>
+        <p:nvPicPr>
+          <p:cNvPr id="77" name="Picture 76">
+            <a:extLst>
+              <a:ext uri="{FF2B5EF4-FFF2-40B4-BE49-F238E27FC236}">
+                <a16:creationId xmlns:a16="http://schemas.microsoft.com/office/drawing/2014/main" id="{3BCDB0FE-C413-9144-8B46-ACA19356BB10}"/>
+              </a:ext>
+            </a:extLst>
+          </p:cNvPr>
+          <p:cNvPicPr>
+            <a:picLocks noChangeAspect="1"/>
+          </p:cNvPicPr>
+          <p:nvPr/>
+        </p:nvPicPr>
+        <p:blipFill>
+          <a:blip r:embed="rId8"/>
+          <a:stretch>
+            <a:fillRect/>
+          </a:stretch>
+        </p:blipFill>
+        <p:spPr>
+          <a:xfrm>
+            <a:off x="9050724" y="5035454"/>
+            <a:ext cx="280628" cy="256574"/>
           </a:xfrm>
           <a:prstGeom prst="rect">
             <a:avLst/>
@@ -9068,7 +9666,7 @@
             <a:effectLst/>
             <a:extLst>
               <a:ext uri="{C572A759-6A51-4108-AA02-DFA0A04FC94B}">
-                <ma14:wrappingTextBoxFlag xmlns="" xmlns:ma14="http://schemas.microsoft.com/office/mac/drawingml/2011/main" val="1"/>
+                <ma14:wrappingTextBoxFlag xmlns:ma14="http://schemas.microsoft.com/office/mac/drawingml/2011/main" xmlns="" val="1"/>
               </a:ext>
             </a:extLst>
           </p:spPr>
@@ -11198,7 +11796,7 @@
             <a:effectLst/>
             <a:extLst>
               <a:ext uri="{C572A759-6A51-4108-AA02-DFA0A04FC94B}">
-                <ma14:wrappingTextBoxFlag xmlns="" xmlns:ma14="http://schemas.microsoft.com/office/mac/drawingml/2011/main" val="1"/>
+                <ma14:wrappingTextBoxFlag xmlns:ma14="http://schemas.microsoft.com/office/mac/drawingml/2011/main" xmlns="" val="1"/>
               </a:ext>
             </a:extLst>
           </p:spPr>

</xml_diff>

<commit_message>
Deployed 6f2c1cf with MkDocs version: 1.0.4
</commit_message>
<xml_diff>
--- a/diagrams.pptx
+++ b/diagrams.pptx
@@ -276,7 +276,7 @@
               <a:pPr>
                 <a:defRPr/>
               </a:pPr>
-              <a:t>11/5/19</a:t>
+              <a:t>11/13/19</a:t>
             </a:fld>
             <a:endParaRPr lang="en-US" dirty="0"/>
           </a:p>
@@ -9666,7 +9666,7 @@
             <a:effectLst/>
             <a:extLst>
               <a:ext uri="{C572A759-6A51-4108-AA02-DFA0A04FC94B}">
-                <ma14:wrappingTextBoxFlag xmlns:ma14="http://schemas.microsoft.com/office/mac/drawingml/2011/main" xmlns="" val="1"/>
+                <ma14:wrappingTextBoxFlag xmlns="" xmlns:ma14="http://schemas.microsoft.com/office/mac/drawingml/2011/main" val="1"/>
               </a:ext>
             </a:extLst>
           </p:spPr>
@@ -11796,7 +11796,7 @@
             <a:effectLst/>
             <a:extLst>
               <a:ext uri="{C572A759-6A51-4108-AA02-DFA0A04FC94B}">
-                <ma14:wrappingTextBoxFlag xmlns:ma14="http://schemas.microsoft.com/office/mac/drawingml/2011/main" xmlns="" val="1"/>
+                <ma14:wrappingTextBoxFlag xmlns="" xmlns:ma14="http://schemas.microsoft.com/office/mac/drawingml/2011/main" val="1"/>
               </a:ext>
             </a:extLst>
           </p:spPr>
@@ -13397,7 +13397,7 @@
                 <a:ea typeface="+mn-ea"/>
                 <a:cs typeface="+mn-cs"/>
               </a:rPr>
-              <a:t>Predictive scoring</a:t>
+              <a:t>Anomaly detection scoring</a:t>
             </a:r>
           </a:p>
         </p:txBody>
@@ -13434,87 +13434,6 @@
       </p:grpSpPr>
       <p:sp>
         <p:nvSpPr>
-          <p:cNvPr id="55" name="Rounded Rectangle 54">
-            <a:extLst>
-              <a:ext uri="{FF2B5EF4-FFF2-40B4-BE49-F238E27FC236}">
-                <a16:creationId xmlns:a16="http://schemas.microsoft.com/office/drawing/2014/main" id="{BCDB838F-03AA-0041-B23E-D4E797C3F296}"/>
-              </a:ext>
-            </a:extLst>
-          </p:cNvPr>
-          <p:cNvSpPr/>
-          <p:nvPr/>
-        </p:nvSpPr>
-        <p:spPr>
-          <a:xfrm>
-            <a:off x="6631706" y="1596898"/>
-            <a:ext cx="2478145" cy="2045537"/>
-          </a:xfrm>
-          <a:prstGeom prst="roundRect">
-            <a:avLst>
-              <a:gd name="adj" fmla="val 3460"/>
-            </a:avLst>
-          </a:prstGeom>
-          <a:ln>
-            <a:noFill/>
-          </a:ln>
-        </p:spPr>
-        <p:style>
-          <a:lnRef idx="2">
-            <a:schemeClr val="accent1">
-              <a:shade val="50000"/>
-            </a:schemeClr>
-          </a:lnRef>
-          <a:fillRef idx="1">
-            <a:schemeClr val="accent1"/>
-          </a:fillRef>
-          <a:effectRef idx="0">
-            <a:schemeClr val="accent1"/>
-          </a:effectRef>
-          <a:fontRef idx="minor">
-            <a:schemeClr val="lt1"/>
-          </a:fontRef>
-        </p:style>
-        <p:txBody>
-          <a:bodyPr rtlCol="0" anchor="ctr"/>
-          <a:lstStyle/>
-          <a:p>
-            <a:pPr algn="ctr"/>
-            <a:endParaRPr lang="en-US"/>
-          </a:p>
-        </p:txBody>
-      </p:sp>
-      <p:pic>
-        <p:nvPicPr>
-          <p:cNvPr id="57" name="Picture 56">
-            <a:extLst>
-              <a:ext uri="{FF2B5EF4-FFF2-40B4-BE49-F238E27FC236}">
-                <a16:creationId xmlns:a16="http://schemas.microsoft.com/office/drawing/2014/main" id="{8E1A8EFC-A075-DB4B-B16F-8A2770920E88}"/>
-              </a:ext>
-            </a:extLst>
-          </p:cNvPr>
-          <p:cNvPicPr>
-            <a:picLocks noChangeAspect="1"/>
-          </p:cNvPicPr>
-          <p:nvPr/>
-        </p:nvPicPr>
-        <p:blipFill>
-          <a:blip r:embed="rId3"/>
-          <a:stretch>
-            <a:fillRect/>
-          </a:stretch>
-        </p:blipFill>
-        <p:spPr>
-          <a:xfrm>
-            <a:off x="7779916" y="2940407"/>
-            <a:ext cx="1302236" cy="544571"/>
-          </a:xfrm>
-          <a:prstGeom prst="rect">
-            <a:avLst/>
-          </a:prstGeom>
-        </p:spPr>
-      </p:pic>
-      <p:sp>
-        <p:nvSpPr>
           <p:cNvPr id="40" name="Rounded Rectangle 39">
             <a:extLst>
               <a:ext uri="{FF2B5EF4-FFF2-40B4-BE49-F238E27FC236}">
@@ -13527,8 +13446,8 @@
         </p:nvSpPr>
         <p:spPr>
           <a:xfrm>
-            <a:off x="176981" y="1959428"/>
-            <a:ext cx="2889651" cy="3360513"/>
+            <a:off x="176981" y="1959429"/>
+            <a:ext cx="2889651" cy="2055360"/>
           </a:xfrm>
           <a:prstGeom prst="roundRect">
             <a:avLst>
@@ -14353,12 +14272,12 @@
           <p:nvPr/>
         </p:nvPicPr>
         <p:blipFill>
-          <a:blip r:embed="rId4">
+          <a:blip r:embed="rId3">
             <a:biLevel thresh="75000"/>
             <a:extLst>
               <a:ext uri="{BEBA8EAE-BF5A-486C-A8C5-ECC9F3942E4B}">
                 <a14:imgProps xmlns:a14="http://schemas.microsoft.com/office/drawing/2010/main">
-                  <a14:imgLayer r:embed="rId5">
+                  <a14:imgLayer r:embed="rId4">
                     <a14:imgEffect>
                       <a14:artisticPhotocopy/>
                     </a14:imgEffect>
@@ -14376,8 +14295,8 @@
         </p:blipFill>
         <p:spPr>
           <a:xfrm>
-            <a:off x="5492103" y="4910005"/>
-            <a:ext cx="959343" cy="504271"/>
+            <a:off x="5687974" y="5310617"/>
+            <a:ext cx="676845" cy="355778"/>
           </a:xfrm>
           <a:prstGeom prst="rect">
             <a:avLst/>
@@ -15157,75 +15076,6 @@
           </a:fontRef>
         </p:style>
       </p:cxnSp>
-      <p:sp>
-        <p:nvSpPr>
-          <p:cNvPr id="36" name="Rectangle 35">
-            <a:extLst>
-              <a:ext uri="{FF2B5EF4-FFF2-40B4-BE49-F238E27FC236}">
-                <a16:creationId xmlns:a16="http://schemas.microsoft.com/office/drawing/2014/main" id="{1BCD2DAC-822C-EE4B-B97A-7FDAC9C7D1AD}"/>
-              </a:ext>
-            </a:extLst>
-          </p:cNvPr>
-          <p:cNvSpPr/>
-          <p:nvPr/>
-        </p:nvSpPr>
-        <p:spPr>
-          <a:xfrm>
-            <a:off x="609600" y="3688831"/>
-            <a:ext cx="2338282" cy="615667"/>
-          </a:xfrm>
-          <a:prstGeom prst="rect">
-            <a:avLst/>
-          </a:prstGeom>
-          <a:solidFill>
-            <a:schemeClr val="accent5">
-              <a:lumMod val="75000"/>
-            </a:schemeClr>
-          </a:solidFill>
-          <a:ln>
-            <a:noFill/>
-          </a:ln>
-        </p:spPr>
-        <p:style>
-          <a:lnRef idx="2">
-            <a:schemeClr val="accent1">
-              <a:shade val="50000"/>
-            </a:schemeClr>
-          </a:lnRef>
-          <a:fillRef idx="1">
-            <a:schemeClr val="accent1"/>
-          </a:fillRef>
-          <a:effectRef idx="0">
-            <a:schemeClr val="accent1"/>
-          </a:effectRef>
-          <a:fontRef idx="minor">
-            <a:schemeClr val="lt1"/>
-          </a:fontRef>
-        </p:style>
-        <p:txBody>
-          <a:bodyPr rtlCol="0" anchor="t"/>
-          <a:lstStyle/>
-          <a:p>
-            <a:pPr defTabSz="914377" eaLnBrk="1" fontAlgn="auto" hangingPunct="1">
-              <a:spcBef>
-                <a:spcPts val="0"/>
-              </a:spcBef>
-              <a:spcAft>
-                <a:spcPts val="0"/>
-              </a:spcAft>
-            </a:pPr>
-            <a:r>
-              <a:rPr lang="en-US" sz="1333" dirty="0">
-                <a:solidFill>
-                  <a:prstClr val="white"/>
-                </a:solidFill>
-                <a:latin typeface="Arial"/>
-              </a:rPr>
-              <a:t>Python Flask</a:t>
-            </a:r>
-          </a:p>
-        </p:txBody>
-      </p:sp>
       <p:pic>
         <p:nvPicPr>
           <p:cNvPr id="27" name="Picture 40">
@@ -15241,7 +15091,7 @@
           <p:nvPr/>
         </p:nvPicPr>
         <p:blipFill>
-          <a:blip r:embed="rId6">
+          <a:blip r:embed="rId5">
             <a:extLst>
               <a:ext uri="{28A0092B-C50C-407E-A947-70E740481C1C}">
                 <a14:useLocalDpi xmlns:a14="http://schemas.microsoft.com/office/drawing/2010/main" val="0"/>
@@ -15255,8 +15105,8 @@
         </p:blipFill>
         <p:spPr bwMode="auto">
           <a:xfrm>
-            <a:off x="-99239" y="4067225"/>
-            <a:ext cx="1414200" cy="524101"/>
+            <a:off x="128519" y="3483208"/>
+            <a:ext cx="1032463" cy="382630"/>
           </a:xfrm>
           <a:prstGeom prst="rect">
             <a:avLst/>
@@ -15301,15 +15151,15 @@
           <p:nvPr/>
         </p:nvPicPr>
         <p:blipFill>
-          <a:blip r:embed="rId7"/>
+          <a:blip r:embed="rId6"/>
           <a:stretch>
             <a:fillRect/>
           </a:stretch>
         </p:blipFill>
         <p:spPr>
           <a:xfrm>
-            <a:off x="1784980" y="3749132"/>
-            <a:ext cx="1162902" cy="465643"/>
+            <a:off x="2083809" y="3470687"/>
+            <a:ext cx="806955" cy="323116"/>
           </a:xfrm>
           <a:prstGeom prst="rect">
             <a:avLst/>
@@ -15331,7 +15181,7 @@
           <p:nvPr/>
         </p:nvPicPr>
         <p:blipFill>
-          <a:blip r:embed="rId8">
+          <a:blip r:embed="rId7">
             <a:extLst>
               <a:ext uri="{28A0092B-C50C-407E-A947-70E740481C1C}">
                 <a14:useLocalDpi xmlns:a14="http://schemas.microsoft.com/office/drawing/2010/main" val="0"/>
@@ -15374,8 +15224,8 @@
         </p:nvSpPr>
         <p:spPr>
           <a:xfrm>
-            <a:off x="7706436" y="5457620"/>
-            <a:ext cx="2519724" cy="914400"/>
+            <a:off x="7706436" y="5398962"/>
+            <a:ext cx="1688865" cy="973058"/>
           </a:xfrm>
           <a:prstGeom prst="rect">
             <a:avLst/>
@@ -15411,7 +15261,7 @@
           <a:p>
             <a:pPr algn="ctr"/>
             <a:r>
-              <a:rPr lang="en-US" dirty="0"/>
+              <a:rPr lang="en-US" sz="1600" dirty="0"/>
               <a:t>Container Consumer</a:t>
             </a:r>
           </a:p>
@@ -15435,8 +15285,8 @@
         </p:nvCxnSpPr>
         <p:spPr>
           <a:xfrm rot="16200000" flipH="1">
-            <a:off x="6563419" y="3054740"/>
-            <a:ext cx="305389" cy="4500370"/>
+            <a:off x="6385033" y="3233125"/>
+            <a:ext cx="246731" cy="4084941"/>
           </a:xfrm>
           <a:prstGeom prst="bentConnector3">
             <a:avLst>
@@ -15466,36 +15316,6 @@
           </a:fontRef>
         </p:style>
       </p:cxnSp>
-      <p:pic>
-        <p:nvPicPr>
-          <p:cNvPr id="45" name="Picture 44">
-            <a:extLst>
-              <a:ext uri="{FF2B5EF4-FFF2-40B4-BE49-F238E27FC236}">
-                <a16:creationId xmlns:a16="http://schemas.microsoft.com/office/drawing/2014/main" id="{84C29AEF-3CB4-4343-8D50-C59B663B2F81}"/>
-              </a:ext>
-            </a:extLst>
-          </p:cNvPr>
-          <p:cNvPicPr>
-            <a:picLocks noChangeAspect="1"/>
-          </p:cNvPicPr>
-          <p:nvPr/>
-        </p:nvPicPr>
-        <p:blipFill>
-          <a:blip r:embed="rId3"/>
-          <a:stretch>
-            <a:fillRect/>
-          </a:stretch>
-        </p:blipFill>
-        <p:spPr>
-          <a:xfrm>
-            <a:off x="857261" y="4715074"/>
-            <a:ext cx="1302236" cy="544571"/>
-          </a:xfrm>
-          <a:prstGeom prst="rect">
-            <a:avLst/>
-          </a:prstGeom>
-        </p:spPr>
-      </p:pic>
       <p:sp>
         <p:nvSpPr>
           <p:cNvPr id="31" name="Oval 30">
@@ -16082,8 +15902,8 @@
         </p:nvSpPr>
         <p:spPr>
           <a:xfrm>
-            <a:off x="6864192" y="1772888"/>
-            <a:ext cx="2037645" cy="877732"/>
+            <a:off x="6864192" y="1605896"/>
+            <a:ext cx="2037645" cy="1044724"/>
           </a:xfrm>
           <a:prstGeom prst="rect">
             <a:avLst/>
@@ -16119,8 +15939,8 @@
           <a:p>
             <a:pPr algn="ctr"/>
             <a:r>
-              <a:rPr lang="en-US" dirty="0"/>
-              <a:t>Predictive Scoring</a:t>
+              <a:rPr lang="en-US" sz="1600" dirty="0"/>
+              <a:t>Anomaly Detection Scoring</a:t>
             </a:r>
           </a:p>
         </p:txBody>
@@ -16143,8 +15963,8 @@
         </p:nvCxnSpPr>
         <p:spPr>
           <a:xfrm rot="5400000" flipH="1" flipV="1">
-            <a:off x="5232964" y="1944672"/>
-            <a:ext cx="1364145" cy="1898311"/>
+            <a:off x="5191216" y="1902924"/>
+            <a:ext cx="1447641" cy="1898311"/>
           </a:xfrm>
           <a:prstGeom prst="bentConnector2">
             <a:avLst/>
@@ -16195,7 +16015,7 @@
           </a:xfrm>
           <a:prstGeom prst="bentConnector3">
             <a:avLst>
-              <a:gd name="adj1" fmla="val 95918"/>
+              <a:gd name="adj1" fmla="val 95201"/>
             </a:avLst>
           </a:prstGeom>
           <a:ln w="25400">
@@ -16349,7 +16169,7 @@
         </p:nvSpPr>
         <p:spPr>
           <a:xfrm>
-            <a:off x="9248572" y="4905498"/>
+            <a:off x="8863119" y="4905497"/>
             <a:ext cx="493464" cy="493464"/>
           </a:xfrm>
           <a:prstGeom prst="ellipse">
@@ -16506,7 +16326,7 @@
           <p:nvPr/>
         </p:nvPicPr>
         <p:blipFill>
-          <a:blip r:embed="rId6">
+          <a:blip r:embed="rId5">
             <a:extLst>
               <a:ext uri="{28A0092B-C50C-407E-A947-70E740481C1C}">
                 <a14:useLocalDpi xmlns:a14="http://schemas.microsoft.com/office/drawing/2010/main" val="0"/>
@@ -16520,8 +16340,8 @@
         </p:blipFill>
         <p:spPr bwMode="auto">
           <a:xfrm>
-            <a:off x="6185507" y="2436123"/>
-            <a:ext cx="1414200" cy="524101"/>
+            <a:off x="6453135" y="2436124"/>
+            <a:ext cx="904093" cy="335056"/>
           </a:xfrm>
           <a:prstGeom prst="rect">
             <a:avLst/>
@@ -16549,6 +16369,349 @@
               </a14:hiddenLine>
             </a:ext>
           </a:extLst>
+        </p:spPr>
+      </p:pic>
+      <p:sp>
+        <p:nvSpPr>
+          <p:cNvPr id="61" name="Rectangle 60">
+            <a:extLst>
+              <a:ext uri="{FF2B5EF4-FFF2-40B4-BE49-F238E27FC236}">
+                <a16:creationId xmlns:a16="http://schemas.microsoft.com/office/drawing/2014/main" id="{D5050CA6-AE2F-FD4D-9A51-EACC6C5B2016}"/>
+              </a:ext>
+            </a:extLst>
+          </p:cNvPr>
+          <p:cNvSpPr/>
+          <p:nvPr/>
+        </p:nvSpPr>
+        <p:spPr>
+          <a:xfrm>
+            <a:off x="10118109" y="5328548"/>
+            <a:ext cx="1688865" cy="1047432"/>
+          </a:xfrm>
+          <a:prstGeom prst="rect">
+            <a:avLst/>
+          </a:prstGeom>
+          <a:solidFill>
+            <a:schemeClr val="bg2">
+              <a:lumMod val="75000"/>
+            </a:schemeClr>
+          </a:solidFill>
+          <a:ln>
+            <a:noFill/>
+          </a:ln>
+        </p:spPr>
+        <p:style>
+          <a:lnRef idx="2">
+            <a:schemeClr val="accent1">
+              <a:shade val="50000"/>
+            </a:schemeClr>
+          </a:lnRef>
+          <a:fillRef idx="1">
+            <a:schemeClr val="accent1"/>
+          </a:fillRef>
+          <a:effectRef idx="0">
+            <a:schemeClr val="accent1"/>
+          </a:effectRef>
+          <a:fontRef idx="minor">
+            <a:schemeClr val="lt1"/>
+          </a:fontRef>
+        </p:style>
+        <p:txBody>
+          <a:bodyPr rtlCol="0" anchor="ctr"/>
+          <a:lstStyle/>
+          <a:p>
+            <a:pPr algn="ctr"/>
+            <a:r>
+              <a:rPr lang="en-US" sz="1600" dirty="0"/>
+              <a:t>Reefer Maintenance Business Process</a:t>
+            </a:r>
+          </a:p>
+        </p:txBody>
+      </p:sp>
+      <p:cxnSp>
+        <p:nvCxnSpPr>
+          <p:cNvPr id="62" name="Elbow Connector 61">
+            <a:extLst>
+              <a:ext uri="{FF2B5EF4-FFF2-40B4-BE49-F238E27FC236}">
+                <a16:creationId xmlns:a16="http://schemas.microsoft.com/office/drawing/2014/main" id="{36EFE182-9BB6-A145-A214-232557BE7242}"/>
+              </a:ext>
+            </a:extLst>
+          </p:cNvPr>
+          <p:cNvCxnSpPr>
+            <a:cxnSpLocks/>
+            <a:stCxn id="41" idx="3"/>
+            <a:endCxn id="61" idx="1"/>
+          </p:cNvCxnSpPr>
+          <p:nvPr/>
+        </p:nvCxnSpPr>
+        <p:spPr>
+          <a:xfrm flipV="1">
+            <a:off x="9395301" y="5852264"/>
+            <a:ext cx="722808" cy="33227"/>
+          </a:xfrm>
+          <a:prstGeom prst="bentConnector3">
+            <a:avLst>
+              <a:gd name="adj1" fmla="val 50000"/>
+            </a:avLst>
+          </a:prstGeom>
+          <a:ln w="25400">
+            <a:solidFill>
+              <a:srgbClr val="7030A0"/>
+            </a:solidFill>
+            <a:prstDash val="solid"/>
+            <a:tailEnd type="triangle"/>
+          </a:ln>
+        </p:spPr>
+        <p:style>
+          <a:lnRef idx="1">
+            <a:schemeClr val="accent1"/>
+          </a:lnRef>
+          <a:fillRef idx="0">
+            <a:schemeClr val="accent1"/>
+          </a:fillRef>
+          <a:effectRef idx="0">
+            <a:schemeClr val="accent1"/>
+          </a:effectRef>
+          <a:fontRef idx="minor">
+            <a:schemeClr val="tx1"/>
+          </a:fontRef>
+        </p:style>
+      </p:cxnSp>
+      <p:sp>
+        <p:nvSpPr>
+          <p:cNvPr id="64" name="Oval 63">
+            <a:extLst>
+              <a:ext uri="{FF2B5EF4-FFF2-40B4-BE49-F238E27FC236}">
+                <a16:creationId xmlns:a16="http://schemas.microsoft.com/office/drawing/2014/main" id="{B9A41D53-F4C6-064E-94AF-30C02D9F7034}"/>
+              </a:ext>
+            </a:extLst>
+          </p:cNvPr>
+          <p:cNvSpPr/>
+          <p:nvPr/>
+        </p:nvSpPr>
+        <p:spPr>
+          <a:xfrm>
+            <a:off x="11446485" y="4901783"/>
+            <a:ext cx="493464" cy="493464"/>
+          </a:xfrm>
+          <a:prstGeom prst="ellipse">
+            <a:avLst/>
+          </a:prstGeom>
+          <a:solidFill>
+            <a:schemeClr val="tx2">
+              <a:lumMod val="75000"/>
+            </a:schemeClr>
+          </a:solidFill>
+          <a:ln>
+            <a:noFill/>
+          </a:ln>
+        </p:spPr>
+        <p:style>
+          <a:lnRef idx="2">
+            <a:schemeClr val="accent1">
+              <a:shade val="50000"/>
+            </a:schemeClr>
+          </a:lnRef>
+          <a:fillRef idx="1">
+            <a:schemeClr val="accent1"/>
+          </a:fillRef>
+          <a:effectRef idx="0">
+            <a:schemeClr val="accent1"/>
+          </a:effectRef>
+          <a:fontRef idx="minor">
+            <a:schemeClr val="lt1"/>
+          </a:fontRef>
+        </p:style>
+        <p:txBody>
+          <a:bodyPr rtlCol="0" anchor="ctr"/>
+          <a:lstStyle/>
+          <a:p>
+            <a:pPr algn="ctr"/>
+            <a:r>
+              <a:rPr lang="en-US" sz="1400" dirty="0"/>
+              <a:t>7</a:t>
+            </a:r>
+          </a:p>
+        </p:txBody>
+      </p:sp>
+      <p:pic>
+        <p:nvPicPr>
+          <p:cNvPr id="65" name="Picture 64">
+            <a:extLst>
+              <a:ext uri="{FF2B5EF4-FFF2-40B4-BE49-F238E27FC236}">
+                <a16:creationId xmlns:a16="http://schemas.microsoft.com/office/drawing/2014/main" id="{FDDB9C6D-D2CF-384E-997C-471676C2C05F}"/>
+              </a:ext>
+            </a:extLst>
+          </p:cNvPr>
+          <p:cNvPicPr>
+            <a:picLocks noChangeAspect="1"/>
+          </p:cNvPicPr>
+          <p:nvPr/>
+        </p:nvPicPr>
+        <p:blipFill>
+          <a:blip r:embed="rId8"/>
+          <a:stretch>
+            <a:fillRect/>
+          </a:stretch>
+        </p:blipFill>
+        <p:spPr>
+          <a:xfrm>
+            <a:off x="83518" y="3848118"/>
+            <a:ext cx="280628" cy="256574"/>
+          </a:xfrm>
+          <a:prstGeom prst="rect">
+            <a:avLst/>
+          </a:prstGeom>
+        </p:spPr>
+      </p:pic>
+      <p:pic>
+        <p:nvPicPr>
+          <p:cNvPr id="66" name="Picture 65">
+            <a:extLst>
+              <a:ext uri="{FF2B5EF4-FFF2-40B4-BE49-F238E27FC236}">
+                <a16:creationId xmlns:a16="http://schemas.microsoft.com/office/drawing/2014/main" id="{C1A7F551-9939-0B40-AA4F-AC94036B5EA2}"/>
+              </a:ext>
+            </a:extLst>
+          </p:cNvPr>
+          <p:cNvPicPr>
+            <a:picLocks noChangeAspect="1"/>
+          </p:cNvPicPr>
+          <p:nvPr/>
+        </p:nvPicPr>
+        <p:blipFill>
+          <a:blip r:embed="rId8"/>
+          <a:stretch>
+            <a:fillRect/>
+          </a:stretch>
+        </p:blipFill>
+        <p:spPr>
+          <a:xfrm>
+            <a:off x="8704168" y="2450668"/>
+            <a:ext cx="280628" cy="256574"/>
+          </a:xfrm>
+          <a:prstGeom prst="rect">
+            <a:avLst/>
+          </a:prstGeom>
+        </p:spPr>
+      </p:pic>
+      <p:pic>
+        <p:nvPicPr>
+          <p:cNvPr id="70" name="Picture 69">
+            <a:extLst>
+              <a:ext uri="{FF2B5EF4-FFF2-40B4-BE49-F238E27FC236}">
+                <a16:creationId xmlns:a16="http://schemas.microsoft.com/office/drawing/2014/main" id="{2372E1AB-BAD1-F640-9665-3226BECA96C6}"/>
+              </a:ext>
+            </a:extLst>
+          </p:cNvPr>
+          <p:cNvPicPr>
+            <a:picLocks noChangeAspect="1"/>
+          </p:cNvPicPr>
+          <p:nvPr/>
+        </p:nvPicPr>
+        <p:blipFill>
+          <a:blip r:embed="rId8"/>
+          <a:stretch>
+            <a:fillRect/>
+          </a:stretch>
+        </p:blipFill>
+        <p:spPr>
+          <a:xfrm>
+            <a:off x="7591730" y="6243733"/>
+            <a:ext cx="280628" cy="256574"/>
+          </a:xfrm>
+          <a:prstGeom prst="rect">
+            <a:avLst/>
+          </a:prstGeom>
+        </p:spPr>
+      </p:pic>
+      <p:pic>
+        <p:nvPicPr>
+          <p:cNvPr id="71" name="Picture 70">
+            <a:extLst>
+              <a:ext uri="{FF2B5EF4-FFF2-40B4-BE49-F238E27FC236}">
+                <a16:creationId xmlns:a16="http://schemas.microsoft.com/office/drawing/2014/main" id="{BCB3DBEB-364D-124D-BB12-D4D28D96D356}"/>
+              </a:ext>
+            </a:extLst>
+          </p:cNvPr>
+          <p:cNvPicPr>
+            <a:picLocks noChangeAspect="1"/>
+          </p:cNvPicPr>
+          <p:nvPr/>
+        </p:nvPicPr>
+        <p:blipFill>
+          <a:blip r:embed="rId9"/>
+          <a:stretch>
+            <a:fillRect/>
+          </a:stretch>
+        </p:blipFill>
+        <p:spPr>
+          <a:xfrm>
+            <a:off x="9067394" y="6117486"/>
+            <a:ext cx="442613" cy="442613"/>
+          </a:xfrm>
+          <a:prstGeom prst="rect">
+            <a:avLst/>
+          </a:prstGeom>
+        </p:spPr>
+      </p:pic>
+      <p:pic>
+        <p:nvPicPr>
+          <p:cNvPr id="37" name="Picture 36">
+            <a:extLst>
+              <a:ext uri="{FF2B5EF4-FFF2-40B4-BE49-F238E27FC236}">
+                <a16:creationId xmlns:a16="http://schemas.microsoft.com/office/drawing/2014/main" id="{FEF2F464-669F-F441-9649-9249CE160C59}"/>
+              </a:ext>
+            </a:extLst>
+          </p:cNvPr>
+          <p:cNvPicPr>
+            <a:picLocks noChangeAspect="1"/>
+          </p:cNvPicPr>
+          <p:nvPr/>
+        </p:nvPicPr>
+        <p:blipFill>
+          <a:blip r:embed="rId10"/>
+          <a:stretch>
+            <a:fillRect/>
+          </a:stretch>
+        </p:blipFill>
+        <p:spPr>
+          <a:xfrm>
+            <a:off x="11446485" y="6121893"/>
+            <a:ext cx="539648" cy="539648"/>
+          </a:xfrm>
+          <a:prstGeom prst="rect">
+            <a:avLst/>
+          </a:prstGeom>
+        </p:spPr>
+      </p:pic>
+      <p:pic>
+        <p:nvPicPr>
+          <p:cNvPr id="74" name="Picture 73">
+            <a:extLst>
+              <a:ext uri="{FF2B5EF4-FFF2-40B4-BE49-F238E27FC236}">
+                <a16:creationId xmlns:a16="http://schemas.microsoft.com/office/drawing/2014/main" id="{858EDC7C-8111-2E41-8EF6-139882BC04DE}"/>
+              </a:ext>
+            </a:extLst>
+          </p:cNvPr>
+          <p:cNvPicPr>
+            <a:picLocks noChangeAspect="1"/>
+          </p:cNvPicPr>
+          <p:nvPr/>
+        </p:nvPicPr>
+        <p:blipFill>
+          <a:blip r:embed="rId6"/>
+          <a:stretch>
+            <a:fillRect/>
+          </a:stretch>
+        </p:blipFill>
+        <p:spPr>
+          <a:xfrm>
+            <a:off x="7899573" y="2450782"/>
+            <a:ext cx="806955" cy="323116"/>
+          </a:xfrm>
+          <a:prstGeom prst="rect">
+            <a:avLst/>
+          </a:prstGeom>
         </p:spPr>
       </p:pic>
     </p:spTree>

</xml_diff>

<commit_message>
Deployed 19aafde with MkDocs version: 1.0.4
</commit_message>
<xml_diff>
--- a/diagrams.pptx
+++ b/diagrams.pptx
@@ -6,14 +6,15 @@
     <p:sldMasterId id="2147484308" r:id="rId2"/>
   </p:sldMasterIdLst>
   <p:notesMasterIdLst>
-    <p:notesMasterId r:id="rId8"/>
+    <p:notesMasterId r:id="rId9"/>
   </p:notesMasterIdLst>
   <p:sldIdLst>
     <p:sldId id="141168470" r:id="rId3"/>
-    <p:sldId id="2783" r:id="rId4"/>
-    <p:sldId id="2801" r:id="rId5"/>
-    <p:sldId id="2799" r:id="rId6"/>
-    <p:sldId id="2800" r:id="rId7"/>
+    <p:sldId id="141168471" r:id="rId4"/>
+    <p:sldId id="2783" r:id="rId5"/>
+    <p:sldId id="2801" r:id="rId6"/>
+    <p:sldId id="2799" r:id="rId7"/>
+    <p:sldId id="2800" r:id="rId8"/>
   </p:sldIdLst>
   <p:sldSz cx="12192000" cy="6858000"/>
   <p:notesSz cx="7086600" cy="9372600"/>
@@ -725,7 +726,7 @@
                 <a:tabLst/>
                 <a:defRPr/>
               </a:pPr>
-              <a:t>2</a:t>
+              <a:t>3</a:t>
             </a:fld>
             <a:endParaRPr kumimoji="0" lang="en-US" sz="1200" b="0" i="0" u="none" strike="noStrike" kern="1200" cap="none" spc="0" normalizeH="0" baseline="0" noProof="0">
               <a:ln>
@@ -837,7 +838,7 @@
               <a:pPr>
                 <a:defRPr/>
               </a:pPr>
-              <a:t>3</a:t>
+              <a:t>4</a:t>
             </a:fld>
             <a:endParaRPr lang="en-US" altLang="en-US" dirty="0"/>
           </a:p>
@@ -8512,6 +8513,792 @@
           <p:cNvPr id="2" name="Title 1">
             <a:extLst>
               <a:ext uri="{FF2B5EF4-FFF2-40B4-BE49-F238E27FC236}">
+                <a16:creationId xmlns:a16="http://schemas.microsoft.com/office/drawing/2014/main" id="{D315EF5C-228B-5845-84E6-0CFA2693B2CE}"/>
+              </a:ext>
+            </a:extLst>
+          </p:cNvPr>
+          <p:cNvSpPr>
+            <a:spLocks noGrp="1"/>
+          </p:cNvSpPr>
+          <p:nvPr>
+            <p:ph type="title"/>
+          </p:nvPr>
+        </p:nvSpPr>
+        <p:spPr/>
+        <p:txBody>
+          <a:bodyPr/>
+          <a:lstStyle/>
+          <a:p>
+            <a:r>
+              <a:rPr lang="en-US" dirty="0"/>
+              <a:t>Cloud Pak Solution</a:t>
+            </a:r>
+          </a:p>
+        </p:txBody>
+      </p:sp>
+      <p:sp>
+        <p:nvSpPr>
+          <p:cNvPr id="4" name="Slide Number Placeholder 3">
+            <a:extLst>
+              <a:ext uri="{FF2B5EF4-FFF2-40B4-BE49-F238E27FC236}">
+                <a16:creationId xmlns:a16="http://schemas.microsoft.com/office/drawing/2014/main" id="{FB3FF1DE-439B-5D41-A9C1-2BC36D573C38}"/>
+              </a:ext>
+            </a:extLst>
+          </p:cNvPr>
+          <p:cNvSpPr>
+            <a:spLocks noGrp="1"/>
+          </p:cNvSpPr>
+          <p:nvPr>
+            <p:ph type="sldNum" sz="quarter" idx="2"/>
+          </p:nvPr>
+        </p:nvSpPr>
+        <p:spPr/>
+        <p:txBody>
+          <a:bodyPr/>
+          <a:lstStyle/>
+          <a:p>
+            <a:fld id="{86CB4B4D-7CA3-9044-876B-883B54F8677D}" type="slidenum">
+              <a:rPr lang="en-US" smtClean="0"/>
+              <a:pPr/>
+              <a:t>2</a:t>
+            </a:fld>
+            <a:endParaRPr lang="en-US"/>
+          </a:p>
+        </p:txBody>
+      </p:sp>
+      <p:sp>
+        <p:nvSpPr>
+          <p:cNvPr id="5" name="AutoShape 4">
+            <a:extLst>
+              <a:ext uri="{FF2B5EF4-FFF2-40B4-BE49-F238E27FC236}">
+                <a16:creationId xmlns:a16="http://schemas.microsoft.com/office/drawing/2014/main" id="{684E09B8-BBC1-064E-8FF3-CD8302D16690}"/>
+              </a:ext>
+            </a:extLst>
+          </p:cNvPr>
+          <p:cNvSpPr>
+            <a:spLocks noChangeArrowheads="1"/>
+          </p:cNvSpPr>
+          <p:nvPr/>
+        </p:nvSpPr>
+        <p:spPr bwMode="auto">
+          <a:xfrm>
+            <a:off x="2871371" y="5150367"/>
+            <a:ext cx="4545428" cy="680686"/>
+          </a:xfrm>
+          <a:prstGeom prst="roundRect">
+            <a:avLst>
+              <a:gd name="adj" fmla="val 7117"/>
+            </a:avLst>
+          </a:prstGeom>
+          <a:noFill/>
+          <a:ln w="12700">
+            <a:solidFill>
+              <a:srgbClr val="5596E6">
+                <a:lumMod val="50000"/>
+              </a:srgbClr>
+            </a:solidFill>
+            <a:prstDash val="dash"/>
+            <a:round/>
+            <a:headEnd/>
+            <a:tailEnd/>
+          </a:ln>
+        </p:spPr>
+        <p:txBody>
+          <a:bodyPr lIns="0" tIns="0" rIns="0" bIns="0" anchor="b" anchorCtr="1"/>
+          <a:lstStyle/>
+          <a:p>
+            <a:pPr algn="ctr" defTabSz="1219170" eaLnBrk="1" fontAlgn="auto" hangingPunct="1">
+              <a:spcBef>
+                <a:spcPts val="0"/>
+              </a:spcBef>
+              <a:spcAft>
+                <a:spcPts val="0"/>
+              </a:spcAft>
+              <a:defRPr/>
+            </a:pPr>
+            <a:r>
+              <a:rPr lang="en-US" sz="1333" kern="0" dirty="0">
+                <a:solidFill>
+                  <a:srgbClr val="6D7777"/>
+                </a:solidFill>
+              </a:rPr>
+              <a:t>Infrastructure</a:t>
+            </a:r>
+          </a:p>
+        </p:txBody>
+      </p:sp>
+      <p:pic>
+        <p:nvPicPr>
+          <p:cNvPr id="6" name="Picture 5">
+            <a:extLst>
+              <a:ext uri="{FF2B5EF4-FFF2-40B4-BE49-F238E27FC236}">
+                <a16:creationId xmlns:a16="http://schemas.microsoft.com/office/drawing/2014/main" id="{07AC0BFF-594E-D943-9423-6F5BB0B092D4}"/>
+              </a:ext>
+            </a:extLst>
+          </p:cNvPr>
+          <p:cNvPicPr>
+            <a:picLocks noChangeAspect="1"/>
+          </p:cNvPicPr>
+          <p:nvPr/>
+        </p:nvPicPr>
+        <p:blipFill>
+          <a:blip r:embed="rId2"/>
+          <a:stretch>
+            <a:fillRect/>
+          </a:stretch>
+        </p:blipFill>
+        <p:spPr>
+          <a:xfrm>
+            <a:off x="4030042" y="5259975"/>
+            <a:ext cx="388273" cy="354992"/>
+          </a:xfrm>
+          <a:prstGeom prst="rect">
+            <a:avLst/>
+          </a:prstGeom>
+        </p:spPr>
+      </p:pic>
+      <p:pic>
+        <p:nvPicPr>
+          <p:cNvPr id="7" name="Picture 6">
+            <a:extLst>
+              <a:ext uri="{FF2B5EF4-FFF2-40B4-BE49-F238E27FC236}">
+                <a16:creationId xmlns:a16="http://schemas.microsoft.com/office/drawing/2014/main" id="{34E902ED-15BC-414A-8ABD-63DB888CC4B7}"/>
+              </a:ext>
+            </a:extLst>
+          </p:cNvPr>
+          <p:cNvPicPr>
+            <a:picLocks noChangeAspect="1"/>
+          </p:cNvPicPr>
+          <p:nvPr/>
+        </p:nvPicPr>
+        <p:blipFill>
+          <a:blip r:embed="rId3"/>
+          <a:stretch>
+            <a:fillRect/>
+          </a:stretch>
+        </p:blipFill>
+        <p:spPr>
+          <a:xfrm>
+            <a:off x="5688009" y="5259975"/>
+            <a:ext cx="459096" cy="393976"/>
+          </a:xfrm>
+          <a:prstGeom prst="rect">
+            <a:avLst/>
+          </a:prstGeom>
+        </p:spPr>
+      </p:pic>
+      <p:sp>
+        <p:nvSpPr>
+          <p:cNvPr id="11" name="AutoShape 4">
+            <a:extLst>
+              <a:ext uri="{FF2B5EF4-FFF2-40B4-BE49-F238E27FC236}">
+                <a16:creationId xmlns:a16="http://schemas.microsoft.com/office/drawing/2014/main" id="{C64ABD7E-5043-7340-8CC0-841277EF50A1}"/>
+              </a:ext>
+            </a:extLst>
+          </p:cNvPr>
+          <p:cNvSpPr>
+            <a:spLocks noChangeArrowheads="1"/>
+          </p:cNvSpPr>
+          <p:nvPr/>
+        </p:nvSpPr>
+        <p:spPr bwMode="auto">
+          <a:xfrm>
+            <a:off x="2871370" y="3448935"/>
+            <a:ext cx="4545429" cy="1396809"/>
+          </a:xfrm>
+          <a:prstGeom prst="roundRect">
+            <a:avLst>
+              <a:gd name="adj" fmla="val 7117"/>
+            </a:avLst>
+          </a:prstGeom>
+          <a:noFill/>
+          <a:ln w="12700">
+            <a:solidFill>
+              <a:srgbClr val="5596E6">
+                <a:lumMod val="50000"/>
+              </a:srgbClr>
+            </a:solidFill>
+            <a:prstDash val="dash"/>
+            <a:round/>
+            <a:headEnd/>
+            <a:tailEnd/>
+          </a:ln>
+        </p:spPr>
+        <p:txBody>
+          <a:bodyPr lIns="0" tIns="0" rIns="0" bIns="0" anchor="b" anchorCtr="1"/>
+          <a:lstStyle/>
+          <a:p>
+            <a:pPr algn="ctr" defTabSz="1219170" eaLnBrk="1" fontAlgn="auto" hangingPunct="1">
+              <a:spcBef>
+                <a:spcPts val="0"/>
+              </a:spcBef>
+              <a:spcAft>
+                <a:spcPts val="0"/>
+              </a:spcAft>
+              <a:defRPr/>
+            </a:pPr>
+            <a:r>
+              <a:rPr lang="en-US" sz="1333" kern="0" dirty="0">
+                <a:solidFill>
+                  <a:srgbClr val="6D7777"/>
+                </a:solidFill>
+              </a:rPr>
+              <a:t>Cloud Pak</a:t>
+            </a:r>
+          </a:p>
+        </p:txBody>
+      </p:sp>
+      <p:pic>
+        <p:nvPicPr>
+          <p:cNvPr id="12" name="Picture 11">
+            <a:extLst>
+              <a:ext uri="{FF2B5EF4-FFF2-40B4-BE49-F238E27FC236}">
+                <a16:creationId xmlns:a16="http://schemas.microsoft.com/office/drawing/2014/main" id="{284F2826-9DD2-6844-A9BB-E8BD4E975704}"/>
+              </a:ext>
+            </a:extLst>
+          </p:cNvPr>
+          <p:cNvPicPr>
+            <a:picLocks noChangeAspect="1"/>
+          </p:cNvPicPr>
+          <p:nvPr/>
+        </p:nvPicPr>
+        <p:blipFill>
+          <a:blip r:embed="rId4"/>
+          <a:stretch>
+            <a:fillRect/>
+          </a:stretch>
+        </p:blipFill>
+        <p:spPr>
+          <a:xfrm>
+            <a:off x="4081744" y="3679244"/>
+            <a:ext cx="673143" cy="879207"/>
+          </a:xfrm>
+          <a:prstGeom prst="rect">
+            <a:avLst/>
+          </a:prstGeom>
+        </p:spPr>
+      </p:pic>
+      <p:pic>
+        <p:nvPicPr>
+          <p:cNvPr id="13" name="Picture 12">
+            <a:extLst>
+              <a:ext uri="{FF2B5EF4-FFF2-40B4-BE49-F238E27FC236}">
+                <a16:creationId xmlns:a16="http://schemas.microsoft.com/office/drawing/2014/main" id="{2A7B4D3D-90CA-AA4F-8F1C-0D90C3E86276}"/>
+              </a:ext>
+            </a:extLst>
+          </p:cNvPr>
+          <p:cNvPicPr>
+            <a:picLocks noChangeAspect="1"/>
+          </p:cNvPicPr>
+          <p:nvPr/>
+        </p:nvPicPr>
+        <p:blipFill>
+          <a:blip r:embed="rId5"/>
+          <a:stretch>
+            <a:fillRect/>
+          </a:stretch>
+        </p:blipFill>
+        <p:spPr>
+          <a:xfrm>
+            <a:off x="3088358" y="3679245"/>
+            <a:ext cx="790605" cy="879207"/>
+          </a:xfrm>
+          <a:prstGeom prst="rect">
+            <a:avLst/>
+          </a:prstGeom>
+        </p:spPr>
+      </p:pic>
+      <p:sp>
+        <p:nvSpPr>
+          <p:cNvPr id="14" name="Rectangle 13">
+            <a:extLst>
+              <a:ext uri="{FF2B5EF4-FFF2-40B4-BE49-F238E27FC236}">
+                <a16:creationId xmlns:a16="http://schemas.microsoft.com/office/drawing/2014/main" id="{283526CE-4AF1-0D4C-AFB2-25875AF70D6E}"/>
+              </a:ext>
+            </a:extLst>
+          </p:cNvPr>
+          <p:cNvSpPr/>
+          <p:nvPr/>
+        </p:nvSpPr>
+        <p:spPr>
+          <a:xfrm>
+            <a:off x="4803212" y="2189569"/>
+            <a:ext cx="1176988" cy="493916"/>
+          </a:xfrm>
+          <a:prstGeom prst="rect">
+            <a:avLst/>
+          </a:prstGeom>
+          <a:solidFill>
+            <a:schemeClr val="bg1">
+              <a:lumMod val="65000"/>
+            </a:schemeClr>
+          </a:solidFill>
+          <a:ln>
+            <a:noFill/>
+          </a:ln>
+          <a:effectLst>
+            <a:outerShdw blurRad="50800" dist="38100" dir="5400000" algn="t" rotWithShape="0">
+              <a:prstClr val="black">
+                <a:alpha val="40000"/>
+              </a:prstClr>
+            </a:outerShdw>
+          </a:effectLst>
+        </p:spPr>
+        <p:style>
+          <a:lnRef idx="2">
+            <a:schemeClr val="accent1">
+              <a:shade val="50000"/>
+            </a:schemeClr>
+          </a:lnRef>
+          <a:fillRef idx="1">
+            <a:schemeClr val="accent1"/>
+          </a:fillRef>
+          <a:effectRef idx="0">
+            <a:schemeClr val="accent1"/>
+          </a:effectRef>
+          <a:fontRef idx="minor">
+            <a:schemeClr val="lt1"/>
+          </a:fontRef>
+        </p:style>
+        <p:txBody>
+          <a:bodyPr rtlCol="0" anchor="ctr"/>
+          <a:lstStyle/>
+          <a:p>
+            <a:pPr algn="ctr" defTabSz="914377" eaLnBrk="1" fontAlgn="auto" hangingPunct="1">
+              <a:spcBef>
+                <a:spcPts val="0"/>
+              </a:spcBef>
+              <a:spcAft>
+                <a:spcPts val="0"/>
+              </a:spcAft>
+            </a:pPr>
+            <a:r>
+              <a:rPr lang="en-US" sz="1100" dirty="0">
+                <a:solidFill>
+                  <a:schemeClr val="bg1"/>
+                </a:solidFill>
+                <a:latin typeface="Arial"/>
+              </a:rPr>
+              <a:t>BPM app</a:t>
+            </a:r>
+          </a:p>
+        </p:txBody>
+      </p:sp>
+      <p:sp>
+        <p:nvSpPr>
+          <p:cNvPr id="15" name="AutoShape 4">
+            <a:extLst>
+              <a:ext uri="{FF2B5EF4-FFF2-40B4-BE49-F238E27FC236}">
+                <a16:creationId xmlns:a16="http://schemas.microsoft.com/office/drawing/2014/main" id="{A74B6BBF-B7A7-804F-AA37-AA6548F50D71}"/>
+              </a:ext>
+            </a:extLst>
+          </p:cNvPr>
+          <p:cNvSpPr>
+            <a:spLocks noChangeArrowheads="1"/>
+          </p:cNvSpPr>
+          <p:nvPr/>
+        </p:nvSpPr>
+        <p:spPr bwMode="auto">
+          <a:xfrm>
+            <a:off x="2590800" y="1738123"/>
+            <a:ext cx="4825999" cy="1396809"/>
+          </a:xfrm>
+          <a:prstGeom prst="roundRect">
+            <a:avLst>
+              <a:gd name="adj" fmla="val 7117"/>
+            </a:avLst>
+          </a:prstGeom>
+          <a:noFill/>
+          <a:ln w="12700">
+            <a:solidFill>
+              <a:srgbClr val="5596E6">
+                <a:lumMod val="50000"/>
+              </a:srgbClr>
+            </a:solidFill>
+            <a:prstDash val="dash"/>
+            <a:round/>
+            <a:headEnd/>
+            <a:tailEnd/>
+          </a:ln>
+        </p:spPr>
+        <p:txBody>
+          <a:bodyPr lIns="0" tIns="0" rIns="0" bIns="0" anchor="b" anchorCtr="1"/>
+          <a:lstStyle/>
+          <a:p>
+            <a:pPr algn="ctr" defTabSz="1219170" eaLnBrk="1" fontAlgn="auto" hangingPunct="1">
+              <a:spcBef>
+                <a:spcPts val="0"/>
+              </a:spcBef>
+              <a:spcAft>
+                <a:spcPts val="0"/>
+              </a:spcAft>
+              <a:defRPr/>
+            </a:pPr>
+            <a:r>
+              <a:rPr lang="en-US" sz="1333" kern="0" dirty="0">
+                <a:solidFill>
+                  <a:srgbClr val="6D7777"/>
+                </a:solidFill>
+              </a:rPr>
+              <a:t>Application</a:t>
+            </a:r>
+          </a:p>
+        </p:txBody>
+      </p:sp>
+      <p:pic>
+        <p:nvPicPr>
+          <p:cNvPr id="16" name="Picture 15">
+            <a:extLst>
+              <a:ext uri="{FF2B5EF4-FFF2-40B4-BE49-F238E27FC236}">
+                <a16:creationId xmlns:a16="http://schemas.microsoft.com/office/drawing/2014/main" id="{E69F41A8-F3D6-584C-82B4-CB399C23B4A1}"/>
+              </a:ext>
+            </a:extLst>
+          </p:cNvPr>
+          <p:cNvPicPr>
+            <a:picLocks noChangeAspect="1"/>
+          </p:cNvPicPr>
+          <p:nvPr/>
+        </p:nvPicPr>
+        <p:blipFill>
+          <a:blip r:embed="rId6"/>
+          <a:stretch>
+            <a:fillRect/>
+          </a:stretch>
+        </p:blipFill>
+        <p:spPr>
+          <a:xfrm flipV="1">
+            <a:off x="988010" y="1886314"/>
+            <a:ext cx="1344689" cy="880532"/>
+          </a:xfrm>
+          <a:prstGeom prst="rect">
+            <a:avLst/>
+          </a:prstGeom>
+        </p:spPr>
+      </p:pic>
+      <p:pic>
+        <p:nvPicPr>
+          <p:cNvPr id="17" name="Picture 16">
+            <a:extLst>
+              <a:ext uri="{FF2B5EF4-FFF2-40B4-BE49-F238E27FC236}">
+                <a16:creationId xmlns:a16="http://schemas.microsoft.com/office/drawing/2014/main" id="{9DDF994C-5DE9-2A45-B3A5-92F9C720F89A}"/>
+              </a:ext>
+            </a:extLst>
+          </p:cNvPr>
+          <p:cNvPicPr>
+            <a:picLocks noChangeAspect="1"/>
+          </p:cNvPicPr>
+          <p:nvPr/>
+        </p:nvPicPr>
+        <p:blipFill>
+          <a:blip r:embed="rId7"/>
+          <a:stretch>
+            <a:fillRect/>
+          </a:stretch>
+        </p:blipFill>
+        <p:spPr>
+          <a:xfrm>
+            <a:off x="4955677" y="3679244"/>
+            <a:ext cx="872059" cy="879207"/>
+          </a:xfrm>
+          <a:prstGeom prst="rect">
+            <a:avLst/>
+          </a:prstGeom>
+        </p:spPr>
+      </p:pic>
+      <p:sp>
+        <p:nvSpPr>
+          <p:cNvPr id="19" name="Rectangle 18">
+            <a:extLst>
+              <a:ext uri="{FF2B5EF4-FFF2-40B4-BE49-F238E27FC236}">
+                <a16:creationId xmlns:a16="http://schemas.microsoft.com/office/drawing/2014/main" id="{D4819155-2316-6B42-9EA8-E0B6095A1869}"/>
+              </a:ext>
+            </a:extLst>
+          </p:cNvPr>
+          <p:cNvSpPr/>
+          <p:nvPr/>
+        </p:nvSpPr>
+        <p:spPr>
+          <a:xfrm>
+            <a:off x="6096000" y="2179222"/>
+            <a:ext cx="1176988" cy="493916"/>
+          </a:xfrm>
+          <a:prstGeom prst="rect">
+            <a:avLst/>
+          </a:prstGeom>
+          <a:solidFill>
+            <a:schemeClr val="bg1">
+              <a:lumMod val="65000"/>
+            </a:schemeClr>
+          </a:solidFill>
+          <a:ln>
+            <a:noFill/>
+          </a:ln>
+          <a:effectLst>
+            <a:outerShdw blurRad="50800" dist="38100" dir="5400000" algn="t" rotWithShape="0">
+              <a:prstClr val="black">
+                <a:alpha val="40000"/>
+              </a:prstClr>
+            </a:outerShdw>
+          </a:effectLst>
+        </p:spPr>
+        <p:style>
+          <a:lnRef idx="2">
+            <a:schemeClr val="accent1">
+              <a:shade val="50000"/>
+            </a:schemeClr>
+          </a:lnRef>
+          <a:fillRef idx="1">
+            <a:schemeClr val="accent1"/>
+          </a:fillRef>
+          <a:effectRef idx="0">
+            <a:schemeClr val="accent1"/>
+          </a:effectRef>
+          <a:fontRef idx="minor">
+            <a:schemeClr val="lt1"/>
+          </a:fontRef>
+        </p:style>
+        <p:txBody>
+          <a:bodyPr rtlCol="0" anchor="ctr"/>
+          <a:lstStyle/>
+          <a:p>
+            <a:pPr algn="ctr" defTabSz="914377" eaLnBrk="1" fontAlgn="auto" hangingPunct="1">
+              <a:spcBef>
+                <a:spcPts val="0"/>
+              </a:spcBef>
+              <a:spcAft>
+                <a:spcPts val="0"/>
+              </a:spcAft>
+            </a:pPr>
+            <a:r>
+              <a:rPr lang="en-US" sz="1100" dirty="0">
+                <a:solidFill>
+                  <a:schemeClr val="bg1"/>
+                </a:solidFill>
+                <a:latin typeface="Arial"/>
+              </a:rPr>
+              <a:t>Container MS</a:t>
+            </a:r>
+          </a:p>
+        </p:txBody>
+      </p:sp>
+      <p:sp>
+        <p:nvSpPr>
+          <p:cNvPr id="20" name="Rectangle 19">
+            <a:extLst>
+              <a:ext uri="{FF2B5EF4-FFF2-40B4-BE49-F238E27FC236}">
+                <a16:creationId xmlns:a16="http://schemas.microsoft.com/office/drawing/2014/main" id="{0548C9A6-D4D7-3B41-A314-52FC7BECD26B}"/>
+              </a:ext>
+            </a:extLst>
+          </p:cNvPr>
+          <p:cNvSpPr/>
+          <p:nvPr/>
+        </p:nvSpPr>
+        <p:spPr>
+          <a:xfrm>
+            <a:off x="3483660" y="2179222"/>
+            <a:ext cx="1176988" cy="493916"/>
+          </a:xfrm>
+          <a:prstGeom prst="rect">
+            <a:avLst/>
+          </a:prstGeom>
+          <a:solidFill>
+            <a:schemeClr val="bg1">
+              <a:lumMod val="65000"/>
+            </a:schemeClr>
+          </a:solidFill>
+          <a:ln>
+            <a:noFill/>
+          </a:ln>
+          <a:effectLst>
+            <a:outerShdw blurRad="50800" dist="38100" dir="5400000" algn="t" rotWithShape="0">
+              <a:prstClr val="black">
+                <a:alpha val="40000"/>
+              </a:prstClr>
+            </a:outerShdw>
+          </a:effectLst>
+        </p:spPr>
+        <p:style>
+          <a:lnRef idx="2">
+            <a:schemeClr val="accent1">
+              <a:shade val="50000"/>
+            </a:schemeClr>
+          </a:lnRef>
+          <a:fillRef idx="1">
+            <a:schemeClr val="accent1"/>
+          </a:fillRef>
+          <a:effectRef idx="0">
+            <a:schemeClr val="accent1"/>
+          </a:effectRef>
+          <a:fontRef idx="minor">
+            <a:schemeClr val="lt1"/>
+          </a:fontRef>
+        </p:style>
+        <p:txBody>
+          <a:bodyPr rtlCol="0" anchor="ctr"/>
+          <a:lstStyle/>
+          <a:p>
+            <a:pPr algn="ctr" defTabSz="914377" eaLnBrk="1" fontAlgn="auto" hangingPunct="1">
+              <a:spcBef>
+                <a:spcPts val="0"/>
+              </a:spcBef>
+              <a:spcAft>
+                <a:spcPts val="0"/>
+              </a:spcAft>
+            </a:pPr>
+            <a:r>
+              <a:rPr lang="en-US" sz="1100" dirty="0">
+                <a:solidFill>
+                  <a:schemeClr val="bg1"/>
+                </a:solidFill>
+                <a:latin typeface="Arial"/>
+              </a:rPr>
+              <a:t>Scoring MS</a:t>
+            </a:r>
+          </a:p>
+        </p:txBody>
+      </p:sp>
+      <p:sp>
+        <p:nvSpPr>
+          <p:cNvPr id="21" name="Rectangle 20">
+            <a:extLst>
+              <a:ext uri="{FF2B5EF4-FFF2-40B4-BE49-F238E27FC236}">
+                <a16:creationId xmlns:a16="http://schemas.microsoft.com/office/drawing/2014/main" id="{B6B125CD-26F1-0C46-A1C6-964C84F02100}"/>
+              </a:ext>
+            </a:extLst>
+          </p:cNvPr>
+          <p:cNvSpPr/>
+          <p:nvPr/>
+        </p:nvSpPr>
+        <p:spPr>
+          <a:xfrm>
+            <a:off x="2645950" y="1818852"/>
+            <a:ext cx="789271" cy="1214657"/>
+          </a:xfrm>
+          <a:prstGeom prst="rect">
+            <a:avLst/>
+          </a:prstGeom>
+          <a:solidFill>
+            <a:schemeClr val="bg1">
+              <a:lumMod val="65000"/>
+            </a:schemeClr>
+          </a:solidFill>
+          <a:ln>
+            <a:noFill/>
+          </a:ln>
+          <a:effectLst>
+            <a:outerShdw blurRad="50800" dist="38100" dir="5400000" algn="t" rotWithShape="0">
+              <a:prstClr val="black">
+                <a:alpha val="40000"/>
+              </a:prstClr>
+            </a:outerShdw>
+          </a:effectLst>
+        </p:spPr>
+        <p:style>
+          <a:lnRef idx="2">
+            <a:schemeClr val="accent1">
+              <a:shade val="50000"/>
+            </a:schemeClr>
+          </a:lnRef>
+          <a:fillRef idx="1">
+            <a:schemeClr val="accent1"/>
+          </a:fillRef>
+          <a:effectRef idx="0">
+            <a:schemeClr val="accent1"/>
+          </a:effectRef>
+          <a:fontRef idx="minor">
+            <a:schemeClr val="lt1"/>
+          </a:fontRef>
+        </p:style>
+        <p:txBody>
+          <a:bodyPr rtlCol="0" anchor="ctr"/>
+          <a:lstStyle/>
+          <a:p>
+            <a:pPr algn="ctr" defTabSz="914377" eaLnBrk="1" fontAlgn="auto" hangingPunct="1">
+              <a:spcBef>
+                <a:spcPts val="0"/>
+              </a:spcBef>
+              <a:spcAft>
+                <a:spcPts val="0"/>
+              </a:spcAft>
+            </a:pPr>
+            <a:r>
+              <a:rPr lang="en-US" sz="1100" dirty="0">
+                <a:solidFill>
+                  <a:schemeClr val="bg1"/>
+                </a:solidFill>
+                <a:latin typeface="Arial"/>
+              </a:rPr>
+              <a:t>Reefer Simulator</a:t>
+            </a:r>
+          </a:p>
+        </p:txBody>
+      </p:sp>
+      <p:pic>
+        <p:nvPicPr>
+          <p:cNvPr id="22" name="Picture 21">
+            <a:extLst>
+              <a:ext uri="{FF2B5EF4-FFF2-40B4-BE49-F238E27FC236}">
+                <a16:creationId xmlns:a16="http://schemas.microsoft.com/office/drawing/2014/main" id="{6180B364-6A99-BB4D-AF7A-6B99AED8C89F}"/>
+              </a:ext>
+            </a:extLst>
+          </p:cNvPr>
+          <p:cNvPicPr>
+            <a:picLocks noChangeAspect="1"/>
+          </p:cNvPicPr>
+          <p:nvPr/>
+        </p:nvPicPr>
+        <p:blipFill>
+          <a:blip r:embed="rId8"/>
+          <a:stretch>
+            <a:fillRect/>
+          </a:stretch>
+        </p:blipFill>
+        <p:spPr>
+          <a:xfrm>
+            <a:off x="5973911" y="3679244"/>
+            <a:ext cx="940075" cy="879207"/>
+          </a:xfrm>
+          <a:prstGeom prst="rect">
+            <a:avLst/>
+          </a:prstGeom>
+        </p:spPr>
+      </p:pic>
+    </p:spTree>
+    <p:extLst>
+      <p:ext uri="{BB962C8B-B14F-4D97-AF65-F5344CB8AC3E}">
+        <p14:creationId xmlns:p14="http://schemas.microsoft.com/office/powerpoint/2010/main" val="2821260101"/>
+      </p:ext>
+    </p:extLst>
+  </p:cSld>
+  <p:clrMapOvr>
+    <a:masterClrMapping/>
+  </p:clrMapOvr>
+  <p:transition spd="med"/>
+</p:sld>
+</file>
+
+<file path=ppt/slides/slide3.xml><?xml version="1.0" encoding="utf-8"?>
+<p:sld xmlns:a="http://schemas.openxmlformats.org/drawingml/2006/main" xmlns:r="http://schemas.openxmlformats.org/officeDocument/2006/relationships" xmlns:p="http://schemas.openxmlformats.org/presentationml/2006/main">
+  <p:cSld>
+    <p:spTree>
+      <p:nvGrpSpPr>
+        <p:cNvPr id="1" name=""/>
+        <p:cNvGrpSpPr/>
+        <p:nvPr/>
+      </p:nvGrpSpPr>
+      <p:grpSpPr>
+        <a:xfrm>
+          <a:off x="0" y="0"/>
+          <a:ext cx="0" cy="0"/>
+          <a:chOff x="0" y="0"/>
+          <a:chExt cx="0" cy="0"/>
+        </a:xfrm>
+      </p:grpSpPr>
+      <p:sp>
+        <p:nvSpPr>
+          <p:cNvPr id="2" name="Title 1">
+            <a:extLst>
+              <a:ext uri="{FF2B5EF4-FFF2-40B4-BE49-F238E27FC236}">
                 <a16:creationId xmlns:a16="http://schemas.microsoft.com/office/drawing/2014/main" id="{4F4FC843-CBA3-204A-9087-239C7E4B548E}"/>
               </a:ext>
             </a:extLst>
@@ -9666,7 +10453,7 @@
             <a:effectLst/>
             <a:extLst>
               <a:ext uri="{C572A759-6A51-4108-AA02-DFA0A04FC94B}">
-                <ma14:wrappingTextBoxFlag xmlns="" xmlns:ma14="http://schemas.microsoft.com/office/mac/drawingml/2011/main" val="1"/>
+                <ma14:wrappingTextBoxFlag xmlns:ma14="http://schemas.microsoft.com/office/mac/drawingml/2011/main" xmlns="" val="1"/>
               </a:ext>
             </a:extLst>
           </p:spPr>
@@ -11796,7 +12583,7 @@
             <a:effectLst/>
             <a:extLst>
               <a:ext uri="{C572A759-6A51-4108-AA02-DFA0A04FC94B}">
-                <ma14:wrappingTextBoxFlag xmlns="" xmlns:ma14="http://schemas.microsoft.com/office/mac/drawingml/2011/main" val="1"/>
+                <ma14:wrappingTextBoxFlag xmlns:ma14="http://schemas.microsoft.com/office/mac/drawingml/2011/main" xmlns="" val="1"/>
               </a:ext>
             </a:extLst>
           </p:spPr>
@@ -13415,7 +14202,7 @@
 </p:sld>
 </file>
 
-<file path=ppt/slides/slide3.xml><?xml version="1.0" encoding="utf-8"?>
+<file path=ppt/slides/slide4.xml><?xml version="1.0" encoding="utf-8"?>
 <p:sld xmlns:a="http://schemas.openxmlformats.org/drawingml/2006/main" xmlns:r="http://schemas.openxmlformats.org/officeDocument/2006/relationships" xmlns:p="http://schemas.openxmlformats.org/presentationml/2006/main">
   <p:cSld>
     <p:spTree>
@@ -13645,7 +14432,7 @@
                 </a:solidFill>
               </a:rPr>
               <a:pPr/>
-              <a:t>3</a:t>
+              <a:t>4</a:t>
             </a:fld>
             <a:endParaRPr lang="en-US">
               <a:solidFill>
@@ -14318,7 +15105,7 @@
         <p:spPr>
           <a:xfrm>
             <a:off x="3539874" y="3260390"/>
-            <a:ext cx="1454244" cy="300210"/>
+            <a:ext cx="1540806" cy="300210"/>
           </a:xfrm>
           <a:prstGeom prst="rect">
             <a:avLst/>
@@ -14348,7 +15135,7 @@
                   </a:srgbClr>
                 </a:solidFill>
               </a:rPr>
-              <a:t>containerMetrics</a:t>
+              <a:t>reeferTelemetries</a:t>
             </a:r>
           </a:p>
         </p:txBody>
@@ -15285,8 +16072,8 @@
         </p:nvCxnSpPr>
         <p:spPr>
           <a:xfrm rot="16200000" flipH="1">
-            <a:off x="6385033" y="3233125"/>
-            <a:ext cx="246731" cy="4084941"/>
+            <a:off x="6452765" y="3300857"/>
+            <a:ext cx="111267" cy="4084941"/>
           </a:xfrm>
           <a:prstGeom prst="bentConnector3">
             <a:avLst>
@@ -15562,7 +16349,7 @@
         </p:nvSpPr>
         <p:spPr bwMode="auto">
           <a:xfrm>
-            <a:off x="3609911" y="4420719"/>
+            <a:off x="3609911" y="4556183"/>
             <a:ext cx="245561" cy="731512"/>
           </a:xfrm>
           <a:prstGeom prst="roundRect">
@@ -15630,7 +16417,7 @@
         </p:nvSpPr>
         <p:spPr bwMode="auto">
           <a:xfrm>
-            <a:off x="3853748" y="4420719"/>
+            <a:off x="3853748" y="4556183"/>
             <a:ext cx="245561" cy="731512"/>
           </a:xfrm>
           <a:prstGeom prst="roundRect">
@@ -15698,7 +16485,7 @@
         </p:nvSpPr>
         <p:spPr bwMode="auto">
           <a:xfrm>
-            <a:off x="4099310" y="4420719"/>
+            <a:off x="4099310" y="4556183"/>
             <a:ext cx="245561" cy="731512"/>
           </a:xfrm>
           <a:prstGeom prst="roundRect">
@@ -15766,7 +16553,7 @@
         </p:nvSpPr>
         <p:spPr bwMode="auto">
           <a:xfrm>
-            <a:off x="4343147" y="4420719"/>
+            <a:off x="4343147" y="4556183"/>
             <a:ext cx="245561" cy="731512"/>
           </a:xfrm>
           <a:prstGeom prst="roundRect">
@@ -15834,7 +16621,7 @@
         </p:nvSpPr>
         <p:spPr bwMode="auto">
           <a:xfrm>
-            <a:off x="4588708" y="4420719"/>
+            <a:off x="4588708" y="4556183"/>
             <a:ext cx="245561" cy="731512"/>
           </a:xfrm>
           <a:prstGeom prst="roundRect">
@@ -16010,12 +16797,12 @@
         </p:nvCxnSpPr>
         <p:spPr>
           <a:xfrm rot="5400000">
-            <a:off x="5412203" y="1949906"/>
-            <a:ext cx="1770099" cy="3171526"/>
+            <a:off x="5344471" y="2017638"/>
+            <a:ext cx="1905563" cy="3171526"/>
           </a:xfrm>
           <a:prstGeom prst="bentConnector3">
             <a:avLst>
-              <a:gd name="adj1" fmla="val 95201"/>
+              <a:gd name="adj1" fmla="val 89988"/>
             </a:avLst>
           </a:prstGeom>
           <a:ln w="25400">
@@ -16112,7 +16899,7 @@
         </p:nvSpPr>
         <p:spPr>
           <a:xfrm>
-            <a:off x="4836868" y="4763387"/>
+            <a:off x="4836868" y="4898851"/>
             <a:ext cx="493464" cy="493464"/>
           </a:xfrm>
           <a:prstGeom prst="ellipse">
@@ -16226,7 +17013,7 @@
         </p:nvSpPr>
         <p:spPr>
           <a:xfrm>
-            <a:off x="3353609" y="5139992"/>
+            <a:off x="3353609" y="5275456"/>
             <a:ext cx="982961" cy="300210"/>
           </a:xfrm>
           <a:prstGeom prst="rect">
@@ -16718,582 +17505,6 @@
     <p:extLst>
       <p:ext uri="{BB962C8B-B14F-4D97-AF65-F5344CB8AC3E}">
         <p14:creationId xmlns:p14="http://schemas.microsoft.com/office/powerpoint/2010/main" val="2217531431"/>
-      </p:ext>
-    </p:extLst>
-  </p:cSld>
-  <p:clrMapOvr>
-    <a:masterClrMapping/>
-  </p:clrMapOvr>
-</p:sld>
-</file>
-
-<file path=ppt/slides/slide4.xml><?xml version="1.0" encoding="utf-8"?>
-<p:sld xmlns:a="http://schemas.openxmlformats.org/drawingml/2006/main" xmlns:r="http://schemas.openxmlformats.org/officeDocument/2006/relationships" xmlns:p="http://schemas.openxmlformats.org/presentationml/2006/main">
-  <p:cSld>
-    <p:spTree>
-      <p:nvGrpSpPr>
-        <p:cNvPr id="1" name=""/>
-        <p:cNvGrpSpPr/>
-        <p:nvPr/>
-      </p:nvGrpSpPr>
-      <p:grpSpPr>
-        <a:xfrm>
-          <a:off x="0" y="0"/>
-          <a:ext cx="0" cy="0"/>
-          <a:chOff x="0" y="0"/>
-          <a:chExt cx="0" cy="0"/>
-        </a:xfrm>
-      </p:grpSpPr>
-      <p:sp>
-        <p:nvSpPr>
-          <p:cNvPr id="2" name="Title 1">
-            <a:extLst>
-              <a:ext uri="{FF2B5EF4-FFF2-40B4-BE49-F238E27FC236}">
-                <a16:creationId xmlns:a16="http://schemas.microsoft.com/office/drawing/2014/main" id="{83D72B5A-D2BF-0F41-AB02-0E3504265F76}"/>
-              </a:ext>
-            </a:extLst>
-          </p:cNvPr>
-          <p:cNvSpPr>
-            <a:spLocks noGrp="1"/>
-          </p:cNvSpPr>
-          <p:nvPr>
-            <p:ph type="title"/>
-          </p:nvPr>
-        </p:nvSpPr>
-        <p:spPr>
-          <a:xfrm>
-            <a:off x="288633" y="208582"/>
-            <a:ext cx="10515600" cy="521140"/>
-          </a:xfrm>
-        </p:spPr>
-        <p:txBody>
-          <a:bodyPr>
-            <a:normAutofit/>
-          </a:bodyPr>
-          <a:lstStyle/>
-          <a:p>
-            <a:r>
-              <a:rPr lang="en-US" sz="2400" dirty="0"/>
-              <a:t>Event Stream As Event Store for ML</a:t>
-            </a:r>
-          </a:p>
-        </p:txBody>
-      </p:sp>
-      <p:sp>
-        <p:nvSpPr>
-          <p:cNvPr id="4" name="Slide Number Placeholder 3">
-            <a:extLst>
-              <a:ext uri="{FF2B5EF4-FFF2-40B4-BE49-F238E27FC236}">
-                <a16:creationId xmlns:a16="http://schemas.microsoft.com/office/drawing/2014/main" id="{B1D66A27-027F-EA4A-B9BD-D02849496229}"/>
-              </a:ext>
-            </a:extLst>
-          </p:cNvPr>
-          <p:cNvSpPr>
-            <a:spLocks noGrp="1"/>
-          </p:cNvSpPr>
-          <p:nvPr>
-            <p:ph type="sldNum" sz="quarter" idx="12"/>
-          </p:nvPr>
-        </p:nvSpPr>
-        <p:spPr/>
-        <p:txBody>
-          <a:bodyPr/>
-          <a:lstStyle/>
-          <a:p>
-            <a:fld id="{C565C23E-6D76-459C-BC14-A9049E4EE889}" type="slidenum">
-              <a:rPr lang="en-US" smtClean="0"/>
-              <a:t>4</a:t>
-            </a:fld>
-            <a:endParaRPr lang="en-US"/>
-          </a:p>
-        </p:txBody>
-      </p:sp>
-      <p:sp>
-        <p:nvSpPr>
-          <p:cNvPr id="6" name="Rectangle 5">
-            <a:extLst>
-              <a:ext uri="{FF2B5EF4-FFF2-40B4-BE49-F238E27FC236}">
-                <a16:creationId xmlns:a16="http://schemas.microsoft.com/office/drawing/2014/main" id="{B53C0033-8D9E-604C-9B28-5FDD36C6C800}"/>
-              </a:ext>
-            </a:extLst>
-          </p:cNvPr>
-          <p:cNvSpPr/>
-          <p:nvPr/>
-        </p:nvSpPr>
-        <p:spPr>
-          <a:xfrm>
-            <a:off x="6118016" y="1616526"/>
-            <a:ext cx="3066325" cy="1525409"/>
-          </a:xfrm>
-          <a:prstGeom prst="rect">
-            <a:avLst/>
-          </a:prstGeom>
-          <a:noFill/>
-          <a:ln>
-            <a:prstDash val="dash"/>
-          </a:ln>
-        </p:spPr>
-        <p:style>
-          <a:lnRef idx="2">
-            <a:schemeClr val="accent1">
-              <a:shade val="50000"/>
-            </a:schemeClr>
-          </a:lnRef>
-          <a:fillRef idx="1">
-            <a:schemeClr val="accent1"/>
-          </a:fillRef>
-          <a:effectRef idx="0">
-            <a:schemeClr val="accent1"/>
-          </a:effectRef>
-          <a:fontRef idx="minor">
-            <a:schemeClr val="lt1"/>
-          </a:fontRef>
-        </p:style>
-        <p:txBody>
-          <a:bodyPr rtlCol="0" anchor="b"/>
-          <a:lstStyle/>
-          <a:p>
-            <a:pPr algn="ctr"/>
-            <a:r>
-              <a:rPr lang="en-US" sz="1200" dirty="0">
-                <a:solidFill>
-                  <a:schemeClr val="tx1"/>
-                </a:solidFill>
-              </a:rPr>
-              <a:t>ML Environment</a:t>
-            </a:r>
-          </a:p>
-        </p:txBody>
-      </p:sp>
-      <p:sp>
-        <p:nvSpPr>
-          <p:cNvPr id="8" name="Rectangle 7">
-            <a:extLst>
-              <a:ext uri="{FF2B5EF4-FFF2-40B4-BE49-F238E27FC236}">
-                <a16:creationId xmlns:a16="http://schemas.microsoft.com/office/drawing/2014/main" id="{FB63688E-FF28-D746-AC3D-3D2EFBDE0655}"/>
-              </a:ext>
-            </a:extLst>
-          </p:cNvPr>
-          <p:cNvSpPr/>
-          <p:nvPr/>
-        </p:nvSpPr>
-        <p:spPr>
-          <a:xfrm>
-            <a:off x="642258" y="1282632"/>
-            <a:ext cx="2008413" cy="1655634"/>
-          </a:xfrm>
-          <a:prstGeom prst="rect">
-            <a:avLst/>
-          </a:prstGeom>
-          <a:noFill/>
-          <a:ln>
-            <a:solidFill>
-              <a:schemeClr val="accent3"/>
-            </a:solidFill>
-            <a:prstDash val="dash"/>
-          </a:ln>
-        </p:spPr>
-        <p:style>
-          <a:lnRef idx="2">
-            <a:schemeClr val="accent1">
-              <a:shade val="50000"/>
-            </a:schemeClr>
-          </a:lnRef>
-          <a:fillRef idx="1">
-            <a:schemeClr val="accent1"/>
-          </a:fillRef>
-          <a:effectRef idx="0">
-            <a:schemeClr val="accent1"/>
-          </a:effectRef>
-          <a:fontRef idx="minor">
-            <a:schemeClr val="lt1"/>
-          </a:fontRef>
-        </p:style>
-        <p:txBody>
-          <a:bodyPr rtlCol="0" anchor="b"/>
-          <a:lstStyle/>
-          <a:p>
-            <a:pPr algn="ctr"/>
-            <a:r>
-              <a:rPr lang="en-US" sz="1200" dirty="0">
-                <a:solidFill>
-                  <a:schemeClr val="tx1"/>
-                </a:solidFill>
-              </a:rPr>
-              <a:t>Python</a:t>
-            </a:r>
-          </a:p>
-        </p:txBody>
-      </p:sp>
-      <p:sp>
-        <p:nvSpPr>
-          <p:cNvPr id="9" name="Rectangle 8">
-            <a:extLst>
-              <a:ext uri="{FF2B5EF4-FFF2-40B4-BE49-F238E27FC236}">
-                <a16:creationId xmlns:a16="http://schemas.microsoft.com/office/drawing/2014/main" id="{F1EEF6CD-0322-394A-87BF-5379FE8EE999}"/>
-              </a:ext>
-            </a:extLst>
-          </p:cNvPr>
-          <p:cNvSpPr/>
-          <p:nvPr/>
-        </p:nvSpPr>
-        <p:spPr>
-          <a:xfrm>
-            <a:off x="762000" y="1616527"/>
-            <a:ext cx="1703614" cy="914400"/>
-          </a:xfrm>
-          <a:prstGeom prst="rect">
-            <a:avLst/>
-          </a:prstGeom>
-          <a:solidFill>
-            <a:schemeClr val="accent5">
-              <a:lumMod val="75000"/>
-            </a:schemeClr>
-          </a:solidFill>
-        </p:spPr>
-        <p:style>
-          <a:lnRef idx="2">
-            <a:schemeClr val="accent1">
-              <a:shade val="50000"/>
-            </a:schemeClr>
-          </a:lnRef>
-          <a:fillRef idx="1">
-            <a:schemeClr val="accent1"/>
-          </a:fillRef>
-          <a:effectRef idx="0">
-            <a:schemeClr val="accent1"/>
-          </a:effectRef>
-          <a:fontRef idx="minor">
-            <a:schemeClr val="lt1"/>
-          </a:fontRef>
-        </p:style>
-        <p:txBody>
-          <a:bodyPr rtlCol="0" anchor="ctr"/>
-          <a:lstStyle/>
-          <a:p>
-            <a:pPr algn="ctr"/>
-            <a:r>
-              <a:rPr lang="en-US" sz="1400" dirty="0"/>
-              <a:t>Simulator</a:t>
-            </a:r>
-          </a:p>
-        </p:txBody>
-      </p:sp>
-      <p:pic>
-        <p:nvPicPr>
-          <p:cNvPr id="25" name="Picture 40">
-            <a:extLst>
-              <a:ext uri="{FF2B5EF4-FFF2-40B4-BE49-F238E27FC236}">
-                <a16:creationId xmlns:a16="http://schemas.microsoft.com/office/drawing/2014/main" id="{6CF0C2DA-CD62-0F4A-B6D7-15B98EF785FA}"/>
-              </a:ext>
-            </a:extLst>
-          </p:cNvPr>
-          <p:cNvPicPr>
-            <a:picLocks noChangeAspect="1"/>
-          </p:cNvPicPr>
-          <p:nvPr/>
-        </p:nvPicPr>
-        <p:blipFill>
-          <a:blip r:embed="rId2">
-            <a:extLst>
-              <a:ext uri="{28A0092B-C50C-407E-A947-70E740481C1C}">
-                <a14:useLocalDpi xmlns:a14="http://schemas.microsoft.com/office/drawing/2010/main" val="0"/>
-              </a:ext>
-            </a:extLst>
-          </a:blip>
-          <a:srcRect/>
-          <a:stretch>
-            <a:fillRect/>
-          </a:stretch>
-        </p:blipFill>
-        <p:spPr bwMode="auto">
-          <a:xfrm>
-            <a:off x="116601" y="2734597"/>
-            <a:ext cx="1099134" cy="407338"/>
-          </a:xfrm>
-          <a:prstGeom prst="rect">
-            <a:avLst/>
-          </a:prstGeom>
-          <a:noFill/>
-          <a:ln>
-            <a:noFill/>
-          </a:ln>
-          <a:extLst>
-            <a:ext uri="{909E8E84-426E-40DD-AFC4-6F175D3DCCD1}">
-              <a14:hiddenFill xmlns:a14="http://schemas.microsoft.com/office/drawing/2010/main">
-                <a:solidFill>
-                  <a:srgbClr val="FFFFFF"/>
-                </a:solidFill>
-              </a14:hiddenFill>
-            </a:ext>
-            <a:ext uri="{91240B29-F687-4F45-9708-019B960494DF}">
-              <a14:hiddenLine xmlns:a14="http://schemas.microsoft.com/office/drawing/2010/main" w="9525">
-                <a:solidFill>
-                  <a:srgbClr val="000000"/>
-                </a:solidFill>
-                <a:miter lim="800000"/>
-                <a:headEnd/>
-                <a:tailEnd/>
-              </a14:hiddenLine>
-            </a:ext>
-          </a:extLst>
-        </p:spPr>
-      </p:pic>
-      <p:cxnSp>
-        <p:nvCxnSpPr>
-          <p:cNvPr id="46" name="Elbow Connector 45">
-            <a:extLst>
-              <a:ext uri="{FF2B5EF4-FFF2-40B4-BE49-F238E27FC236}">
-                <a16:creationId xmlns:a16="http://schemas.microsoft.com/office/drawing/2014/main" id="{B815F1F6-8EC9-A547-951A-6A6BA26A1B3E}"/>
-              </a:ext>
-            </a:extLst>
-          </p:cNvPr>
-          <p:cNvCxnSpPr>
-            <a:cxnSpLocks/>
-            <a:stCxn id="9" idx="3"/>
-            <a:endCxn id="59" idx="1"/>
-          </p:cNvCxnSpPr>
-          <p:nvPr/>
-        </p:nvCxnSpPr>
-        <p:spPr>
-          <a:xfrm>
-            <a:off x="2465614" y="2073727"/>
-            <a:ext cx="2093194" cy="516747"/>
-          </a:xfrm>
-          <a:prstGeom prst="bentConnector2">
-            <a:avLst/>
-          </a:prstGeom>
-          <a:ln>
-            <a:solidFill>
-              <a:schemeClr val="accent6"/>
-            </a:solidFill>
-            <a:tailEnd type="triangle"/>
-          </a:ln>
-          <a:effectLst/>
-        </p:spPr>
-        <p:style>
-          <a:lnRef idx="2">
-            <a:schemeClr val="accent1"/>
-          </a:lnRef>
-          <a:fillRef idx="0">
-            <a:schemeClr val="accent1"/>
-          </a:fillRef>
-          <a:effectRef idx="1">
-            <a:schemeClr val="accent1"/>
-          </a:effectRef>
-          <a:fontRef idx="minor">
-            <a:schemeClr val="tx1"/>
-          </a:fontRef>
-        </p:style>
-      </p:cxnSp>
-      <p:cxnSp>
-        <p:nvCxnSpPr>
-          <p:cNvPr id="71" name="Elbow Connector 70">
-            <a:extLst>
-              <a:ext uri="{FF2B5EF4-FFF2-40B4-BE49-F238E27FC236}">
-                <a16:creationId xmlns:a16="http://schemas.microsoft.com/office/drawing/2014/main" id="{9B3950A4-1025-DB48-B886-5945ADD35206}"/>
-              </a:ext>
-            </a:extLst>
-          </p:cNvPr>
-          <p:cNvCxnSpPr>
-            <a:cxnSpLocks/>
-            <a:stCxn id="45" idx="1"/>
-            <a:endCxn id="59" idx="4"/>
-          </p:cNvCxnSpPr>
-          <p:nvPr/>
-        </p:nvCxnSpPr>
-        <p:spPr>
-          <a:xfrm rot="10800000" flipV="1">
-            <a:off x="5157329" y="2100404"/>
-            <a:ext cx="1320870" cy="837862"/>
-          </a:xfrm>
-          <a:prstGeom prst="bentConnector3">
-            <a:avLst>
-              <a:gd name="adj1" fmla="val 50000"/>
-            </a:avLst>
-          </a:prstGeom>
-          <a:ln>
-            <a:solidFill>
-              <a:srgbClr val="7030A0"/>
-            </a:solidFill>
-            <a:tailEnd type="triangle"/>
-          </a:ln>
-          <a:effectLst/>
-        </p:spPr>
-        <p:style>
-          <a:lnRef idx="2">
-            <a:schemeClr val="accent1"/>
-          </a:lnRef>
-          <a:fillRef idx="0">
-            <a:schemeClr val="accent1"/>
-          </a:fillRef>
-          <a:effectRef idx="1">
-            <a:schemeClr val="accent1"/>
-          </a:effectRef>
-          <a:fontRef idx="minor">
-            <a:schemeClr val="tx1"/>
-          </a:fontRef>
-        </p:style>
-      </p:cxnSp>
-      <p:sp>
-        <p:nvSpPr>
-          <p:cNvPr id="45" name="Rounded Rectangle 44">
-            <a:extLst>
-              <a:ext uri="{FF2B5EF4-FFF2-40B4-BE49-F238E27FC236}">
-                <a16:creationId xmlns:a16="http://schemas.microsoft.com/office/drawing/2014/main" id="{F495E1A9-5EC6-5446-ACF5-3911A287BB83}"/>
-              </a:ext>
-            </a:extLst>
-          </p:cNvPr>
-          <p:cNvSpPr/>
-          <p:nvPr/>
-        </p:nvSpPr>
-        <p:spPr>
-          <a:xfrm>
-            <a:off x="6478199" y="1913633"/>
-            <a:ext cx="1749097" cy="373542"/>
-          </a:xfrm>
-          <a:prstGeom prst="roundRect">
-            <a:avLst>
-              <a:gd name="adj" fmla="val 9717"/>
-            </a:avLst>
-          </a:prstGeom>
-          <a:noFill/>
-          <a:ln w="12700">
-            <a:solidFill>
-              <a:schemeClr val="tx2">
-                <a:lumMod val="50000"/>
-              </a:schemeClr>
-            </a:solidFill>
-          </a:ln>
-          <a:effectLst/>
-        </p:spPr>
-        <p:style>
-          <a:lnRef idx="1">
-            <a:schemeClr val="dk1"/>
-          </a:lnRef>
-          <a:fillRef idx="2">
-            <a:schemeClr val="dk1"/>
-          </a:fillRef>
-          <a:effectRef idx="1">
-            <a:schemeClr val="dk1"/>
-          </a:effectRef>
-          <a:fontRef idx="minor">
-            <a:schemeClr val="dk1"/>
-          </a:fontRef>
-        </p:style>
-        <p:txBody>
-          <a:bodyPr rot="0" spcFirstLastPara="0" vertOverflow="overflow" horzOverflow="overflow" vert="horz" wrap="square" lIns="0" tIns="0" rIns="0" bIns="0" numCol="1" spcCol="0" rtlCol="0" fromWordArt="0" anchor="t" anchorCtr="0" forceAA="0" compatLnSpc="1">
-            <a:prstTxWarp prst="textNoShape">
-              <a:avLst/>
-            </a:prstTxWarp>
-            <a:noAutofit/>
-          </a:bodyPr>
-          <a:lstStyle/>
-          <a:p>
-            <a:r>
-              <a:rPr lang="en-US" sz="1200" baseline="0" dirty="0">
-                <a:solidFill>
-                  <a:schemeClr val="tx1"/>
-                </a:solidFill>
-                <a:latin typeface="IBM Plex Sans" panose="020B0503050203000203" pitchFamily="34" charset="77"/>
-                <a:cs typeface="Arial"/>
-              </a:rPr>
-              <a:t>Pandas DF</a:t>
-            </a:r>
-          </a:p>
-        </p:txBody>
-      </p:sp>
-      <p:pic>
-        <p:nvPicPr>
-          <p:cNvPr id="13" name="Picture 12">
-            <a:extLst>
-              <a:ext uri="{FF2B5EF4-FFF2-40B4-BE49-F238E27FC236}">
-                <a16:creationId xmlns:a16="http://schemas.microsoft.com/office/drawing/2014/main" id="{B81AAF60-BF23-E149-AC44-3DFB94494F2F}"/>
-              </a:ext>
-            </a:extLst>
-          </p:cNvPr>
-          <p:cNvPicPr>
-            <a:picLocks noChangeAspect="1"/>
-          </p:cNvPicPr>
-          <p:nvPr/>
-        </p:nvPicPr>
-        <p:blipFill>
-          <a:blip r:embed="rId3"/>
-          <a:stretch>
-            <a:fillRect/>
-          </a:stretch>
-        </p:blipFill>
-        <p:spPr>
-          <a:xfrm>
-            <a:off x="3492393" y="3041219"/>
-            <a:ext cx="638156" cy="680700"/>
-          </a:xfrm>
-          <a:prstGeom prst="rect">
-            <a:avLst/>
-          </a:prstGeom>
-        </p:spPr>
-      </p:pic>
-      <p:sp>
-        <p:nvSpPr>
-          <p:cNvPr id="59" name="Can 58">
-            <a:extLst>
-              <a:ext uri="{FF2B5EF4-FFF2-40B4-BE49-F238E27FC236}">
-                <a16:creationId xmlns:a16="http://schemas.microsoft.com/office/drawing/2014/main" id="{BF8D5F17-7886-6A49-A326-AB3283F367DA}"/>
-              </a:ext>
-            </a:extLst>
-          </p:cNvPr>
-          <p:cNvSpPr/>
-          <p:nvPr/>
-        </p:nvSpPr>
-        <p:spPr>
-          <a:xfrm>
-            <a:off x="3960287" y="2590474"/>
-            <a:ext cx="1197042" cy="695584"/>
-          </a:xfrm>
-          <a:prstGeom prst="can">
-            <a:avLst/>
-          </a:prstGeom>
-          <a:solidFill>
-            <a:schemeClr val="accent5">
-              <a:lumMod val="75000"/>
-            </a:schemeClr>
-          </a:solidFill>
-          <a:ln>
-            <a:noFill/>
-          </a:ln>
-        </p:spPr>
-        <p:style>
-          <a:lnRef idx="2">
-            <a:schemeClr val="accent1">
-              <a:shade val="50000"/>
-            </a:schemeClr>
-          </a:lnRef>
-          <a:fillRef idx="1">
-            <a:schemeClr val="accent1"/>
-          </a:fillRef>
-          <a:effectRef idx="0">
-            <a:schemeClr val="accent1"/>
-          </a:effectRef>
-          <a:fontRef idx="minor">
-            <a:schemeClr val="lt1"/>
-          </a:fontRef>
-        </p:style>
-        <p:txBody>
-          <a:bodyPr rtlCol="0" anchor="ctr"/>
-          <a:lstStyle/>
-          <a:p>
-            <a:pPr algn="ctr"/>
-            <a:r>
-              <a:rPr lang="en-US" sz="1000" dirty="0"/>
-              <a:t>Reefer telemetries</a:t>
-            </a:r>
-          </a:p>
-        </p:txBody>
-      </p:sp>
-    </p:spTree>
-    <p:extLst>
-      <p:ext uri="{BB962C8B-B14F-4D97-AF65-F5344CB8AC3E}">
-        <p14:creationId xmlns:p14="http://schemas.microsoft.com/office/powerpoint/2010/main" val="3696044975"/>
       </p:ext>
     </p:extLst>
   </p:cSld>
@@ -17398,6 +17609,582 @@
         </p:nvSpPr>
         <p:spPr>
           <a:xfrm>
+            <a:off x="6118016" y="1616526"/>
+            <a:ext cx="3066325" cy="1525409"/>
+          </a:xfrm>
+          <a:prstGeom prst="rect">
+            <a:avLst/>
+          </a:prstGeom>
+          <a:noFill/>
+          <a:ln>
+            <a:prstDash val="dash"/>
+          </a:ln>
+        </p:spPr>
+        <p:style>
+          <a:lnRef idx="2">
+            <a:schemeClr val="accent1">
+              <a:shade val="50000"/>
+            </a:schemeClr>
+          </a:lnRef>
+          <a:fillRef idx="1">
+            <a:schemeClr val="accent1"/>
+          </a:fillRef>
+          <a:effectRef idx="0">
+            <a:schemeClr val="accent1"/>
+          </a:effectRef>
+          <a:fontRef idx="minor">
+            <a:schemeClr val="lt1"/>
+          </a:fontRef>
+        </p:style>
+        <p:txBody>
+          <a:bodyPr rtlCol="0" anchor="b"/>
+          <a:lstStyle/>
+          <a:p>
+            <a:pPr algn="ctr"/>
+            <a:r>
+              <a:rPr lang="en-US" sz="1200" dirty="0">
+                <a:solidFill>
+                  <a:schemeClr val="tx1"/>
+                </a:solidFill>
+              </a:rPr>
+              <a:t>ML Environment</a:t>
+            </a:r>
+          </a:p>
+        </p:txBody>
+      </p:sp>
+      <p:sp>
+        <p:nvSpPr>
+          <p:cNvPr id="8" name="Rectangle 7">
+            <a:extLst>
+              <a:ext uri="{FF2B5EF4-FFF2-40B4-BE49-F238E27FC236}">
+                <a16:creationId xmlns:a16="http://schemas.microsoft.com/office/drawing/2014/main" id="{FB63688E-FF28-D746-AC3D-3D2EFBDE0655}"/>
+              </a:ext>
+            </a:extLst>
+          </p:cNvPr>
+          <p:cNvSpPr/>
+          <p:nvPr/>
+        </p:nvSpPr>
+        <p:spPr>
+          <a:xfrm>
+            <a:off x="642258" y="1282632"/>
+            <a:ext cx="2008413" cy="1655634"/>
+          </a:xfrm>
+          <a:prstGeom prst="rect">
+            <a:avLst/>
+          </a:prstGeom>
+          <a:noFill/>
+          <a:ln>
+            <a:solidFill>
+              <a:schemeClr val="accent3"/>
+            </a:solidFill>
+            <a:prstDash val="dash"/>
+          </a:ln>
+        </p:spPr>
+        <p:style>
+          <a:lnRef idx="2">
+            <a:schemeClr val="accent1">
+              <a:shade val="50000"/>
+            </a:schemeClr>
+          </a:lnRef>
+          <a:fillRef idx="1">
+            <a:schemeClr val="accent1"/>
+          </a:fillRef>
+          <a:effectRef idx="0">
+            <a:schemeClr val="accent1"/>
+          </a:effectRef>
+          <a:fontRef idx="minor">
+            <a:schemeClr val="lt1"/>
+          </a:fontRef>
+        </p:style>
+        <p:txBody>
+          <a:bodyPr rtlCol="0" anchor="b"/>
+          <a:lstStyle/>
+          <a:p>
+            <a:pPr algn="ctr"/>
+            <a:r>
+              <a:rPr lang="en-US" sz="1200" dirty="0">
+                <a:solidFill>
+                  <a:schemeClr val="tx1"/>
+                </a:solidFill>
+              </a:rPr>
+              <a:t>Python</a:t>
+            </a:r>
+          </a:p>
+        </p:txBody>
+      </p:sp>
+      <p:sp>
+        <p:nvSpPr>
+          <p:cNvPr id="9" name="Rectangle 8">
+            <a:extLst>
+              <a:ext uri="{FF2B5EF4-FFF2-40B4-BE49-F238E27FC236}">
+                <a16:creationId xmlns:a16="http://schemas.microsoft.com/office/drawing/2014/main" id="{F1EEF6CD-0322-394A-87BF-5379FE8EE999}"/>
+              </a:ext>
+            </a:extLst>
+          </p:cNvPr>
+          <p:cNvSpPr/>
+          <p:nvPr/>
+        </p:nvSpPr>
+        <p:spPr>
+          <a:xfrm>
+            <a:off x="762000" y="1616527"/>
+            <a:ext cx="1703614" cy="914400"/>
+          </a:xfrm>
+          <a:prstGeom prst="rect">
+            <a:avLst/>
+          </a:prstGeom>
+          <a:solidFill>
+            <a:schemeClr val="accent5">
+              <a:lumMod val="75000"/>
+            </a:schemeClr>
+          </a:solidFill>
+        </p:spPr>
+        <p:style>
+          <a:lnRef idx="2">
+            <a:schemeClr val="accent1">
+              <a:shade val="50000"/>
+            </a:schemeClr>
+          </a:lnRef>
+          <a:fillRef idx="1">
+            <a:schemeClr val="accent1"/>
+          </a:fillRef>
+          <a:effectRef idx="0">
+            <a:schemeClr val="accent1"/>
+          </a:effectRef>
+          <a:fontRef idx="minor">
+            <a:schemeClr val="lt1"/>
+          </a:fontRef>
+        </p:style>
+        <p:txBody>
+          <a:bodyPr rtlCol="0" anchor="ctr"/>
+          <a:lstStyle/>
+          <a:p>
+            <a:pPr algn="ctr"/>
+            <a:r>
+              <a:rPr lang="en-US" sz="1400" dirty="0"/>
+              <a:t>Simulator</a:t>
+            </a:r>
+          </a:p>
+        </p:txBody>
+      </p:sp>
+      <p:pic>
+        <p:nvPicPr>
+          <p:cNvPr id="25" name="Picture 40">
+            <a:extLst>
+              <a:ext uri="{FF2B5EF4-FFF2-40B4-BE49-F238E27FC236}">
+                <a16:creationId xmlns:a16="http://schemas.microsoft.com/office/drawing/2014/main" id="{6CF0C2DA-CD62-0F4A-B6D7-15B98EF785FA}"/>
+              </a:ext>
+            </a:extLst>
+          </p:cNvPr>
+          <p:cNvPicPr>
+            <a:picLocks noChangeAspect="1"/>
+          </p:cNvPicPr>
+          <p:nvPr/>
+        </p:nvPicPr>
+        <p:blipFill>
+          <a:blip r:embed="rId2">
+            <a:extLst>
+              <a:ext uri="{28A0092B-C50C-407E-A947-70E740481C1C}">
+                <a14:useLocalDpi xmlns:a14="http://schemas.microsoft.com/office/drawing/2010/main" val="0"/>
+              </a:ext>
+            </a:extLst>
+          </a:blip>
+          <a:srcRect/>
+          <a:stretch>
+            <a:fillRect/>
+          </a:stretch>
+        </p:blipFill>
+        <p:spPr bwMode="auto">
+          <a:xfrm>
+            <a:off x="116601" y="2734597"/>
+            <a:ext cx="1099134" cy="407338"/>
+          </a:xfrm>
+          <a:prstGeom prst="rect">
+            <a:avLst/>
+          </a:prstGeom>
+          <a:noFill/>
+          <a:ln>
+            <a:noFill/>
+          </a:ln>
+          <a:extLst>
+            <a:ext uri="{909E8E84-426E-40DD-AFC4-6F175D3DCCD1}">
+              <a14:hiddenFill xmlns:a14="http://schemas.microsoft.com/office/drawing/2010/main">
+                <a:solidFill>
+                  <a:srgbClr val="FFFFFF"/>
+                </a:solidFill>
+              </a14:hiddenFill>
+            </a:ext>
+            <a:ext uri="{91240B29-F687-4F45-9708-019B960494DF}">
+              <a14:hiddenLine xmlns:a14="http://schemas.microsoft.com/office/drawing/2010/main" w="9525">
+                <a:solidFill>
+                  <a:srgbClr val="000000"/>
+                </a:solidFill>
+                <a:miter lim="800000"/>
+                <a:headEnd/>
+                <a:tailEnd/>
+              </a14:hiddenLine>
+            </a:ext>
+          </a:extLst>
+        </p:spPr>
+      </p:pic>
+      <p:cxnSp>
+        <p:nvCxnSpPr>
+          <p:cNvPr id="46" name="Elbow Connector 45">
+            <a:extLst>
+              <a:ext uri="{FF2B5EF4-FFF2-40B4-BE49-F238E27FC236}">
+                <a16:creationId xmlns:a16="http://schemas.microsoft.com/office/drawing/2014/main" id="{B815F1F6-8EC9-A547-951A-6A6BA26A1B3E}"/>
+              </a:ext>
+            </a:extLst>
+          </p:cNvPr>
+          <p:cNvCxnSpPr>
+            <a:cxnSpLocks/>
+            <a:stCxn id="9" idx="3"/>
+            <a:endCxn id="59" idx="1"/>
+          </p:cNvCxnSpPr>
+          <p:nvPr/>
+        </p:nvCxnSpPr>
+        <p:spPr>
+          <a:xfrm>
+            <a:off x="2465614" y="2073727"/>
+            <a:ext cx="2093194" cy="516747"/>
+          </a:xfrm>
+          <a:prstGeom prst="bentConnector2">
+            <a:avLst/>
+          </a:prstGeom>
+          <a:ln>
+            <a:solidFill>
+              <a:schemeClr val="accent6"/>
+            </a:solidFill>
+            <a:tailEnd type="triangle"/>
+          </a:ln>
+          <a:effectLst/>
+        </p:spPr>
+        <p:style>
+          <a:lnRef idx="2">
+            <a:schemeClr val="accent1"/>
+          </a:lnRef>
+          <a:fillRef idx="0">
+            <a:schemeClr val="accent1"/>
+          </a:fillRef>
+          <a:effectRef idx="1">
+            <a:schemeClr val="accent1"/>
+          </a:effectRef>
+          <a:fontRef idx="minor">
+            <a:schemeClr val="tx1"/>
+          </a:fontRef>
+        </p:style>
+      </p:cxnSp>
+      <p:cxnSp>
+        <p:nvCxnSpPr>
+          <p:cNvPr id="71" name="Elbow Connector 70">
+            <a:extLst>
+              <a:ext uri="{FF2B5EF4-FFF2-40B4-BE49-F238E27FC236}">
+                <a16:creationId xmlns:a16="http://schemas.microsoft.com/office/drawing/2014/main" id="{9B3950A4-1025-DB48-B886-5945ADD35206}"/>
+              </a:ext>
+            </a:extLst>
+          </p:cNvPr>
+          <p:cNvCxnSpPr>
+            <a:cxnSpLocks/>
+            <a:stCxn id="45" idx="1"/>
+            <a:endCxn id="59" idx="4"/>
+          </p:cNvCxnSpPr>
+          <p:nvPr/>
+        </p:nvCxnSpPr>
+        <p:spPr>
+          <a:xfrm rot="10800000" flipV="1">
+            <a:off x="5157329" y="2100404"/>
+            <a:ext cx="1320870" cy="837862"/>
+          </a:xfrm>
+          <a:prstGeom prst="bentConnector3">
+            <a:avLst>
+              <a:gd name="adj1" fmla="val 50000"/>
+            </a:avLst>
+          </a:prstGeom>
+          <a:ln>
+            <a:solidFill>
+              <a:srgbClr val="7030A0"/>
+            </a:solidFill>
+            <a:tailEnd type="triangle"/>
+          </a:ln>
+          <a:effectLst/>
+        </p:spPr>
+        <p:style>
+          <a:lnRef idx="2">
+            <a:schemeClr val="accent1"/>
+          </a:lnRef>
+          <a:fillRef idx="0">
+            <a:schemeClr val="accent1"/>
+          </a:fillRef>
+          <a:effectRef idx="1">
+            <a:schemeClr val="accent1"/>
+          </a:effectRef>
+          <a:fontRef idx="minor">
+            <a:schemeClr val="tx1"/>
+          </a:fontRef>
+        </p:style>
+      </p:cxnSp>
+      <p:sp>
+        <p:nvSpPr>
+          <p:cNvPr id="45" name="Rounded Rectangle 44">
+            <a:extLst>
+              <a:ext uri="{FF2B5EF4-FFF2-40B4-BE49-F238E27FC236}">
+                <a16:creationId xmlns:a16="http://schemas.microsoft.com/office/drawing/2014/main" id="{F495E1A9-5EC6-5446-ACF5-3911A287BB83}"/>
+              </a:ext>
+            </a:extLst>
+          </p:cNvPr>
+          <p:cNvSpPr/>
+          <p:nvPr/>
+        </p:nvSpPr>
+        <p:spPr>
+          <a:xfrm>
+            <a:off x="6478199" y="1913633"/>
+            <a:ext cx="1749097" cy="373542"/>
+          </a:xfrm>
+          <a:prstGeom prst="roundRect">
+            <a:avLst>
+              <a:gd name="adj" fmla="val 9717"/>
+            </a:avLst>
+          </a:prstGeom>
+          <a:noFill/>
+          <a:ln w="12700">
+            <a:solidFill>
+              <a:schemeClr val="tx2">
+                <a:lumMod val="50000"/>
+              </a:schemeClr>
+            </a:solidFill>
+          </a:ln>
+          <a:effectLst/>
+        </p:spPr>
+        <p:style>
+          <a:lnRef idx="1">
+            <a:schemeClr val="dk1"/>
+          </a:lnRef>
+          <a:fillRef idx="2">
+            <a:schemeClr val="dk1"/>
+          </a:fillRef>
+          <a:effectRef idx="1">
+            <a:schemeClr val="dk1"/>
+          </a:effectRef>
+          <a:fontRef idx="minor">
+            <a:schemeClr val="dk1"/>
+          </a:fontRef>
+        </p:style>
+        <p:txBody>
+          <a:bodyPr rot="0" spcFirstLastPara="0" vertOverflow="overflow" horzOverflow="overflow" vert="horz" wrap="square" lIns="0" tIns="0" rIns="0" bIns="0" numCol="1" spcCol="0" rtlCol="0" fromWordArt="0" anchor="t" anchorCtr="0" forceAA="0" compatLnSpc="1">
+            <a:prstTxWarp prst="textNoShape">
+              <a:avLst/>
+            </a:prstTxWarp>
+            <a:noAutofit/>
+          </a:bodyPr>
+          <a:lstStyle/>
+          <a:p>
+            <a:r>
+              <a:rPr lang="en-US" sz="1200" baseline="0" dirty="0">
+                <a:solidFill>
+                  <a:schemeClr val="tx1"/>
+                </a:solidFill>
+                <a:latin typeface="IBM Plex Sans" panose="020B0503050203000203" pitchFamily="34" charset="77"/>
+                <a:cs typeface="Arial"/>
+              </a:rPr>
+              <a:t>Pandas DF</a:t>
+            </a:r>
+          </a:p>
+        </p:txBody>
+      </p:sp>
+      <p:pic>
+        <p:nvPicPr>
+          <p:cNvPr id="13" name="Picture 12">
+            <a:extLst>
+              <a:ext uri="{FF2B5EF4-FFF2-40B4-BE49-F238E27FC236}">
+                <a16:creationId xmlns:a16="http://schemas.microsoft.com/office/drawing/2014/main" id="{B81AAF60-BF23-E149-AC44-3DFB94494F2F}"/>
+              </a:ext>
+            </a:extLst>
+          </p:cNvPr>
+          <p:cNvPicPr>
+            <a:picLocks noChangeAspect="1"/>
+          </p:cNvPicPr>
+          <p:nvPr/>
+        </p:nvPicPr>
+        <p:blipFill>
+          <a:blip r:embed="rId3"/>
+          <a:stretch>
+            <a:fillRect/>
+          </a:stretch>
+        </p:blipFill>
+        <p:spPr>
+          <a:xfrm>
+            <a:off x="3492393" y="3041219"/>
+            <a:ext cx="638156" cy="680700"/>
+          </a:xfrm>
+          <a:prstGeom prst="rect">
+            <a:avLst/>
+          </a:prstGeom>
+        </p:spPr>
+      </p:pic>
+      <p:sp>
+        <p:nvSpPr>
+          <p:cNvPr id="59" name="Can 58">
+            <a:extLst>
+              <a:ext uri="{FF2B5EF4-FFF2-40B4-BE49-F238E27FC236}">
+                <a16:creationId xmlns:a16="http://schemas.microsoft.com/office/drawing/2014/main" id="{BF8D5F17-7886-6A49-A326-AB3283F367DA}"/>
+              </a:ext>
+            </a:extLst>
+          </p:cNvPr>
+          <p:cNvSpPr/>
+          <p:nvPr/>
+        </p:nvSpPr>
+        <p:spPr>
+          <a:xfrm>
+            <a:off x="3960287" y="2590474"/>
+            <a:ext cx="1197042" cy="695584"/>
+          </a:xfrm>
+          <a:prstGeom prst="can">
+            <a:avLst/>
+          </a:prstGeom>
+          <a:solidFill>
+            <a:schemeClr val="accent5">
+              <a:lumMod val="75000"/>
+            </a:schemeClr>
+          </a:solidFill>
+          <a:ln>
+            <a:noFill/>
+          </a:ln>
+        </p:spPr>
+        <p:style>
+          <a:lnRef idx="2">
+            <a:schemeClr val="accent1">
+              <a:shade val="50000"/>
+            </a:schemeClr>
+          </a:lnRef>
+          <a:fillRef idx="1">
+            <a:schemeClr val="accent1"/>
+          </a:fillRef>
+          <a:effectRef idx="0">
+            <a:schemeClr val="accent1"/>
+          </a:effectRef>
+          <a:fontRef idx="minor">
+            <a:schemeClr val="lt1"/>
+          </a:fontRef>
+        </p:style>
+        <p:txBody>
+          <a:bodyPr rtlCol="0" anchor="ctr"/>
+          <a:lstStyle/>
+          <a:p>
+            <a:pPr algn="ctr"/>
+            <a:r>
+              <a:rPr lang="en-US" sz="1000" dirty="0"/>
+              <a:t>Reefer telemetries</a:t>
+            </a:r>
+          </a:p>
+        </p:txBody>
+      </p:sp>
+    </p:spTree>
+    <p:extLst>
+      <p:ext uri="{BB962C8B-B14F-4D97-AF65-F5344CB8AC3E}">
+        <p14:creationId xmlns:p14="http://schemas.microsoft.com/office/powerpoint/2010/main" val="3696044975"/>
+      </p:ext>
+    </p:extLst>
+  </p:cSld>
+  <p:clrMapOvr>
+    <a:masterClrMapping/>
+  </p:clrMapOvr>
+</p:sld>
+</file>
+
+<file path=ppt/slides/slide6.xml><?xml version="1.0" encoding="utf-8"?>
+<p:sld xmlns:a="http://schemas.openxmlformats.org/drawingml/2006/main" xmlns:r="http://schemas.openxmlformats.org/officeDocument/2006/relationships" xmlns:p="http://schemas.openxmlformats.org/presentationml/2006/main">
+  <p:cSld>
+    <p:spTree>
+      <p:nvGrpSpPr>
+        <p:cNvPr id="1" name=""/>
+        <p:cNvGrpSpPr/>
+        <p:nvPr/>
+      </p:nvGrpSpPr>
+      <p:grpSpPr>
+        <a:xfrm>
+          <a:off x="0" y="0"/>
+          <a:ext cx="0" cy="0"/>
+          <a:chOff x="0" y="0"/>
+          <a:chExt cx="0" cy="0"/>
+        </a:xfrm>
+      </p:grpSpPr>
+      <p:sp>
+        <p:nvSpPr>
+          <p:cNvPr id="2" name="Title 1">
+            <a:extLst>
+              <a:ext uri="{FF2B5EF4-FFF2-40B4-BE49-F238E27FC236}">
+                <a16:creationId xmlns:a16="http://schemas.microsoft.com/office/drawing/2014/main" id="{83D72B5A-D2BF-0F41-AB02-0E3504265F76}"/>
+              </a:ext>
+            </a:extLst>
+          </p:cNvPr>
+          <p:cNvSpPr>
+            <a:spLocks noGrp="1"/>
+          </p:cNvSpPr>
+          <p:nvPr>
+            <p:ph type="title"/>
+          </p:nvPr>
+        </p:nvSpPr>
+        <p:spPr>
+          <a:xfrm>
+            <a:off x="288633" y="208582"/>
+            <a:ext cx="10515600" cy="521140"/>
+          </a:xfrm>
+        </p:spPr>
+        <p:txBody>
+          <a:bodyPr>
+            <a:normAutofit/>
+          </a:bodyPr>
+          <a:lstStyle/>
+          <a:p>
+            <a:r>
+              <a:rPr lang="en-US" sz="2400" dirty="0"/>
+              <a:t>Event Stream As Event Store for ML</a:t>
+            </a:r>
+          </a:p>
+        </p:txBody>
+      </p:sp>
+      <p:sp>
+        <p:nvSpPr>
+          <p:cNvPr id="4" name="Slide Number Placeholder 3">
+            <a:extLst>
+              <a:ext uri="{FF2B5EF4-FFF2-40B4-BE49-F238E27FC236}">
+                <a16:creationId xmlns:a16="http://schemas.microsoft.com/office/drawing/2014/main" id="{B1D66A27-027F-EA4A-B9BD-D02849496229}"/>
+              </a:ext>
+            </a:extLst>
+          </p:cNvPr>
+          <p:cNvSpPr>
+            <a:spLocks noGrp="1"/>
+          </p:cNvSpPr>
+          <p:nvPr>
+            <p:ph type="sldNum" sz="quarter" idx="12"/>
+          </p:nvPr>
+        </p:nvSpPr>
+        <p:spPr/>
+        <p:txBody>
+          <a:bodyPr/>
+          <a:lstStyle/>
+          <a:p>
+            <a:fld id="{C565C23E-6D76-459C-BC14-A9049E4EE889}" type="slidenum">
+              <a:rPr lang="en-US" smtClean="0"/>
+              <a:t>6</a:t>
+            </a:fld>
+            <a:endParaRPr lang="en-US"/>
+          </a:p>
+        </p:txBody>
+      </p:sp>
+      <p:sp>
+        <p:nvSpPr>
+          <p:cNvPr id="6" name="Rectangle 5">
+            <a:extLst>
+              <a:ext uri="{FF2B5EF4-FFF2-40B4-BE49-F238E27FC236}">
+                <a16:creationId xmlns:a16="http://schemas.microsoft.com/office/drawing/2014/main" id="{B53C0033-8D9E-604C-9B28-5FDD36C6C800}"/>
+              </a:ext>
+            </a:extLst>
+          </p:cNvPr>
+          <p:cNvSpPr/>
+          <p:nvPr/>
+        </p:nvSpPr>
+        <p:spPr>
+          <a:xfrm>
             <a:off x="6118016" y="1168380"/>
             <a:ext cx="3362160" cy="1973555"/>
           </a:xfrm>
@@ -18126,7 +18913,7 @@
           <a:lstStyle/>
           <a:p>
             <a:r>
-              <a:rPr lang="en-US" dirty="0" err="1">
+              <a:rPr lang="en-US" dirty="0">
                 <a:solidFill>
                   <a:schemeClr val="accent1">
                     <a:lumMod val="25000"/>
@@ -18135,13 +18922,6 @@
               </a:rPr>
               <a:t>reeferTelemetries</a:t>
             </a:r>
-            <a:endParaRPr lang="en-US" dirty="0">
-              <a:solidFill>
-                <a:schemeClr val="accent1">
-                  <a:lumMod val="25000"/>
-                </a:schemeClr>
-              </a:solidFill>
-            </a:endParaRPr>
           </a:p>
         </p:txBody>
       </p:sp>

</xml_diff>

<commit_message>
Deployed 1959525 with MkDocs version: 1.0.4
</commit_message>
<xml_diff>
--- a/diagrams.pptx
+++ b/diagrams.pptx
@@ -277,7 +277,7 @@
               <a:pPr>
                 <a:defRPr/>
               </a:pPr>
-              <a:t>11/13/19</a:t>
+              <a:t>11/26/19</a:t>
             </a:fld>
             <a:endParaRPr lang="en-US" dirty="0"/>
           </a:p>
@@ -10453,7 +10453,7 @@
             <a:effectLst/>
             <a:extLst>
               <a:ext uri="{C572A759-6A51-4108-AA02-DFA0A04FC94B}">
-                <ma14:wrappingTextBoxFlag xmlns:ma14="http://schemas.microsoft.com/office/mac/drawingml/2011/main" xmlns="" val="1"/>
+                <ma14:wrappingTextBoxFlag xmlns="" xmlns:ma14="http://schemas.microsoft.com/office/mac/drawingml/2011/main" val="1"/>
               </a:ext>
             </a:extLst>
           </p:spPr>
@@ -12583,7 +12583,7 @@
             <a:effectLst/>
             <a:extLst>
               <a:ext uri="{C572A759-6A51-4108-AA02-DFA0A04FC94B}">
-                <ma14:wrappingTextBoxFlag xmlns:ma14="http://schemas.microsoft.com/office/mac/drawingml/2011/main" xmlns="" val="1"/>
+                <ma14:wrappingTextBoxFlag xmlns="" xmlns:ma14="http://schemas.microsoft.com/office/mac/drawingml/2011/main" val="1"/>
               </a:ext>
             </a:extLst>
           </p:spPr>
@@ -17561,7 +17561,7 @@
           <a:p>
             <a:r>
               <a:rPr lang="en-US" sz="2400" dirty="0"/>
-              <a:t>Event Stream As Event Store for ML</a:t>
+              <a:t>Event Stream to long term Event Store for ML</a:t>
             </a:r>
           </a:p>
         </p:txBody>
@@ -17647,7 +17647,7 @@
                   <a:schemeClr val="tx1"/>
                 </a:solidFill>
               </a:rPr>
-              <a:t>ML Environment</a:t>
+              <a:t>Machine Learning Environment</a:t>
             </a:r>
           </a:p>
         </p:txBody>
@@ -17737,6 +17737,16 @@
               <a:lumMod val="75000"/>
             </a:schemeClr>
           </a:solidFill>
+          <a:ln>
+            <a:noFill/>
+          </a:ln>
+          <a:effectLst>
+            <a:outerShdw blurRad="50800" dist="38100" dir="5400000" algn="t" rotWithShape="0">
+              <a:prstClr val="black">
+                <a:alpha val="40000"/>
+              </a:prstClr>
+            </a:outerShdw>
+          </a:effectLst>
         </p:spPr>
         <p:style>
           <a:lnRef idx="2">
@@ -17761,17 +17771,237 @@
             <a:pPr algn="ctr"/>
             <a:r>
               <a:rPr lang="en-US" sz="1400" dirty="0"/>
-              <a:t>Simulator</a:t>
+              <a:t>SimulatorTool</a:t>
+            </a:r>
+          </a:p>
+        </p:txBody>
+      </p:sp>
+      <p:cxnSp>
+        <p:nvCxnSpPr>
+          <p:cNvPr id="46" name="Elbow Connector 45">
+            <a:extLst>
+              <a:ext uri="{FF2B5EF4-FFF2-40B4-BE49-F238E27FC236}">
+                <a16:creationId xmlns:a16="http://schemas.microsoft.com/office/drawing/2014/main" id="{B815F1F6-8EC9-A547-951A-6A6BA26A1B3E}"/>
+              </a:ext>
+            </a:extLst>
+          </p:cNvPr>
+          <p:cNvCxnSpPr>
+            <a:cxnSpLocks/>
+            <a:stCxn id="9" idx="3"/>
+            <a:endCxn id="59" idx="1"/>
+          </p:cNvCxnSpPr>
+          <p:nvPr/>
+        </p:nvCxnSpPr>
+        <p:spPr>
+          <a:xfrm>
+            <a:off x="2465614" y="2073727"/>
+            <a:ext cx="2093194" cy="516747"/>
+          </a:xfrm>
+          <a:prstGeom prst="bentConnector2">
+            <a:avLst/>
+          </a:prstGeom>
+          <a:ln w="12700">
+            <a:solidFill>
+              <a:schemeClr val="accent6"/>
+            </a:solidFill>
+            <a:tailEnd type="triangle"/>
+          </a:ln>
+          <a:effectLst/>
+        </p:spPr>
+        <p:style>
+          <a:lnRef idx="2">
+            <a:schemeClr val="accent1"/>
+          </a:lnRef>
+          <a:fillRef idx="0">
+            <a:schemeClr val="accent1"/>
+          </a:fillRef>
+          <a:effectRef idx="1">
+            <a:schemeClr val="accent1"/>
+          </a:effectRef>
+          <a:fontRef idx="minor">
+            <a:schemeClr val="tx1"/>
+          </a:fontRef>
+        </p:style>
+      </p:cxnSp>
+      <p:cxnSp>
+        <p:nvCxnSpPr>
+          <p:cNvPr id="71" name="Elbow Connector 70">
+            <a:extLst>
+              <a:ext uri="{FF2B5EF4-FFF2-40B4-BE49-F238E27FC236}">
+                <a16:creationId xmlns:a16="http://schemas.microsoft.com/office/drawing/2014/main" id="{9B3950A4-1025-DB48-B886-5945ADD35206}"/>
+              </a:ext>
+            </a:extLst>
+          </p:cNvPr>
+          <p:cNvCxnSpPr>
+            <a:cxnSpLocks/>
+            <a:stCxn id="45" idx="1"/>
+            <a:endCxn id="59" idx="4"/>
+          </p:cNvCxnSpPr>
+          <p:nvPr/>
+        </p:nvCxnSpPr>
+        <p:spPr>
+          <a:xfrm rot="10800000" flipV="1">
+            <a:off x="5157329" y="2100404"/>
+            <a:ext cx="1320870" cy="837862"/>
+          </a:xfrm>
+          <a:prstGeom prst="bentConnector3">
+            <a:avLst>
+              <a:gd name="adj1" fmla="val 50000"/>
+            </a:avLst>
+          </a:prstGeom>
+          <a:ln w="12700">
+            <a:solidFill>
+              <a:srgbClr val="7030A0"/>
+            </a:solidFill>
+            <a:headEnd type="triangle"/>
+            <a:tailEnd type="none"/>
+          </a:ln>
+          <a:effectLst/>
+        </p:spPr>
+        <p:style>
+          <a:lnRef idx="2">
+            <a:schemeClr val="accent1"/>
+          </a:lnRef>
+          <a:fillRef idx="0">
+            <a:schemeClr val="accent1"/>
+          </a:fillRef>
+          <a:effectRef idx="1">
+            <a:schemeClr val="accent1"/>
+          </a:effectRef>
+          <a:fontRef idx="minor">
+            <a:schemeClr val="tx1"/>
+          </a:fontRef>
+        </p:style>
+      </p:cxnSp>
+      <p:sp>
+        <p:nvSpPr>
+          <p:cNvPr id="45" name="Rounded Rectangle 44">
+            <a:extLst>
+              <a:ext uri="{FF2B5EF4-FFF2-40B4-BE49-F238E27FC236}">
+                <a16:creationId xmlns:a16="http://schemas.microsoft.com/office/drawing/2014/main" id="{F495E1A9-5EC6-5446-ACF5-3911A287BB83}"/>
+              </a:ext>
+            </a:extLst>
+          </p:cNvPr>
+          <p:cNvSpPr/>
+          <p:nvPr/>
+        </p:nvSpPr>
+        <p:spPr>
+          <a:xfrm>
+            <a:off x="6478199" y="1913633"/>
+            <a:ext cx="1749097" cy="373542"/>
+          </a:xfrm>
+          <a:prstGeom prst="roundRect">
+            <a:avLst>
+              <a:gd name="adj" fmla="val 9717"/>
+            </a:avLst>
+          </a:prstGeom>
+          <a:noFill/>
+          <a:ln w="12700">
+            <a:solidFill>
+              <a:schemeClr val="tx2">
+                <a:lumMod val="50000"/>
+              </a:schemeClr>
+            </a:solidFill>
+          </a:ln>
+          <a:effectLst/>
+        </p:spPr>
+        <p:style>
+          <a:lnRef idx="1">
+            <a:schemeClr val="dk1"/>
+          </a:lnRef>
+          <a:fillRef idx="2">
+            <a:schemeClr val="dk1"/>
+          </a:fillRef>
+          <a:effectRef idx="1">
+            <a:schemeClr val="dk1"/>
+          </a:effectRef>
+          <a:fontRef idx="minor">
+            <a:schemeClr val="dk1"/>
+          </a:fontRef>
+        </p:style>
+        <p:txBody>
+          <a:bodyPr rot="0" spcFirstLastPara="0" vertOverflow="overflow" horzOverflow="overflow" vert="horz" wrap="square" lIns="0" tIns="0" rIns="0" bIns="0" numCol="1" spcCol="0" rtlCol="0" fromWordArt="0" anchor="t" anchorCtr="0" forceAA="0" compatLnSpc="1">
+            <a:prstTxWarp prst="textNoShape">
+              <a:avLst/>
+            </a:prstTxWarp>
+            <a:noAutofit/>
+          </a:bodyPr>
+          <a:lstStyle/>
+          <a:p>
+            <a:r>
+              <a:rPr lang="en-US" sz="1200" baseline="0" dirty="0">
+                <a:solidFill>
+                  <a:schemeClr val="tx1"/>
+                </a:solidFill>
+                <a:latin typeface="IBM Plex Sans" panose="020B0503050203000203" pitchFamily="34" charset="77"/>
+                <a:cs typeface="Arial"/>
+              </a:rPr>
+              <a:t>Pandas DF</a:t>
+            </a:r>
+          </a:p>
+        </p:txBody>
+      </p:sp>
+      <p:sp>
+        <p:nvSpPr>
+          <p:cNvPr id="59" name="Can 58">
+            <a:extLst>
+              <a:ext uri="{FF2B5EF4-FFF2-40B4-BE49-F238E27FC236}">
+                <a16:creationId xmlns:a16="http://schemas.microsoft.com/office/drawing/2014/main" id="{BF8D5F17-7886-6A49-A326-AB3283F367DA}"/>
+              </a:ext>
+            </a:extLst>
+          </p:cNvPr>
+          <p:cNvSpPr/>
+          <p:nvPr/>
+        </p:nvSpPr>
+        <p:spPr>
+          <a:xfrm>
+            <a:off x="3960287" y="2590474"/>
+            <a:ext cx="1197042" cy="695584"/>
+          </a:xfrm>
+          <a:prstGeom prst="can">
+            <a:avLst/>
+          </a:prstGeom>
+          <a:solidFill>
+            <a:srgbClr val="009643"/>
+          </a:solidFill>
+          <a:ln>
+            <a:noFill/>
+          </a:ln>
+        </p:spPr>
+        <p:style>
+          <a:lnRef idx="2">
+            <a:schemeClr val="accent1">
+              <a:shade val="50000"/>
+            </a:schemeClr>
+          </a:lnRef>
+          <a:fillRef idx="1">
+            <a:schemeClr val="accent1"/>
+          </a:fillRef>
+          <a:effectRef idx="0">
+            <a:schemeClr val="accent1"/>
+          </a:effectRef>
+          <a:fontRef idx="minor">
+            <a:schemeClr val="lt1"/>
+          </a:fontRef>
+        </p:style>
+        <p:txBody>
+          <a:bodyPr rtlCol="0" anchor="ctr"/>
+          <a:lstStyle/>
+          <a:p>
+            <a:pPr algn="ctr"/>
+            <a:r>
+              <a:rPr lang="en-US" sz="1000" dirty="0"/>
+              <a:t>Reefer telemetries</a:t>
             </a:r>
           </a:p>
         </p:txBody>
       </p:sp>
       <p:pic>
         <p:nvPicPr>
-          <p:cNvPr id="25" name="Picture 40">
+          <p:cNvPr id="3" name="Picture 2">
             <a:extLst>
               <a:ext uri="{FF2B5EF4-FFF2-40B4-BE49-F238E27FC236}">
-                <a16:creationId xmlns:a16="http://schemas.microsoft.com/office/drawing/2014/main" id="{6CF0C2DA-CD62-0F4A-B6D7-15B98EF785FA}"/>
+                <a16:creationId xmlns:a16="http://schemas.microsoft.com/office/drawing/2014/main" id="{528193D1-A620-354F-B6D2-B217C3C404BA}"/>
               </a:ext>
             </a:extLst>
           </p:cNvPr>
@@ -17781,7 +18011,780 @@
           <p:nvPr/>
         </p:nvPicPr>
         <p:blipFill>
-          <a:blip r:embed="rId2">
+          <a:blip r:embed="rId2"/>
+          <a:stretch>
+            <a:fillRect/>
+          </a:stretch>
+        </p:blipFill>
+        <p:spPr>
+          <a:xfrm>
+            <a:off x="3707408" y="2785869"/>
+            <a:ext cx="296333" cy="643355"/>
+          </a:xfrm>
+          <a:prstGeom prst="rect">
+            <a:avLst/>
+          </a:prstGeom>
+        </p:spPr>
+      </p:pic>
+      <p:sp>
+        <p:nvSpPr>
+          <p:cNvPr id="14" name="Rectangle 13">
+            <a:extLst>
+              <a:ext uri="{FF2B5EF4-FFF2-40B4-BE49-F238E27FC236}">
+                <a16:creationId xmlns:a16="http://schemas.microsoft.com/office/drawing/2014/main" id="{FF73E72E-4933-814D-B024-C5BBC14F304D}"/>
+              </a:ext>
+            </a:extLst>
+          </p:cNvPr>
+          <p:cNvSpPr/>
+          <p:nvPr/>
+        </p:nvSpPr>
+        <p:spPr>
+          <a:xfrm>
+            <a:off x="523723" y="3653298"/>
+            <a:ext cx="2008413" cy="1655634"/>
+          </a:xfrm>
+          <a:prstGeom prst="rect">
+            <a:avLst/>
+          </a:prstGeom>
+          <a:noFill/>
+          <a:ln>
+            <a:solidFill>
+              <a:schemeClr val="accent3"/>
+            </a:solidFill>
+            <a:prstDash val="dash"/>
+          </a:ln>
+        </p:spPr>
+        <p:style>
+          <a:lnRef idx="2">
+            <a:schemeClr val="accent1">
+              <a:shade val="50000"/>
+            </a:schemeClr>
+          </a:lnRef>
+          <a:fillRef idx="1">
+            <a:schemeClr val="accent1"/>
+          </a:fillRef>
+          <a:effectRef idx="0">
+            <a:schemeClr val="accent1"/>
+          </a:effectRef>
+          <a:fontRef idx="minor">
+            <a:schemeClr val="lt1"/>
+          </a:fontRef>
+        </p:style>
+        <p:txBody>
+          <a:bodyPr rtlCol="0" anchor="b"/>
+          <a:lstStyle/>
+          <a:p>
+            <a:pPr algn="ctr"/>
+            <a:r>
+              <a:rPr lang="en-US" sz="1200" dirty="0">
+                <a:solidFill>
+                  <a:schemeClr val="tx1"/>
+                </a:solidFill>
+              </a:rPr>
+              <a:t>Python</a:t>
+            </a:r>
+          </a:p>
+        </p:txBody>
+      </p:sp>
+      <p:sp>
+        <p:nvSpPr>
+          <p:cNvPr id="15" name="Rectangle 14">
+            <a:extLst>
+              <a:ext uri="{FF2B5EF4-FFF2-40B4-BE49-F238E27FC236}">
+                <a16:creationId xmlns:a16="http://schemas.microsoft.com/office/drawing/2014/main" id="{8990AB5A-91EB-9947-B9EF-04353E549FFC}"/>
+              </a:ext>
+            </a:extLst>
+          </p:cNvPr>
+          <p:cNvSpPr/>
+          <p:nvPr/>
+        </p:nvSpPr>
+        <p:spPr>
+          <a:xfrm>
+            <a:off x="643465" y="3987193"/>
+            <a:ext cx="1703614" cy="914400"/>
+          </a:xfrm>
+          <a:prstGeom prst="rect">
+            <a:avLst/>
+          </a:prstGeom>
+          <a:solidFill>
+            <a:schemeClr val="accent5">
+              <a:lumMod val="75000"/>
+            </a:schemeClr>
+          </a:solidFill>
+          <a:ln>
+            <a:noFill/>
+          </a:ln>
+          <a:effectLst>
+            <a:outerShdw blurRad="50800" dist="38100" dir="5400000" algn="t" rotWithShape="0">
+              <a:prstClr val="black">
+                <a:alpha val="40000"/>
+              </a:prstClr>
+            </a:outerShdw>
+          </a:effectLst>
+        </p:spPr>
+        <p:style>
+          <a:lnRef idx="2">
+            <a:schemeClr val="accent1">
+              <a:shade val="50000"/>
+            </a:schemeClr>
+          </a:lnRef>
+          <a:fillRef idx="1">
+            <a:schemeClr val="accent1"/>
+          </a:fillRef>
+          <a:effectRef idx="0">
+            <a:schemeClr val="accent1"/>
+          </a:effectRef>
+          <a:fontRef idx="minor">
+            <a:schemeClr val="lt1"/>
+          </a:fontRef>
+        </p:style>
+        <p:txBody>
+          <a:bodyPr rtlCol="0" anchor="ctr"/>
+          <a:lstStyle/>
+          <a:p>
+            <a:pPr algn="ctr"/>
+            <a:r>
+              <a:rPr lang="en-US" sz="1400" dirty="0"/>
+              <a:t>SimulatorApp</a:t>
+            </a:r>
+          </a:p>
+        </p:txBody>
+      </p:sp>
+      <p:sp>
+        <p:nvSpPr>
+          <p:cNvPr id="16" name="Rounded Rectangle 15">
+            <a:extLst>
+              <a:ext uri="{FF2B5EF4-FFF2-40B4-BE49-F238E27FC236}">
+                <a16:creationId xmlns:a16="http://schemas.microsoft.com/office/drawing/2014/main" id="{604B1EAE-7B06-B644-84B2-A465850BFF11}"/>
+              </a:ext>
+            </a:extLst>
+          </p:cNvPr>
+          <p:cNvSpPr/>
+          <p:nvPr/>
+        </p:nvSpPr>
+        <p:spPr bwMode="auto">
+          <a:xfrm>
+            <a:off x="3749127" y="4437992"/>
+            <a:ext cx="245561" cy="731512"/>
+          </a:xfrm>
+          <a:prstGeom prst="roundRect">
+            <a:avLst/>
+          </a:prstGeom>
+          <a:solidFill>
+            <a:schemeClr val="bg2"/>
+          </a:solidFill>
+          <a:ln>
+            <a:solidFill>
+              <a:schemeClr val="bg1"/>
+            </a:solidFill>
+            <a:prstDash val="solid"/>
+            <a:headEnd type="none" w="med" len="med"/>
+            <a:tailEnd type="none" w="med" len="med"/>
+          </a:ln>
+          <a:effectLst/>
+        </p:spPr>
+        <p:style>
+          <a:lnRef idx="1">
+            <a:schemeClr val="accent5"/>
+          </a:lnRef>
+          <a:fillRef idx="3">
+            <a:schemeClr val="accent5"/>
+          </a:fillRef>
+          <a:effectRef idx="2">
+            <a:schemeClr val="accent5"/>
+          </a:effectRef>
+          <a:fontRef idx="minor">
+            <a:schemeClr val="lt1"/>
+          </a:fontRef>
+        </p:style>
+        <p:txBody>
+          <a:bodyPr vert="horz" wrap="square" lIns="0" tIns="0" rIns="0" bIns="0" numCol="1" rtlCol="0" anchor="ctr" anchorCtr="0" compatLnSpc="1">
+            <a:prstTxWarp prst="textNoShape">
+              <a:avLst/>
+            </a:prstTxWarp>
+            <a:noAutofit/>
+          </a:bodyPr>
+          <a:lstStyle/>
+          <a:p>
+            <a:pPr algn="ctr" defTabSz="1219170" fontAlgn="base">
+              <a:lnSpc>
+                <a:spcPct val="90000"/>
+              </a:lnSpc>
+              <a:spcBef>
+                <a:spcPct val="0"/>
+              </a:spcBef>
+              <a:spcAft>
+                <a:spcPct val="0"/>
+              </a:spcAft>
+            </a:pPr>
+            <a:r>
+              <a:rPr lang="en-US" sz="1200" dirty="0">
+                <a:solidFill>
+                  <a:schemeClr val="bg1"/>
+                </a:solidFill>
+              </a:rPr>
+              <a:t>0</a:t>
+            </a:r>
+            <a:endParaRPr lang="en-US" sz="667" dirty="0">
+              <a:solidFill>
+                <a:schemeClr val="bg1"/>
+              </a:solidFill>
+            </a:endParaRPr>
+          </a:p>
+        </p:txBody>
+      </p:sp>
+      <p:sp>
+        <p:nvSpPr>
+          <p:cNvPr id="17" name="Rounded Rectangle 16">
+            <a:extLst>
+              <a:ext uri="{FF2B5EF4-FFF2-40B4-BE49-F238E27FC236}">
+                <a16:creationId xmlns:a16="http://schemas.microsoft.com/office/drawing/2014/main" id="{BF94AF6A-6ED9-F648-AF73-AD2F2BF0087D}"/>
+              </a:ext>
+            </a:extLst>
+          </p:cNvPr>
+          <p:cNvSpPr/>
+          <p:nvPr/>
+        </p:nvSpPr>
+        <p:spPr bwMode="auto">
+          <a:xfrm>
+            <a:off x="3992964" y="4437992"/>
+            <a:ext cx="245561" cy="731512"/>
+          </a:xfrm>
+          <a:prstGeom prst="roundRect">
+            <a:avLst/>
+          </a:prstGeom>
+          <a:solidFill>
+            <a:schemeClr val="bg2"/>
+          </a:solidFill>
+          <a:ln>
+            <a:solidFill>
+              <a:schemeClr val="bg1"/>
+            </a:solidFill>
+            <a:prstDash val="solid"/>
+            <a:headEnd type="none" w="med" len="med"/>
+            <a:tailEnd type="none" w="med" len="med"/>
+          </a:ln>
+          <a:effectLst/>
+        </p:spPr>
+        <p:style>
+          <a:lnRef idx="1">
+            <a:schemeClr val="accent5"/>
+          </a:lnRef>
+          <a:fillRef idx="3">
+            <a:schemeClr val="accent5"/>
+          </a:fillRef>
+          <a:effectRef idx="2">
+            <a:schemeClr val="accent5"/>
+          </a:effectRef>
+          <a:fontRef idx="minor">
+            <a:schemeClr val="lt1"/>
+          </a:fontRef>
+        </p:style>
+        <p:txBody>
+          <a:bodyPr vert="horz" wrap="square" lIns="0" tIns="0" rIns="0" bIns="0" numCol="1" rtlCol="0" anchor="ctr" anchorCtr="0" compatLnSpc="1">
+            <a:prstTxWarp prst="textNoShape">
+              <a:avLst/>
+            </a:prstTxWarp>
+            <a:noAutofit/>
+          </a:bodyPr>
+          <a:lstStyle/>
+          <a:p>
+            <a:pPr algn="ctr" defTabSz="1219170" fontAlgn="base">
+              <a:lnSpc>
+                <a:spcPct val="90000"/>
+              </a:lnSpc>
+              <a:spcBef>
+                <a:spcPct val="0"/>
+              </a:spcBef>
+              <a:spcAft>
+                <a:spcPct val="0"/>
+              </a:spcAft>
+            </a:pPr>
+            <a:r>
+              <a:rPr lang="en-US" sz="1200" dirty="0">
+                <a:solidFill>
+                  <a:schemeClr val="bg1"/>
+                </a:solidFill>
+              </a:rPr>
+              <a:t>1</a:t>
+            </a:r>
+            <a:endParaRPr lang="en-US" sz="667" dirty="0">
+              <a:solidFill>
+                <a:schemeClr val="bg1"/>
+              </a:solidFill>
+            </a:endParaRPr>
+          </a:p>
+        </p:txBody>
+      </p:sp>
+      <p:sp>
+        <p:nvSpPr>
+          <p:cNvPr id="18" name="Rounded Rectangle 17">
+            <a:extLst>
+              <a:ext uri="{FF2B5EF4-FFF2-40B4-BE49-F238E27FC236}">
+                <a16:creationId xmlns:a16="http://schemas.microsoft.com/office/drawing/2014/main" id="{574D615E-85EA-C844-A2A9-FE6056949B8A}"/>
+              </a:ext>
+            </a:extLst>
+          </p:cNvPr>
+          <p:cNvSpPr/>
+          <p:nvPr/>
+        </p:nvSpPr>
+        <p:spPr bwMode="auto">
+          <a:xfrm>
+            <a:off x="4238526" y="4437992"/>
+            <a:ext cx="245561" cy="731512"/>
+          </a:xfrm>
+          <a:prstGeom prst="roundRect">
+            <a:avLst/>
+          </a:prstGeom>
+          <a:solidFill>
+            <a:schemeClr val="bg2"/>
+          </a:solidFill>
+          <a:ln>
+            <a:solidFill>
+              <a:schemeClr val="bg1"/>
+            </a:solidFill>
+            <a:prstDash val="solid"/>
+            <a:headEnd type="none" w="med" len="med"/>
+            <a:tailEnd type="none" w="med" len="med"/>
+          </a:ln>
+          <a:effectLst/>
+        </p:spPr>
+        <p:style>
+          <a:lnRef idx="1">
+            <a:schemeClr val="accent5"/>
+          </a:lnRef>
+          <a:fillRef idx="3">
+            <a:schemeClr val="accent5"/>
+          </a:fillRef>
+          <a:effectRef idx="2">
+            <a:schemeClr val="accent5"/>
+          </a:effectRef>
+          <a:fontRef idx="minor">
+            <a:schemeClr val="lt1"/>
+          </a:fontRef>
+        </p:style>
+        <p:txBody>
+          <a:bodyPr vert="horz" wrap="square" lIns="0" tIns="0" rIns="0" bIns="0" numCol="1" rtlCol="0" anchor="ctr" anchorCtr="0" compatLnSpc="1">
+            <a:prstTxWarp prst="textNoShape">
+              <a:avLst/>
+            </a:prstTxWarp>
+            <a:noAutofit/>
+          </a:bodyPr>
+          <a:lstStyle/>
+          <a:p>
+            <a:pPr algn="ctr" defTabSz="1219170" fontAlgn="base">
+              <a:lnSpc>
+                <a:spcPct val="90000"/>
+              </a:lnSpc>
+              <a:spcBef>
+                <a:spcPct val="0"/>
+              </a:spcBef>
+              <a:spcAft>
+                <a:spcPct val="0"/>
+              </a:spcAft>
+            </a:pPr>
+            <a:r>
+              <a:rPr lang="en-US" sz="1200" dirty="0">
+                <a:solidFill>
+                  <a:schemeClr val="bg1"/>
+                </a:solidFill>
+              </a:rPr>
+              <a:t>2</a:t>
+            </a:r>
+            <a:endParaRPr lang="en-US" sz="667" dirty="0">
+              <a:solidFill>
+                <a:schemeClr val="bg1"/>
+              </a:solidFill>
+            </a:endParaRPr>
+          </a:p>
+        </p:txBody>
+      </p:sp>
+      <p:sp>
+        <p:nvSpPr>
+          <p:cNvPr id="19" name="Rounded Rectangle 18">
+            <a:extLst>
+              <a:ext uri="{FF2B5EF4-FFF2-40B4-BE49-F238E27FC236}">
+                <a16:creationId xmlns:a16="http://schemas.microsoft.com/office/drawing/2014/main" id="{C7A32DE1-AA62-0542-95A5-93C4C6EFD0D3}"/>
+              </a:ext>
+            </a:extLst>
+          </p:cNvPr>
+          <p:cNvSpPr/>
+          <p:nvPr/>
+        </p:nvSpPr>
+        <p:spPr bwMode="auto">
+          <a:xfrm>
+            <a:off x="4482363" y="4437992"/>
+            <a:ext cx="245561" cy="731512"/>
+          </a:xfrm>
+          <a:prstGeom prst="roundRect">
+            <a:avLst/>
+          </a:prstGeom>
+          <a:solidFill>
+            <a:schemeClr val="bg2"/>
+          </a:solidFill>
+          <a:ln>
+            <a:solidFill>
+              <a:schemeClr val="bg1"/>
+            </a:solidFill>
+            <a:prstDash val="solid"/>
+            <a:headEnd type="none" w="med" len="med"/>
+            <a:tailEnd type="none" w="med" len="med"/>
+          </a:ln>
+          <a:effectLst/>
+        </p:spPr>
+        <p:style>
+          <a:lnRef idx="1">
+            <a:schemeClr val="accent5"/>
+          </a:lnRef>
+          <a:fillRef idx="3">
+            <a:schemeClr val="accent5"/>
+          </a:fillRef>
+          <a:effectRef idx="2">
+            <a:schemeClr val="accent5"/>
+          </a:effectRef>
+          <a:fontRef idx="minor">
+            <a:schemeClr val="lt1"/>
+          </a:fontRef>
+        </p:style>
+        <p:txBody>
+          <a:bodyPr vert="horz" wrap="square" lIns="0" tIns="0" rIns="0" bIns="0" numCol="1" rtlCol="0" anchor="ctr" anchorCtr="0" compatLnSpc="1">
+            <a:prstTxWarp prst="textNoShape">
+              <a:avLst/>
+            </a:prstTxWarp>
+            <a:noAutofit/>
+          </a:bodyPr>
+          <a:lstStyle/>
+          <a:p>
+            <a:pPr algn="ctr" defTabSz="1219170" fontAlgn="base">
+              <a:lnSpc>
+                <a:spcPct val="90000"/>
+              </a:lnSpc>
+              <a:spcBef>
+                <a:spcPct val="0"/>
+              </a:spcBef>
+              <a:spcAft>
+                <a:spcPct val="0"/>
+              </a:spcAft>
+            </a:pPr>
+            <a:r>
+              <a:rPr lang="en-US" sz="1200" dirty="0">
+                <a:solidFill>
+                  <a:schemeClr val="bg1"/>
+                </a:solidFill>
+              </a:rPr>
+              <a:t>3</a:t>
+            </a:r>
+            <a:endParaRPr lang="en-US" sz="667" dirty="0">
+              <a:solidFill>
+                <a:schemeClr val="bg1"/>
+              </a:solidFill>
+            </a:endParaRPr>
+          </a:p>
+        </p:txBody>
+      </p:sp>
+      <p:sp>
+        <p:nvSpPr>
+          <p:cNvPr id="20" name="Rounded Rectangle 19">
+            <a:extLst>
+              <a:ext uri="{FF2B5EF4-FFF2-40B4-BE49-F238E27FC236}">
+                <a16:creationId xmlns:a16="http://schemas.microsoft.com/office/drawing/2014/main" id="{65250C98-3EF7-D84C-9241-0ACC98F9DB15}"/>
+              </a:ext>
+            </a:extLst>
+          </p:cNvPr>
+          <p:cNvSpPr/>
+          <p:nvPr/>
+        </p:nvSpPr>
+        <p:spPr bwMode="auto">
+          <a:xfrm>
+            <a:off x="4727924" y="4437992"/>
+            <a:ext cx="245561" cy="731512"/>
+          </a:xfrm>
+          <a:prstGeom prst="roundRect">
+            <a:avLst/>
+          </a:prstGeom>
+          <a:solidFill>
+            <a:schemeClr val="bg2"/>
+          </a:solidFill>
+          <a:ln>
+            <a:solidFill>
+              <a:schemeClr val="bg1"/>
+            </a:solidFill>
+            <a:prstDash val="solid"/>
+            <a:headEnd type="none" w="med" len="med"/>
+            <a:tailEnd type="none" w="med" len="med"/>
+          </a:ln>
+          <a:effectLst/>
+        </p:spPr>
+        <p:style>
+          <a:lnRef idx="1">
+            <a:schemeClr val="accent5"/>
+          </a:lnRef>
+          <a:fillRef idx="3">
+            <a:schemeClr val="accent5"/>
+          </a:fillRef>
+          <a:effectRef idx="2">
+            <a:schemeClr val="accent5"/>
+          </a:effectRef>
+          <a:fontRef idx="minor">
+            <a:schemeClr val="lt1"/>
+          </a:fontRef>
+        </p:style>
+        <p:txBody>
+          <a:bodyPr vert="horz" wrap="square" lIns="0" tIns="0" rIns="0" bIns="0" numCol="1" rtlCol="0" anchor="ctr" anchorCtr="0" compatLnSpc="1">
+            <a:prstTxWarp prst="textNoShape">
+              <a:avLst/>
+            </a:prstTxWarp>
+            <a:noAutofit/>
+          </a:bodyPr>
+          <a:lstStyle/>
+          <a:p>
+            <a:pPr algn="ctr" defTabSz="1219170" fontAlgn="base">
+              <a:lnSpc>
+                <a:spcPct val="90000"/>
+              </a:lnSpc>
+              <a:spcBef>
+                <a:spcPct val="0"/>
+              </a:spcBef>
+              <a:spcAft>
+                <a:spcPct val="0"/>
+              </a:spcAft>
+            </a:pPr>
+            <a:r>
+              <a:rPr lang="en-US" sz="1200" dirty="0">
+                <a:solidFill>
+                  <a:schemeClr val="bg1"/>
+                </a:solidFill>
+              </a:rPr>
+              <a:t>4</a:t>
+            </a:r>
+            <a:endParaRPr lang="en-US" sz="667" dirty="0">
+              <a:solidFill>
+                <a:schemeClr val="bg1"/>
+              </a:solidFill>
+            </a:endParaRPr>
+          </a:p>
+        </p:txBody>
+      </p:sp>
+      <p:sp>
+        <p:nvSpPr>
+          <p:cNvPr id="21" name="Rounded Rectangle 20">
+            <a:extLst>
+              <a:ext uri="{FF2B5EF4-FFF2-40B4-BE49-F238E27FC236}">
+                <a16:creationId xmlns:a16="http://schemas.microsoft.com/office/drawing/2014/main" id="{349815D9-A544-C740-A98E-A4307CE7F984}"/>
+              </a:ext>
+            </a:extLst>
+          </p:cNvPr>
+          <p:cNvSpPr/>
+          <p:nvPr/>
+        </p:nvSpPr>
+        <p:spPr bwMode="auto">
+          <a:xfrm>
+            <a:off x="4958720" y="4437992"/>
+            <a:ext cx="245561" cy="731512"/>
+          </a:xfrm>
+          <a:prstGeom prst="roundRect">
+            <a:avLst/>
+          </a:prstGeom>
+          <a:solidFill>
+            <a:schemeClr val="bg2"/>
+          </a:solidFill>
+          <a:ln>
+            <a:solidFill>
+              <a:schemeClr val="bg1"/>
+            </a:solidFill>
+            <a:prstDash val="solid"/>
+            <a:headEnd type="none" w="med" len="med"/>
+            <a:tailEnd type="none" w="med" len="med"/>
+          </a:ln>
+          <a:effectLst/>
+        </p:spPr>
+        <p:style>
+          <a:lnRef idx="1">
+            <a:schemeClr val="accent5"/>
+          </a:lnRef>
+          <a:fillRef idx="3">
+            <a:schemeClr val="accent5"/>
+          </a:fillRef>
+          <a:effectRef idx="2">
+            <a:schemeClr val="accent5"/>
+          </a:effectRef>
+          <a:fontRef idx="minor">
+            <a:schemeClr val="lt1"/>
+          </a:fontRef>
+        </p:style>
+        <p:txBody>
+          <a:bodyPr vert="horz" wrap="square" lIns="0" tIns="0" rIns="0" bIns="0" numCol="1" rtlCol="0" anchor="ctr" anchorCtr="0" compatLnSpc="1">
+            <a:prstTxWarp prst="textNoShape">
+              <a:avLst/>
+            </a:prstTxWarp>
+            <a:noAutofit/>
+          </a:bodyPr>
+          <a:lstStyle/>
+          <a:p>
+            <a:pPr algn="ctr" defTabSz="1219170" fontAlgn="base">
+              <a:lnSpc>
+                <a:spcPct val="90000"/>
+              </a:lnSpc>
+              <a:spcBef>
+                <a:spcPct val="0"/>
+              </a:spcBef>
+              <a:spcAft>
+                <a:spcPct val="0"/>
+              </a:spcAft>
+            </a:pPr>
+            <a:r>
+              <a:rPr lang="en-US" sz="1200" dirty="0">
+                <a:solidFill>
+                  <a:schemeClr val="bg1"/>
+                </a:solidFill>
+              </a:rPr>
+              <a:t>5</a:t>
+            </a:r>
+            <a:endParaRPr lang="en-US" sz="667" dirty="0">
+              <a:solidFill>
+                <a:schemeClr val="bg1"/>
+              </a:solidFill>
+            </a:endParaRPr>
+          </a:p>
+        </p:txBody>
+      </p:sp>
+      <p:sp>
+        <p:nvSpPr>
+          <p:cNvPr id="22" name="AutoShape 4">
+            <a:extLst>
+              <a:ext uri="{FF2B5EF4-FFF2-40B4-BE49-F238E27FC236}">
+                <a16:creationId xmlns:a16="http://schemas.microsoft.com/office/drawing/2014/main" id="{D20B6BF8-2A57-924F-AB42-129B1DC6DBE6}"/>
+              </a:ext>
+            </a:extLst>
+          </p:cNvPr>
+          <p:cNvSpPr>
+            <a:spLocks noChangeArrowheads="1"/>
+          </p:cNvSpPr>
+          <p:nvPr/>
+        </p:nvSpPr>
+        <p:spPr bwMode="auto">
+          <a:xfrm>
+            <a:off x="2881464" y="4145695"/>
+            <a:ext cx="3513917" cy="1348479"/>
+          </a:xfrm>
+          <a:prstGeom prst="roundRect">
+            <a:avLst>
+              <a:gd name="adj" fmla="val 7117"/>
+            </a:avLst>
+          </a:prstGeom>
+          <a:noFill/>
+          <a:ln w="12700">
+            <a:solidFill>
+              <a:schemeClr val="accent3"/>
+            </a:solidFill>
+            <a:prstDash val="dash"/>
+            <a:round/>
+            <a:headEnd/>
+            <a:tailEnd/>
+          </a:ln>
+        </p:spPr>
+        <p:txBody>
+          <a:bodyPr lIns="0" tIns="0" rIns="0" bIns="0" anchor="b" anchorCtr="1"/>
+          <a:lstStyle/>
+          <a:p>
+            <a:pPr algn="ctr"/>
+            <a:endParaRPr lang="en-US" sz="1333" dirty="0"/>
+          </a:p>
+        </p:txBody>
+      </p:sp>
+      <p:sp>
+        <p:nvSpPr>
+          <p:cNvPr id="23" name="TextBox 22">
+            <a:extLst>
+              <a:ext uri="{FF2B5EF4-FFF2-40B4-BE49-F238E27FC236}">
+                <a16:creationId xmlns:a16="http://schemas.microsoft.com/office/drawing/2014/main" id="{87606592-A07A-924B-B639-76FB8A14520F}"/>
+              </a:ext>
+            </a:extLst>
+          </p:cNvPr>
+          <p:cNvSpPr txBox="1"/>
+          <p:nvPr/>
+        </p:nvSpPr>
+        <p:spPr>
+          <a:xfrm>
+            <a:off x="3682530" y="5209508"/>
+            <a:ext cx="1369862" cy="276999"/>
+          </a:xfrm>
+          <a:prstGeom prst="rect">
+            <a:avLst/>
+          </a:prstGeom>
+          <a:noFill/>
+        </p:spPr>
+        <p:txBody>
+          <a:bodyPr wrap="none" rtlCol="0">
+            <a:spAutoFit/>
+          </a:bodyPr>
+          <a:lstStyle/>
+          <a:p>
+            <a:r>
+              <a:rPr lang="en-US" sz="1200" dirty="0">
+                <a:solidFill>
+                  <a:schemeClr val="accent1">
+                    <a:lumMod val="25000"/>
+                  </a:schemeClr>
+                </a:solidFill>
+              </a:rPr>
+              <a:t>reeferTelemetries</a:t>
+            </a:r>
+          </a:p>
+        </p:txBody>
+      </p:sp>
+      <p:pic>
+        <p:nvPicPr>
+          <p:cNvPr id="24" name="Picture 23">
+            <a:extLst>
+              <a:ext uri="{FF2B5EF4-FFF2-40B4-BE49-F238E27FC236}">
+                <a16:creationId xmlns:a16="http://schemas.microsoft.com/office/drawing/2014/main" id="{B400E287-8B40-BE4C-B680-D40ED448B4E5}"/>
+              </a:ext>
+            </a:extLst>
+          </p:cNvPr>
+          <p:cNvPicPr>
+            <a:picLocks noChangeAspect="1"/>
+          </p:cNvPicPr>
+          <p:nvPr/>
+        </p:nvPicPr>
+        <p:blipFill>
+          <a:blip r:embed="rId3">
+            <a:extLst>
+              <a:ext uri="{28A0092B-C50C-407E-A947-70E740481C1C}">
+                <a14:useLocalDpi xmlns:a14="http://schemas.microsoft.com/office/drawing/2010/main" val="0"/>
+              </a:ext>
+            </a:extLst>
+          </a:blip>
+          <a:stretch>
+            <a:fillRect/>
+          </a:stretch>
+        </p:blipFill>
+        <p:spPr>
+          <a:xfrm>
+            <a:off x="2713993" y="5032053"/>
+            <a:ext cx="523018" cy="690721"/>
+          </a:xfrm>
+          <a:prstGeom prst="rect">
+            <a:avLst/>
+          </a:prstGeom>
+        </p:spPr>
+      </p:pic>
+      <p:pic>
+        <p:nvPicPr>
+          <p:cNvPr id="27" name="Picture 40">
+            <a:extLst>
+              <a:ext uri="{FF2B5EF4-FFF2-40B4-BE49-F238E27FC236}">
+                <a16:creationId xmlns:a16="http://schemas.microsoft.com/office/drawing/2014/main" id="{82D37B93-A674-6248-A0F6-C3053BF17E01}"/>
+              </a:ext>
+            </a:extLst>
+          </p:cNvPr>
+          <p:cNvPicPr>
+            <a:picLocks noChangeAspect="1"/>
+          </p:cNvPicPr>
+          <p:nvPr/>
+        </p:nvPicPr>
+        <p:blipFill>
+          <a:blip r:embed="rId4">
             <a:extLst>
               <a:ext uri="{28A0092B-C50C-407E-A947-70E740481C1C}">
                 <a14:useLocalDpi xmlns:a14="http://schemas.microsoft.com/office/drawing/2010/main" val="0"/>
@@ -17795,7 +18798,7 @@
         </p:blipFill>
         <p:spPr bwMode="auto">
           <a:xfrm>
-            <a:off x="116601" y="2734597"/>
+            <a:off x="-13004" y="5016111"/>
             <a:ext cx="1099134" cy="407338"/>
           </a:xfrm>
           <a:prstGeom prst="rect">
@@ -17828,29 +18831,32 @@
       </p:pic>
       <p:cxnSp>
         <p:nvCxnSpPr>
-          <p:cNvPr id="46" name="Elbow Connector 45">
+          <p:cNvPr id="28" name="Elbow Connector 27">
             <a:extLst>
               <a:ext uri="{FF2B5EF4-FFF2-40B4-BE49-F238E27FC236}">
-                <a16:creationId xmlns:a16="http://schemas.microsoft.com/office/drawing/2014/main" id="{B815F1F6-8EC9-A547-951A-6A6BA26A1B3E}"/>
+                <a16:creationId xmlns:a16="http://schemas.microsoft.com/office/drawing/2014/main" id="{C8FBC103-4DDC-FD42-8D32-2C65F09E2B19}"/>
               </a:ext>
             </a:extLst>
           </p:cNvPr>
           <p:cNvCxnSpPr>
             <a:cxnSpLocks/>
-            <a:stCxn id="9" idx="3"/>
-            <a:endCxn id="59" idx="1"/>
+            <a:stCxn id="15" idx="3"/>
+            <a:endCxn id="21" idx="2"/>
           </p:cNvCxnSpPr>
           <p:nvPr/>
         </p:nvCxnSpPr>
         <p:spPr>
           <a:xfrm>
-            <a:off x="2465614" y="2073727"/>
-            <a:ext cx="2093194" cy="516747"/>
-          </a:xfrm>
-          <a:prstGeom prst="bentConnector2">
-            <a:avLst/>
-          </a:prstGeom>
-          <a:ln>
+            <a:off x="2347079" y="4444393"/>
+            <a:ext cx="2734422" cy="725111"/>
+          </a:xfrm>
+          <a:prstGeom prst="bentConnector4">
+            <a:avLst>
+              <a:gd name="adj1" fmla="val 37228"/>
+              <a:gd name="adj2" fmla="val 243619"/>
+            </a:avLst>
+          </a:prstGeom>
+          <a:ln w="12700">
             <a:solidFill>
               <a:schemeClr val="accent6"/>
             </a:solidFill>
@@ -17875,33 +18881,33 @@
       </p:cxnSp>
       <p:cxnSp>
         <p:nvCxnSpPr>
-          <p:cNvPr id="71" name="Elbow Connector 70">
+          <p:cNvPr id="33" name="Elbow Connector 32">
             <a:extLst>
               <a:ext uri="{FF2B5EF4-FFF2-40B4-BE49-F238E27FC236}">
-                <a16:creationId xmlns:a16="http://schemas.microsoft.com/office/drawing/2014/main" id="{9B3950A4-1025-DB48-B886-5945ADD35206}"/>
+                <a16:creationId xmlns:a16="http://schemas.microsoft.com/office/drawing/2014/main" id="{A018039D-49E7-3C49-94D4-1BE530DE331F}"/>
               </a:ext>
             </a:extLst>
           </p:cNvPr>
           <p:cNvCxnSpPr>
             <a:cxnSpLocks/>
-            <a:stCxn id="45" idx="1"/>
-            <a:endCxn id="59" idx="4"/>
+            <a:stCxn id="20" idx="0"/>
+            <a:endCxn id="59" idx="3"/>
           </p:cNvCxnSpPr>
           <p:nvPr/>
         </p:nvCxnSpPr>
         <p:spPr>
-          <a:xfrm rot="10800000" flipV="1">
-            <a:off x="5157329" y="2100404"/>
-            <a:ext cx="1320870" cy="837862"/>
+          <a:xfrm rot="16200000" flipV="1">
+            <a:off x="4128790" y="3716076"/>
+            <a:ext cx="1151934" cy="291897"/>
           </a:xfrm>
           <a:prstGeom prst="bentConnector3">
             <a:avLst>
               <a:gd name="adj1" fmla="val 50000"/>
             </a:avLst>
           </a:prstGeom>
-          <a:ln>
+          <a:ln w="12700">
             <a:solidFill>
-              <a:srgbClr val="7030A0"/>
+              <a:srgbClr val="009643"/>
             </a:solidFill>
             <a:tailEnd type="triangle"/>
           </a:ln>
@@ -17924,10 +18930,10 @@
       </p:cxnSp>
       <p:sp>
         <p:nvSpPr>
-          <p:cNvPr id="45" name="Rounded Rectangle 44">
+          <p:cNvPr id="32" name="Rectangle 31">
             <a:extLst>
               <a:ext uri="{FF2B5EF4-FFF2-40B4-BE49-F238E27FC236}">
-                <a16:creationId xmlns:a16="http://schemas.microsoft.com/office/drawing/2014/main" id="{F495E1A9-5EC6-5446-ACF5-3911A287BB83}"/>
+                <a16:creationId xmlns:a16="http://schemas.microsoft.com/office/drawing/2014/main" id="{80B1BE04-8E41-6B41-9861-E9BB4FE73060}"/>
               </a:ext>
             </a:extLst>
           </p:cNvPr>
@@ -17936,108 +18942,10 @@
         </p:nvSpPr>
         <p:spPr>
           <a:xfrm>
-            <a:off x="6478199" y="1913633"/>
-            <a:ext cx="1749097" cy="373542"/>
-          </a:xfrm>
-          <a:prstGeom prst="roundRect">
-            <a:avLst>
-              <a:gd name="adj" fmla="val 9717"/>
-            </a:avLst>
-          </a:prstGeom>
-          <a:noFill/>
-          <a:ln w="12700">
-            <a:solidFill>
-              <a:schemeClr val="tx2">
-                <a:lumMod val="50000"/>
-              </a:schemeClr>
-            </a:solidFill>
-          </a:ln>
-          <a:effectLst/>
-        </p:spPr>
-        <p:style>
-          <a:lnRef idx="1">
-            <a:schemeClr val="dk1"/>
-          </a:lnRef>
-          <a:fillRef idx="2">
-            <a:schemeClr val="dk1"/>
-          </a:fillRef>
-          <a:effectRef idx="1">
-            <a:schemeClr val="dk1"/>
-          </a:effectRef>
-          <a:fontRef idx="minor">
-            <a:schemeClr val="dk1"/>
-          </a:fontRef>
-        </p:style>
-        <p:txBody>
-          <a:bodyPr rot="0" spcFirstLastPara="0" vertOverflow="overflow" horzOverflow="overflow" vert="horz" wrap="square" lIns="0" tIns="0" rIns="0" bIns="0" numCol="1" spcCol="0" rtlCol="0" fromWordArt="0" anchor="t" anchorCtr="0" forceAA="0" compatLnSpc="1">
-            <a:prstTxWarp prst="textNoShape">
-              <a:avLst/>
-            </a:prstTxWarp>
-            <a:noAutofit/>
-          </a:bodyPr>
-          <a:lstStyle/>
-          <a:p>
-            <a:r>
-              <a:rPr lang="en-US" sz="1200" baseline="0" dirty="0">
-                <a:solidFill>
-                  <a:schemeClr val="tx1"/>
-                </a:solidFill>
-                <a:latin typeface="IBM Plex Sans" panose="020B0503050203000203" pitchFamily="34" charset="77"/>
-                <a:cs typeface="Arial"/>
-              </a:rPr>
-              <a:t>Pandas DF</a:t>
-            </a:r>
-          </a:p>
-        </p:txBody>
-      </p:sp>
-      <p:pic>
-        <p:nvPicPr>
-          <p:cNvPr id="13" name="Picture 12">
-            <a:extLst>
-              <a:ext uri="{FF2B5EF4-FFF2-40B4-BE49-F238E27FC236}">
-                <a16:creationId xmlns:a16="http://schemas.microsoft.com/office/drawing/2014/main" id="{B81AAF60-BF23-E149-AC44-3DFB94494F2F}"/>
-              </a:ext>
-            </a:extLst>
-          </p:cNvPr>
-          <p:cNvPicPr>
-            <a:picLocks noChangeAspect="1"/>
-          </p:cNvPicPr>
-          <p:nvPr/>
-        </p:nvPicPr>
-        <p:blipFill>
-          <a:blip r:embed="rId3"/>
-          <a:stretch>
-            <a:fillRect/>
-          </a:stretch>
-        </p:blipFill>
-        <p:spPr>
-          <a:xfrm>
-            <a:off x="3492393" y="3041219"/>
-            <a:ext cx="638156" cy="680700"/>
+            <a:off x="3779270" y="3571943"/>
+            <a:ext cx="1651745" cy="415825"/>
           </a:xfrm>
           <a:prstGeom prst="rect">
-            <a:avLst/>
-          </a:prstGeom>
-        </p:spPr>
-      </p:pic>
-      <p:sp>
-        <p:nvSpPr>
-          <p:cNvPr id="59" name="Can 58">
-            <a:extLst>
-              <a:ext uri="{FF2B5EF4-FFF2-40B4-BE49-F238E27FC236}">
-                <a16:creationId xmlns:a16="http://schemas.microsoft.com/office/drawing/2014/main" id="{BF8D5F17-7886-6A49-A326-AB3283F367DA}"/>
-              </a:ext>
-            </a:extLst>
-          </p:cNvPr>
-          <p:cNvSpPr/>
-          <p:nvPr/>
-        </p:nvSpPr>
-        <p:spPr>
-          <a:xfrm>
-            <a:off x="3960287" y="2590474"/>
-            <a:ext cx="1197042" cy="695584"/>
-          </a:xfrm>
-          <a:prstGeom prst="can">
             <a:avLst/>
           </a:prstGeom>
           <a:solidFill>
@@ -18048,6 +18956,13 @@
           <a:ln>
             <a:noFill/>
           </a:ln>
+          <a:effectLst>
+            <a:outerShdw blurRad="50800" dist="38100" dir="5400000" algn="t" rotWithShape="0">
+              <a:prstClr val="black">
+                <a:alpha val="40000"/>
+              </a:prstClr>
+            </a:outerShdw>
+          </a:effectLst>
         </p:spPr>
         <p:style>
           <a:lnRef idx="2">
@@ -18071,8 +18986,315 @@
           <a:p>
             <a:pPr algn="ctr"/>
             <a:r>
+              <a:rPr lang="en-US" sz="1200" dirty="0"/>
+              <a:t>Long term persist stream</a:t>
+            </a:r>
+          </a:p>
+        </p:txBody>
+      </p:sp>
+      <p:sp>
+        <p:nvSpPr>
+          <p:cNvPr id="36" name="Can 35">
+            <a:extLst>
+              <a:ext uri="{FF2B5EF4-FFF2-40B4-BE49-F238E27FC236}">
+                <a16:creationId xmlns:a16="http://schemas.microsoft.com/office/drawing/2014/main" id="{838848AC-1D94-3D4E-9D79-D790EC064067}"/>
+              </a:ext>
+            </a:extLst>
+          </p:cNvPr>
+          <p:cNvSpPr/>
+          <p:nvPr/>
+        </p:nvSpPr>
+        <p:spPr>
+          <a:xfrm>
+            <a:off x="7108359" y="3489256"/>
+            <a:ext cx="895875" cy="695584"/>
+          </a:xfrm>
+          <a:prstGeom prst="can">
+            <a:avLst/>
+          </a:prstGeom>
+          <a:solidFill>
+            <a:schemeClr val="accent5">
+              <a:lumMod val="75000"/>
+            </a:schemeClr>
+          </a:solidFill>
+          <a:ln>
+            <a:noFill/>
+          </a:ln>
+        </p:spPr>
+        <p:style>
+          <a:lnRef idx="2">
+            <a:schemeClr val="accent1">
+              <a:shade val="50000"/>
+            </a:schemeClr>
+          </a:lnRef>
+          <a:fillRef idx="1">
+            <a:schemeClr val="accent1"/>
+          </a:fillRef>
+          <a:effectRef idx="0">
+            <a:schemeClr val="accent1"/>
+          </a:effectRef>
+          <a:fontRef idx="minor">
+            <a:schemeClr val="lt1"/>
+          </a:fontRef>
+        </p:style>
+        <p:txBody>
+          <a:bodyPr rtlCol="0" anchor="ctr"/>
+          <a:lstStyle/>
+          <a:p>
+            <a:pPr algn="ctr"/>
+            <a:r>
               <a:rPr lang="en-US" sz="1000" dirty="0"/>
-              <a:t>Reefer telemetries</a:t>
+              <a:t>Reefers Inventory</a:t>
+            </a:r>
+          </a:p>
+        </p:txBody>
+      </p:sp>
+      <p:sp>
+        <p:nvSpPr>
+          <p:cNvPr id="37" name="Can 36">
+            <a:extLst>
+              <a:ext uri="{FF2B5EF4-FFF2-40B4-BE49-F238E27FC236}">
+                <a16:creationId xmlns:a16="http://schemas.microsoft.com/office/drawing/2014/main" id="{8940F223-93A3-4947-A9E2-589C2FC0914F}"/>
+              </a:ext>
+            </a:extLst>
+          </p:cNvPr>
+          <p:cNvSpPr/>
+          <p:nvPr/>
+        </p:nvSpPr>
+        <p:spPr>
+          <a:xfrm>
+            <a:off x="8116630" y="3489256"/>
+            <a:ext cx="895875" cy="695584"/>
+          </a:xfrm>
+          <a:prstGeom prst="can">
+            <a:avLst/>
+          </a:prstGeom>
+          <a:solidFill>
+            <a:schemeClr val="accent5">
+              <a:lumMod val="75000"/>
+            </a:schemeClr>
+          </a:solidFill>
+          <a:ln>
+            <a:noFill/>
+          </a:ln>
+        </p:spPr>
+        <p:style>
+          <a:lnRef idx="2">
+            <a:schemeClr val="accent1">
+              <a:shade val="50000"/>
+            </a:schemeClr>
+          </a:lnRef>
+          <a:fillRef idx="1">
+            <a:schemeClr val="accent1"/>
+          </a:fillRef>
+          <a:effectRef idx="0">
+            <a:schemeClr val="accent1"/>
+          </a:effectRef>
+          <a:fontRef idx="minor">
+            <a:schemeClr val="lt1"/>
+          </a:fontRef>
+        </p:style>
+        <p:txBody>
+          <a:bodyPr rtlCol="0" anchor="ctr"/>
+          <a:lstStyle/>
+          <a:p>
+            <a:pPr algn="ctr"/>
+            <a:r>
+              <a:rPr lang="en-US" sz="1000" dirty="0"/>
+              <a:t>Products</a:t>
+            </a:r>
+          </a:p>
+        </p:txBody>
+      </p:sp>
+      <p:pic>
+        <p:nvPicPr>
+          <p:cNvPr id="38" name="Picture 37">
+            <a:extLst>
+              <a:ext uri="{FF2B5EF4-FFF2-40B4-BE49-F238E27FC236}">
+                <a16:creationId xmlns:a16="http://schemas.microsoft.com/office/drawing/2014/main" id="{3E12A240-C94D-F342-A515-AC9667796B7B}"/>
+              </a:ext>
+            </a:extLst>
+          </p:cNvPr>
+          <p:cNvPicPr>
+            <a:picLocks noChangeAspect="1"/>
+          </p:cNvPicPr>
+          <p:nvPr/>
+        </p:nvPicPr>
+        <p:blipFill>
+          <a:blip r:embed="rId5"/>
+          <a:stretch>
+            <a:fillRect/>
+          </a:stretch>
+        </p:blipFill>
+        <p:spPr>
+          <a:xfrm>
+            <a:off x="8941639" y="3913511"/>
+            <a:ext cx="638156" cy="680700"/>
+          </a:xfrm>
+          <a:prstGeom prst="rect">
+            <a:avLst/>
+          </a:prstGeom>
+        </p:spPr>
+      </p:pic>
+      <p:cxnSp>
+        <p:nvCxnSpPr>
+          <p:cNvPr id="39" name="Elbow Connector 38">
+            <a:extLst>
+              <a:ext uri="{FF2B5EF4-FFF2-40B4-BE49-F238E27FC236}">
+                <a16:creationId xmlns:a16="http://schemas.microsoft.com/office/drawing/2014/main" id="{2ADAE8E9-E8A0-C04F-AD33-82E1C5F42DB8}"/>
+              </a:ext>
+            </a:extLst>
+          </p:cNvPr>
+          <p:cNvCxnSpPr>
+            <a:cxnSpLocks/>
+            <a:stCxn id="45" idx="2"/>
+          </p:cNvCxnSpPr>
+          <p:nvPr/>
+        </p:nvCxnSpPr>
+        <p:spPr>
+          <a:xfrm rot="16200000" flipH="1">
+            <a:off x="7119144" y="2520778"/>
+            <a:ext cx="1151867" cy="684659"/>
+          </a:xfrm>
+          <a:prstGeom prst="bentConnector3">
+            <a:avLst>
+              <a:gd name="adj1" fmla="val 50000"/>
+            </a:avLst>
+          </a:prstGeom>
+          <a:ln w="12700">
+            <a:solidFill>
+              <a:srgbClr val="7030A0"/>
+            </a:solidFill>
+            <a:headEnd type="triangle"/>
+            <a:tailEnd type="none"/>
+          </a:ln>
+          <a:effectLst/>
+        </p:spPr>
+        <p:style>
+          <a:lnRef idx="2">
+            <a:schemeClr val="accent1"/>
+          </a:lnRef>
+          <a:fillRef idx="0">
+            <a:schemeClr val="accent1"/>
+          </a:fillRef>
+          <a:effectRef idx="1">
+            <a:schemeClr val="accent1"/>
+          </a:effectRef>
+          <a:fontRef idx="minor">
+            <a:schemeClr val="tx1"/>
+          </a:fontRef>
+        </p:style>
+      </p:cxnSp>
+      <p:sp>
+        <p:nvSpPr>
+          <p:cNvPr id="42" name="Oval 41">
+            <a:extLst>
+              <a:ext uri="{FF2B5EF4-FFF2-40B4-BE49-F238E27FC236}">
+                <a16:creationId xmlns:a16="http://schemas.microsoft.com/office/drawing/2014/main" id="{EF41234A-880A-8244-AA87-8EE3CA4327BE}"/>
+              </a:ext>
+            </a:extLst>
+          </p:cNvPr>
+          <p:cNvSpPr/>
+          <p:nvPr/>
+        </p:nvSpPr>
+        <p:spPr>
+          <a:xfrm>
+            <a:off x="246098" y="1544377"/>
+            <a:ext cx="290465" cy="369256"/>
+          </a:xfrm>
+          <a:prstGeom prst="ellipse">
+            <a:avLst/>
+          </a:prstGeom>
+          <a:solidFill>
+            <a:schemeClr val="tx2">
+              <a:lumMod val="75000"/>
+            </a:schemeClr>
+          </a:solidFill>
+          <a:ln>
+            <a:noFill/>
+          </a:ln>
+        </p:spPr>
+        <p:style>
+          <a:lnRef idx="2">
+            <a:schemeClr val="accent1">
+              <a:shade val="50000"/>
+            </a:schemeClr>
+          </a:lnRef>
+          <a:fillRef idx="1">
+            <a:schemeClr val="accent1"/>
+          </a:fillRef>
+          <a:effectRef idx="0">
+            <a:schemeClr val="accent1"/>
+          </a:effectRef>
+          <a:fontRef idx="minor">
+            <a:schemeClr val="lt1"/>
+          </a:fontRef>
+        </p:style>
+        <p:txBody>
+          <a:bodyPr rtlCol="0" anchor="ctr"/>
+          <a:lstStyle/>
+          <a:p>
+            <a:pPr algn="ctr"/>
+            <a:r>
+              <a:rPr lang="en-US" sz="1400" dirty="0"/>
+              <a:t>1</a:t>
+            </a:r>
+          </a:p>
+        </p:txBody>
+      </p:sp>
+      <p:sp>
+        <p:nvSpPr>
+          <p:cNvPr id="43" name="Oval 42">
+            <a:extLst>
+              <a:ext uri="{FF2B5EF4-FFF2-40B4-BE49-F238E27FC236}">
+                <a16:creationId xmlns:a16="http://schemas.microsoft.com/office/drawing/2014/main" id="{18795C1C-9E4F-AA4C-9D51-61F797DA92E3}"/>
+              </a:ext>
+            </a:extLst>
+          </p:cNvPr>
+          <p:cNvSpPr/>
+          <p:nvPr/>
+        </p:nvSpPr>
+        <p:spPr>
+          <a:xfrm>
+            <a:off x="795665" y="5454503"/>
+            <a:ext cx="290465" cy="369256"/>
+          </a:xfrm>
+          <a:prstGeom prst="ellipse">
+            <a:avLst/>
+          </a:prstGeom>
+          <a:solidFill>
+            <a:schemeClr val="tx2">
+              <a:lumMod val="75000"/>
+            </a:schemeClr>
+          </a:solidFill>
+          <a:ln>
+            <a:noFill/>
+          </a:ln>
+        </p:spPr>
+        <p:style>
+          <a:lnRef idx="2">
+            <a:schemeClr val="accent1">
+              <a:shade val="50000"/>
+            </a:schemeClr>
+          </a:lnRef>
+          <a:fillRef idx="1">
+            <a:schemeClr val="accent1"/>
+          </a:fillRef>
+          <a:effectRef idx="0">
+            <a:schemeClr val="accent1"/>
+          </a:effectRef>
+          <a:fontRef idx="minor">
+            <a:schemeClr val="lt1"/>
+          </a:fontRef>
+        </p:style>
+        <p:txBody>
+          <a:bodyPr rtlCol="0" anchor="ctr"/>
+          <a:lstStyle/>
+          <a:p>
+            <a:pPr algn="ctr"/>
+            <a:r>
+              <a:rPr lang="en-US" sz="1400" dirty="0"/>
+              <a:t>2</a:t>
             </a:r>
           </a:p>
         </p:txBody>
@@ -19424,6 +20646,36 @@
           </a:p>
         </p:txBody>
       </p:sp>
+      <p:pic>
+        <p:nvPicPr>
+          <p:cNvPr id="26" name="Picture 25">
+            <a:extLst>
+              <a:ext uri="{FF2B5EF4-FFF2-40B4-BE49-F238E27FC236}">
+                <a16:creationId xmlns:a16="http://schemas.microsoft.com/office/drawing/2014/main" id="{509913A5-E445-C54D-8C8A-64EA88153B4B}"/>
+              </a:ext>
+            </a:extLst>
+          </p:cNvPr>
+          <p:cNvPicPr>
+            <a:picLocks noChangeAspect="1"/>
+          </p:cNvPicPr>
+          <p:nvPr/>
+        </p:nvPicPr>
+        <p:blipFill>
+          <a:blip r:embed="rId4"/>
+          <a:stretch>
+            <a:fillRect/>
+          </a:stretch>
+        </p:blipFill>
+        <p:spPr>
+          <a:xfrm>
+            <a:off x="8048469" y="4322790"/>
+            <a:ext cx="638156" cy="680700"/>
+          </a:xfrm>
+          <a:prstGeom prst="rect">
+            <a:avLst/>
+          </a:prstGeom>
+        </p:spPr>
+      </p:pic>
     </p:spTree>
     <p:extLst>
       <p:ext uri="{BB962C8B-B14F-4D97-AF65-F5344CB8AC3E}">

</xml_diff>

<commit_message>
Deployed 8d14e1b with MkDocs version: 1.0.4
</commit_message>
<xml_diff>
--- a/diagrams.pptx
+++ b/diagrams.pptx
@@ -282,7 +282,7 @@
               <a:pPr>
                 <a:defRPr/>
               </a:pPr>
-              <a:t>1/6/20</a:t>
+              <a:t>1/7/20</a:t>
             </a:fld>
             <a:endParaRPr lang="en-US" dirty="0"/>
           </a:p>
@@ -13830,12 +13830,72 @@
           </a:p>
         </p:txBody>
       </p:sp>
+      <p:pic>
+        <p:nvPicPr>
+          <p:cNvPr id="6" name="Picture 5">
+            <a:extLst>
+              <a:ext uri="{FF2B5EF4-FFF2-40B4-BE49-F238E27FC236}">
+                <a16:creationId xmlns:a16="http://schemas.microsoft.com/office/drawing/2014/main" id="{07AC0BFF-594E-D943-9423-6F5BB0B092D4}"/>
+              </a:ext>
+            </a:extLst>
+          </p:cNvPr>
+          <p:cNvPicPr>
+            <a:picLocks noChangeAspect="1"/>
+          </p:cNvPicPr>
+          <p:nvPr/>
+        </p:nvPicPr>
+        <p:blipFill>
+          <a:blip r:embed="rId2"/>
+          <a:stretch>
+            <a:fillRect/>
+          </a:stretch>
+        </p:blipFill>
+        <p:spPr>
+          <a:xfrm>
+            <a:off x="2590800" y="5476455"/>
+            <a:ext cx="388273" cy="354992"/>
+          </a:xfrm>
+          <a:prstGeom prst="rect">
+            <a:avLst/>
+          </a:prstGeom>
+        </p:spPr>
+      </p:pic>
+      <p:pic>
+        <p:nvPicPr>
+          <p:cNvPr id="7" name="Picture 6">
+            <a:extLst>
+              <a:ext uri="{FF2B5EF4-FFF2-40B4-BE49-F238E27FC236}">
+                <a16:creationId xmlns:a16="http://schemas.microsoft.com/office/drawing/2014/main" id="{34E902ED-15BC-414A-8ABD-63DB888CC4B7}"/>
+              </a:ext>
+            </a:extLst>
+          </p:cNvPr>
+          <p:cNvPicPr>
+            <a:picLocks noChangeAspect="1"/>
+          </p:cNvPicPr>
+          <p:nvPr/>
+        </p:nvPicPr>
+        <p:blipFill>
+          <a:blip r:embed="rId3"/>
+          <a:stretch>
+            <a:fillRect/>
+          </a:stretch>
+        </p:blipFill>
+        <p:spPr>
+          <a:xfrm>
+            <a:off x="6225398" y="5425002"/>
+            <a:ext cx="459096" cy="393976"/>
+          </a:xfrm>
+          <a:prstGeom prst="rect">
+            <a:avLst/>
+          </a:prstGeom>
+        </p:spPr>
+      </p:pic>
       <p:sp>
         <p:nvSpPr>
-          <p:cNvPr id="5" name="AutoShape 4">
-            <a:extLst>
-              <a:ext uri="{FF2B5EF4-FFF2-40B4-BE49-F238E27FC236}">
-                <a16:creationId xmlns:a16="http://schemas.microsoft.com/office/drawing/2014/main" id="{684E09B8-BBC1-064E-8FF3-CD8302D16690}"/>
+          <p:cNvPr id="11" name="AutoShape 4">
+            <a:extLst>
+              <a:ext uri="{FF2B5EF4-FFF2-40B4-BE49-F238E27FC236}">
+                <a16:creationId xmlns:a16="http://schemas.microsoft.com/office/drawing/2014/main" id="{C64ABD7E-5043-7340-8CC0-841277EF50A1}"/>
               </a:ext>
             </a:extLst>
           </p:cNvPr>
@@ -13846,8 +13906,8 @@
         </p:nvSpPr>
         <p:spPr bwMode="auto">
           <a:xfrm>
-            <a:off x="2645950" y="5150367"/>
-            <a:ext cx="4770849" cy="680686"/>
+            <a:off x="2668344" y="3448935"/>
+            <a:ext cx="4097228" cy="2382118"/>
           </a:xfrm>
           <a:prstGeom prst="roundRect">
             <a:avLst>
@@ -13886,127 +13946,6 @@
                   <a:srgbClr val="6D7777"/>
                 </a:solidFill>
               </a:rPr>
-              <a:t>Infrastructure</a:t>
-            </a:r>
-          </a:p>
-        </p:txBody>
-      </p:sp>
-      <p:pic>
-        <p:nvPicPr>
-          <p:cNvPr id="6" name="Picture 5">
-            <a:extLst>
-              <a:ext uri="{FF2B5EF4-FFF2-40B4-BE49-F238E27FC236}">
-                <a16:creationId xmlns:a16="http://schemas.microsoft.com/office/drawing/2014/main" id="{07AC0BFF-594E-D943-9423-6F5BB0B092D4}"/>
-              </a:ext>
-            </a:extLst>
-          </p:cNvPr>
-          <p:cNvPicPr>
-            <a:picLocks noChangeAspect="1"/>
-          </p:cNvPicPr>
-          <p:nvPr/>
-        </p:nvPicPr>
-        <p:blipFill>
-          <a:blip r:embed="rId2"/>
-          <a:stretch>
-            <a:fillRect/>
-          </a:stretch>
-        </p:blipFill>
-        <p:spPr>
-          <a:xfrm>
-            <a:off x="4030042" y="5259975"/>
-            <a:ext cx="388273" cy="354992"/>
-          </a:xfrm>
-          <a:prstGeom prst="rect">
-            <a:avLst/>
-          </a:prstGeom>
-        </p:spPr>
-      </p:pic>
-      <p:pic>
-        <p:nvPicPr>
-          <p:cNvPr id="7" name="Picture 6">
-            <a:extLst>
-              <a:ext uri="{FF2B5EF4-FFF2-40B4-BE49-F238E27FC236}">
-                <a16:creationId xmlns:a16="http://schemas.microsoft.com/office/drawing/2014/main" id="{34E902ED-15BC-414A-8ABD-63DB888CC4B7}"/>
-              </a:ext>
-            </a:extLst>
-          </p:cNvPr>
-          <p:cNvPicPr>
-            <a:picLocks noChangeAspect="1"/>
-          </p:cNvPicPr>
-          <p:nvPr/>
-        </p:nvPicPr>
-        <p:blipFill>
-          <a:blip r:embed="rId3"/>
-          <a:stretch>
-            <a:fillRect/>
-          </a:stretch>
-        </p:blipFill>
-        <p:spPr>
-          <a:xfrm>
-            <a:off x="5688009" y="5259975"/>
-            <a:ext cx="459096" cy="393976"/>
-          </a:xfrm>
-          <a:prstGeom prst="rect">
-            <a:avLst/>
-          </a:prstGeom>
-        </p:spPr>
-      </p:pic>
-      <p:sp>
-        <p:nvSpPr>
-          <p:cNvPr id="11" name="AutoShape 4">
-            <a:extLst>
-              <a:ext uri="{FF2B5EF4-FFF2-40B4-BE49-F238E27FC236}">
-                <a16:creationId xmlns:a16="http://schemas.microsoft.com/office/drawing/2014/main" id="{C64ABD7E-5043-7340-8CC0-841277EF50A1}"/>
-              </a:ext>
-            </a:extLst>
-          </p:cNvPr>
-          <p:cNvSpPr>
-            <a:spLocks noChangeArrowheads="1"/>
-          </p:cNvSpPr>
-          <p:nvPr/>
-        </p:nvSpPr>
-        <p:spPr bwMode="auto">
-          <a:xfrm>
-            <a:off x="2645950" y="3448935"/>
-            <a:ext cx="4770849" cy="1396809"/>
-          </a:xfrm>
-          <a:prstGeom prst="roundRect">
-            <a:avLst>
-              <a:gd name="adj" fmla="val 7117"/>
-            </a:avLst>
-          </a:prstGeom>
-          <a:noFill/>
-          <a:ln w="12700">
-            <a:solidFill>
-              <a:srgbClr val="5596E6">
-                <a:lumMod val="50000"/>
-              </a:srgbClr>
-            </a:solidFill>
-            <a:prstDash val="dash"/>
-            <a:round/>
-            <a:headEnd/>
-            <a:tailEnd/>
-          </a:ln>
-        </p:spPr>
-        <p:txBody>
-          <a:bodyPr lIns="0" tIns="0" rIns="0" bIns="0" anchor="b" anchorCtr="1"/>
-          <a:lstStyle/>
-          <a:p>
-            <a:pPr algn="ctr" defTabSz="1219170" eaLnBrk="1" fontAlgn="auto" hangingPunct="1">
-              <a:spcBef>
-                <a:spcPts val="0"/>
-              </a:spcBef>
-              <a:spcAft>
-                <a:spcPts val="0"/>
-              </a:spcAft>
-              <a:defRPr/>
-            </a:pPr>
-            <a:r>
-              <a:rPr lang="en-US" sz="1333" kern="0" dirty="0">
-                <a:solidFill>
-                  <a:srgbClr val="6D7777"/>
-                </a:solidFill>
-              </a:rPr>
               <a:t>Cloud Pak</a:t>
             </a:r>
           </a:p>
@@ -14034,8 +13973,8 @@
         </p:blipFill>
         <p:spPr>
           <a:xfrm>
-            <a:off x="4081744" y="3679244"/>
-            <a:ext cx="673143" cy="879207"/>
+            <a:off x="7197388" y="3716209"/>
+            <a:ext cx="667636" cy="872014"/>
           </a:xfrm>
           <a:prstGeom prst="rect">
             <a:avLst/>
@@ -14064,7 +14003,7 @@
         </p:blipFill>
         <p:spPr>
           <a:xfrm>
-            <a:off x="3088358" y="3679245"/>
+            <a:off x="2944665" y="3679245"/>
             <a:ext cx="790605" cy="879207"/>
           </a:xfrm>
           <a:prstGeom prst="rect">
@@ -14086,7 +14025,7 @@
         </p:nvSpPr>
         <p:spPr>
           <a:xfrm>
-            <a:off x="4803212" y="2189569"/>
+            <a:off x="4444513" y="2178376"/>
             <a:ext cx="1176988" cy="493916"/>
           </a:xfrm>
           <a:prstGeom prst="rect">
@@ -14164,8 +14103,8 @@
         </p:nvSpPr>
         <p:spPr bwMode="auto">
           <a:xfrm>
-            <a:off x="2590800" y="1738123"/>
-            <a:ext cx="4825999" cy="1396809"/>
+            <a:off x="2232101" y="1726930"/>
+            <a:ext cx="5873931" cy="1396809"/>
           </a:xfrm>
           <a:prstGeom prst="roundRect">
             <a:avLst>
@@ -14231,7 +14170,7 @@
         </p:blipFill>
         <p:spPr>
           <a:xfrm>
-            <a:off x="4955677" y="3679244"/>
+            <a:off x="4811984" y="3679244"/>
             <a:ext cx="872059" cy="879207"/>
           </a:xfrm>
           <a:prstGeom prst="rect">
@@ -14253,7 +14192,7 @@
         </p:nvSpPr>
         <p:spPr>
           <a:xfrm>
-            <a:off x="6096000" y="2179222"/>
+            <a:off x="5737301" y="2168029"/>
             <a:ext cx="1176988" cy="493916"/>
           </a:xfrm>
           <a:prstGeom prst="rect">
@@ -14329,7 +14268,7 @@
         </p:nvSpPr>
         <p:spPr>
           <a:xfrm>
-            <a:off x="3483660" y="2179222"/>
+            <a:off x="3124961" y="2168029"/>
             <a:ext cx="1176988" cy="493916"/>
           </a:xfrm>
           <a:prstGeom prst="rect">
@@ -14386,7 +14325,7 @@
                 </a:solidFill>
                 <a:latin typeface="Arial"/>
               </a:rPr>
-              <a:t>Scoring MS</a:t>
+              <a:t>Scoring Agent</a:t>
             </a:r>
           </a:p>
         </p:txBody>
@@ -14405,7 +14344,7 @@
         </p:nvSpPr>
         <p:spPr>
           <a:xfrm>
-            <a:off x="2645950" y="1818852"/>
+            <a:off x="2287251" y="1807659"/>
             <a:ext cx="789271" cy="1214657"/>
           </a:xfrm>
           <a:prstGeom prst="rect">
@@ -14489,12 +14428,15 @@
         </p:blipFill>
         <p:spPr>
           <a:xfrm>
-            <a:off x="5973911" y="3679244"/>
+            <a:off x="3813687" y="3679244"/>
             <a:ext cx="940075" cy="879207"/>
           </a:xfrm>
           <a:prstGeom prst="rect">
             <a:avLst/>
           </a:prstGeom>
+          <a:solidFill>
+            <a:srgbClr val="0076FF"/>
+          </a:solidFill>
         </p:spPr>
       </p:pic>
       <p:sp>
@@ -14648,6 +14590,284 @@
           </a:prstGeom>
         </p:spPr>
       </p:pic>
+      <p:sp>
+        <p:nvSpPr>
+          <p:cNvPr id="8" name="Rectangle 7">
+            <a:extLst>
+              <a:ext uri="{FF2B5EF4-FFF2-40B4-BE49-F238E27FC236}">
+                <a16:creationId xmlns:a16="http://schemas.microsoft.com/office/drawing/2014/main" id="{78618C6E-B5CD-6C48-8919-34C3FC3874F5}"/>
+              </a:ext>
+            </a:extLst>
+          </p:cNvPr>
+          <p:cNvSpPr/>
+          <p:nvPr/>
+        </p:nvSpPr>
+        <p:spPr>
+          <a:xfrm>
+            <a:off x="5739193" y="3692240"/>
+            <a:ext cx="872060" cy="895983"/>
+          </a:xfrm>
+          <a:prstGeom prst="rect">
+            <a:avLst/>
+          </a:prstGeom>
+          <a:solidFill>
+            <a:srgbClr val="0076FF"/>
+          </a:solidFill>
+          <a:ln>
+            <a:noFill/>
+          </a:ln>
+        </p:spPr>
+        <p:style>
+          <a:lnRef idx="2">
+            <a:schemeClr val="accent1">
+              <a:shade val="50000"/>
+            </a:schemeClr>
+          </a:lnRef>
+          <a:fillRef idx="1">
+            <a:schemeClr val="accent1"/>
+          </a:fillRef>
+          <a:effectRef idx="0">
+            <a:schemeClr val="accent1"/>
+          </a:effectRef>
+          <a:fontRef idx="minor">
+            <a:schemeClr val="lt1"/>
+          </a:fontRef>
+        </p:style>
+        <p:txBody>
+          <a:bodyPr rtlCol="0" anchor="b"/>
+          <a:lstStyle/>
+          <a:p>
+            <a:pPr algn="ctr"/>
+            <a:r>
+              <a:rPr lang="en-US" sz="900" dirty="0">
+                <a:solidFill>
+                  <a:schemeClr val="bg1"/>
+                </a:solidFill>
+              </a:rPr>
+              <a:t>MCM</a:t>
+            </a:r>
+          </a:p>
+        </p:txBody>
+      </p:sp>
+      <p:sp>
+        <p:nvSpPr>
+          <p:cNvPr id="9" name="Hexagon 8">
+            <a:extLst>
+              <a:ext uri="{FF2B5EF4-FFF2-40B4-BE49-F238E27FC236}">
+                <a16:creationId xmlns:a16="http://schemas.microsoft.com/office/drawing/2014/main" id="{935AE278-206C-CC47-BD89-EF0717D01791}"/>
+              </a:ext>
+            </a:extLst>
+          </p:cNvPr>
+          <p:cNvSpPr/>
+          <p:nvPr/>
+        </p:nvSpPr>
+        <p:spPr>
+          <a:xfrm>
+            <a:off x="5907010" y="3759261"/>
+            <a:ext cx="471385" cy="522463"/>
+          </a:xfrm>
+          <a:prstGeom prst="hexagon">
+            <a:avLst/>
+          </a:prstGeom>
+          <a:noFill/>
+          <a:ln w="9525">
+            <a:solidFill>
+              <a:schemeClr val="bg1"/>
+            </a:solidFill>
+          </a:ln>
+        </p:spPr>
+        <p:style>
+          <a:lnRef idx="2">
+            <a:schemeClr val="accent1">
+              <a:shade val="50000"/>
+            </a:schemeClr>
+          </a:lnRef>
+          <a:fillRef idx="1">
+            <a:schemeClr val="accent1"/>
+          </a:fillRef>
+          <a:effectRef idx="0">
+            <a:schemeClr val="accent1"/>
+          </a:effectRef>
+          <a:fontRef idx="minor">
+            <a:schemeClr val="lt1"/>
+          </a:fontRef>
+        </p:style>
+        <p:txBody>
+          <a:bodyPr rtlCol="0" anchor="ctr"/>
+          <a:lstStyle/>
+          <a:p>
+            <a:pPr algn="ctr"/>
+            <a:endParaRPr lang="en-US"/>
+          </a:p>
+        </p:txBody>
+      </p:sp>
+      <p:sp>
+        <p:nvSpPr>
+          <p:cNvPr id="25" name="AutoShape 4">
+            <a:extLst>
+              <a:ext uri="{FF2B5EF4-FFF2-40B4-BE49-F238E27FC236}">
+                <a16:creationId xmlns:a16="http://schemas.microsoft.com/office/drawing/2014/main" id="{25A1A6CF-BEC6-5743-B48E-1442104E1CA2}"/>
+              </a:ext>
+            </a:extLst>
+          </p:cNvPr>
+          <p:cNvSpPr>
+            <a:spLocks noChangeArrowheads="1"/>
+          </p:cNvSpPr>
+          <p:nvPr/>
+        </p:nvSpPr>
+        <p:spPr bwMode="auto">
+          <a:xfrm>
+            <a:off x="6861199" y="3448935"/>
+            <a:ext cx="1244833" cy="2382118"/>
+          </a:xfrm>
+          <a:prstGeom prst="roundRect">
+            <a:avLst>
+              <a:gd name="adj" fmla="val 7117"/>
+            </a:avLst>
+          </a:prstGeom>
+          <a:noFill/>
+          <a:ln w="12700">
+            <a:solidFill>
+              <a:srgbClr val="5596E6">
+                <a:lumMod val="50000"/>
+              </a:srgbClr>
+            </a:solidFill>
+            <a:prstDash val="dash"/>
+            <a:round/>
+            <a:headEnd/>
+            <a:tailEnd/>
+          </a:ln>
+        </p:spPr>
+        <p:txBody>
+          <a:bodyPr lIns="0" tIns="0" rIns="0" bIns="0" anchor="b" anchorCtr="1"/>
+          <a:lstStyle/>
+          <a:p>
+            <a:pPr algn="ctr" defTabSz="1219170" eaLnBrk="1" fontAlgn="auto" hangingPunct="1">
+              <a:spcBef>
+                <a:spcPts val="0"/>
+              </a:spcBef>
+              <a:spcAft>
+                <a:spcPts val="0"/>
+              </a:spcAft>
+              <a:defRPr/>
+            </a:pPr>
+            <a:r>
+              <a:rPr lang="en-US" sz="1333" kern="0" dirty="0">
+                <a:solidFill>
+                  <a:srgbClr val="6D7777"/>
+                </a:solidFill>
+              </a:rPr>
+              <a:t>Cloud Pak</a:t>
+            </a:r>
+          </a:p>
+        </p:txBody>
+      </p:sp>
+      <p:pic>
+        <p:nvPicPr>
+          <p:cNvPr id="26" name="Picture 25">
+            <a:extLst>
+              <a:ext uri="{FF2B5EF4-FFF2-40B4-BE49-F238E27FC236}">
+                <a16:creationId xmlns:a16="http://schemas.microsoft.com/office/drawing/2014/main" id="{CCA4C1A5-3EDC-0A42-8A1E-6AAAF8D1AB7B}"/>
+              </a:ext>
+            </a:extLst>
+          </p:cNvPr>
+          <p:cNvPicPr>
+            <a:picLocks noChangeAspect="1"/>
+          </p:cNvPicPr>
+          <p:nvPr/>
+        </p:nvPicPr>
+        <p:blipFill>
+          <a:blip r:embed="rId2"/>
+          <a:stretch>
+            <a:fillRect/>
+          </a:stretch>
+        </p:blipFill>
+        <p:spPr>
+          <a:xfrm>
+            <a:off x="6769758" y="5583377"/>
+            <a:ext cx="292646" cy="267562"/>
+          </a:xfrm>
+          <a:prstGeom prst="rect">
+            <a:avLst/>
+          </a:prstGeom>
+        </p:spPr>
+      </p:pic>
+      <p:sp>
+        <p:nvSpPr>
+          <p:cNvPr id="27" name="Rectangle 26">
+            <a:extLst>
+              <a:ext uri="{FF2B5EF4-FFF2-40B4-BE49-F238E27FC236}">
+                <a16:creationId xmlns:a16="http://schemas.microsoft.com/office/drawing/2014/main" id="{F9DCE707-5773-2140-B55A-25773FA76FC6}"/>
+              </a:ext>
+            </a:extLst>
+          </p:cNvPr>
+          <p:cNvSpPr/>
+          <p:nvPr/>
+        </p:nvSpPr>
+        <p:spPr>
+          <a:xfrm>
+            <a:off x="7030089" y="2178376"/>
+            <a:ext cx="982749" cy="493916"/>
+          </a:xfrm>
+          <a:prstGeom prst="rect">
+            <a:avLst/>
+          </a:prstGeom>
+          <a:solidFill>
+            <a:schemeClr val="bg1">
+              <a:lumMod val="65000"/>
+            </a:schemeClr>
+          </a:solidFill>
+          <a:ln>
+            <a:noFill/>
+          </a:ln>
+          <a:effectLst>
+            <a:outerShdw blurRad="50800" dist="38100" dir="5400000" algn="t" rotWithShape="0">
+              <a:prstClr val="black">
+                <a:alpha val="40000"/>
+              </a:prstClr>
+            </a:outerShdw>
+          </a:effectLst>
+        </p:spPr>
+        <p:style>
+          <a:lnRef idx="2">
+            <a:schemeClr val="accent1">
+              <a:shade val="50000"/>
+            </a:schemeClr>
+          </a:lnRef>
+          <a:fillRef idx="1">
+            <a:schemeClr val="accent1"/>
+          </a:fillRef>
+          <a:effectRef idx="0">
+            <a:schemeClr val="accent1"/>
+          </a:effectRef>
+          <a:fontRef idx="minor">
+            <a:schemeClr val="lt1"/>
+          </a:fontRef>
+        </p:style>
+        <p:txBody>
+          <a:bodyPr rtlCol="0" anchor="ctr"/>
+          <a:lstStyle/>
+          <a:p>
+            <a:pPr algn="ctr" defTabSz="914377" eaLnBrk="1" fontAlgn="auto" hangingPunct="1">
+              <a:spcBef>
+                <a:spcPts val="0"/>
+              </a:spcBef>
+              <a:spcAft>
+                <a:spcPts val="0"/>
+              </a:spcAft>
+            </a:pPr>
+            <a:r>
+              <a:rPr lang="en-US" sz="1100" dirty="0">
+                <a:solidFill>
+                  <a:schemeClr val="bg1"/>
+                </a:solidFill>
+                <a:latin typeface="Arial"/>
+              </a:rPr>
+              <a:t>Predictive service</a:t>
+            </a:r>
+          </a:p>
+        </p:txBody>
+      </p:sp>
     </p:spTree>
     <p:extLst>
       <p:ext uri="{BB962C8B-B14F-4D97-AF65-F5344CB8AC3E}">
@@ -21202,7 +21422,7 @@
             <a:effectLst/>
             <a:extLst>
               <a:ext uri="{C572A759-6A51-4108-AA02-DFA0A04FC94B}">
-                <ma14:wrappingTextBoxFlag xmlns:ma14="http://schemas.microsoft.com/office/mac/drawingml/2011/main" xmlns="" val="1"/>
+                <ma14:wrappingTextBoxFlag xmlns="" xmlns:ma14="http://schemas.microsoft.com/office/mac/drawingml/2011/main" val="1"/>
               </a:ext>
             </a:extLst>
           </p:spPr>
@@ -23332,7 +23552,7 @@
             <a:effectLst/>
             <a:extLst>
               <a:ext uri="{C572A759-6A51-4108-AA02-DFA0A04FC94B}">
-                <ma14:wrappingTextBoxFlag xmlns:ma14="http://schemas.microsoft.com/office/mac/drawingml/2011/main" xmlns="" val="1"/>
+                <ma14:wrappingTextBoxFlag xmlns="" xmlns:ma14="http://schemas.microsoft.com/office/mac/drawingml/2011/main" val="1"/>
               </a:ext>
             </a:extLst>
           </p:spPr>

</xml_diff>

<commit_message>
Deployed b39cc44 with MkDocs version: 1.0.4
</commit_message>
<xml_diff>
--- a/diagrams.pptx
+++ b/diagrams.pptx
@@ -285,7 +285,7 @@
               <a:pPr>
                 <a:defRPr/>
               </a:pPr>
-              <a:t>1/20/20</a:t>
+              <a:t>2/18/20</a:t>
             </a:fld>
             <a:endParaRPr lang="en-US" dirty="0"/>
           </a:p>
@@ -10153,7 +10153,7 @@
             <a:effectLst/>
             <a:extLst>
               <a:ext uri="{C572A759-6A51-4108-AA02-DFA0A04FC94B}">
-                <ma14:wrappingTextBoxFlag xmlns="" xmlns:ma14="http://schemas.microsoft.com/office/mac/drawingml/2011/main" val="1"/>
+                <ma14:wrappingTextBoxFlag xmlns:ma14="http://schemas.microsoft.com/office/mac/drawingml/2011/main" xmlns="" val="1"/>
               </a:ext>
             </a:extLst>
           </p:spPr>
@@ -12283,7 +12283,7 @@
             <a:effectLst/>
             <a:extLst>
               <a:ext uri="{C572A759-6A51-4108-AA02-DFA0A04FC94B}">
-                <ma14:wrappingTextBoxFlag xmlns="" xmlns:ma14="http://schemas.microsoft.com/office/mac/drawingml/2011/main" val="1"/>
+                <ma14:wrappingTextBoxFlag xmlns:ma14="http://schemas.microsoft.com/office/mac/drawingml/2011/main" xmlns="" val="1"/>
               </a:ext>
             </a:extLst>
           </p:spPr>
@@ -15749,7 +15749,7 @@
             <a:pPr algn="ctr"/>
             <a:r>
               <a:rPr lang="en-US" sz="1600" dirty="0"/>
-              <a:t>Container Consumer</a:t>
+              <a:t>Reefer Container Manager</a:t>
             </a:r>
           </a:p>
         </p:txBody>
@@ -16389,7 +16389,7 @@
         </p:nvSpPr>
         <p:spPr>
           <a:xfrm>
-            <a:off x="6864192" y="1605896"/>
+            <a:off x="6864192" y="1559402"/>
             <a:ext cx="2037645" cy="1044724"/>
           </a:xfrm>
           <a:prstGeom prst="rect">
@@ -16450,8 +16450,8 @@
         </p:nvCxnSpPr>
         <p:spPr>
           <a:xfrm rot="5400000" flipH="1" flipV="1">
-            <a:off x="5191216" y="1902924"/>
-            <a:ext cx="1447641" cy="1898311"/>
+            <a:off x="5167969" y="1879677"/>
+            <a:ext cx="1494135" cy="1898311"/>
           </a:xfrm>
           <a:prstGeom prst="bentConnector2">
             <a:avLst/>
@@ -16497,12 +16497,12 @@
         </p:nvCxnSpPr>
         <p:spPr>
           <a:xfrm rot="5400000">
-            <a:off x="5344471" y="2017638"/>
-            <a:ext cx="1905563" cy="3171526"/>
+            <a:off x="5321224" y="1994391"/>
+            <a:ext cx="1952057" cy="3171526"/>
           </a:xfrm>
           <a:prstGeom prst="bentConnector3">
             <a:avLst>
-              <a:gd name="adj1" fmla="val 89988"/>
+              <a:gd name="adj1" fmla="val 50000"/>
             </a:avLst>
           </a:prstGeom>
           <a:ln w="25400">
@@ -16798,66 +16798,6 @@
           </a:fontRef>
         </p:style>
       </p:cxnSp>
-      <p:pic>
-        <p:nvPicPr>
-          <p:cNvPr id="56" name="Picture 40">
-            <a:extLst>
-              <a:ext uri="{FF2B5EF4-FFF2-40B4-BE49-F238E27FC236}">
-                <a16:creationId xmlns:a16="http://schemas.microsoft.com/office/drawing/2014/main" id="{1A1BFCF5-E8F6-6A42-B2B8-BFD66819149B}"/>
-              </a:ext>
-            </a:extLst>
-          </p:cNvPr>
-          <p:cNvPicPr>
-            <a:picLocks noChangeAspect="1"/>
-          </p:cNvPicPr>
-          <p:nvPr/>
-        </p:nvPicPr>
-        <p:blipFill>
-          <a:blip r:embed="rId5">
-            <a:extLst>
-              <a:ext uri="{28A0092B-C50C-407E-A947-70E740481C1C}">
-                <a14:useLocalDpi xmlns:a14="http://schemas.microsoft.com/office/drawing/2010/main" val="0"/>
-              </a:ext>
-            </a:extLst>
-          </a:blip>
-          <a:srcRect/>
-          <a:stretch>
-            <a:fillRect/>
-          </a:stretch>
-        </p:blipFill>
-        <p:spPr bwMode="auto">
-          <a:xfrm>
-            <a:off x="6453135" y="2436124"/>
-            <a:ext cx="904093" cy="335056"/>
-          </a:xfrm>
-          <a:prstGeom prst="rect">
-            <a:avLst/>
-          </a:prstGeom>
-          <a:noFill/>
-          <a:ln>
-            <a:noFill/>
-          </a:ln>
-          <a:extLst>
-            <a:ext uri="{909E8E84-426E-40DD-AFC4-6F175D3DCCD1}">
-              <a14:hiddenFill xmlns:a14="http://schemas.microsoft.com/office/drawing/2010/main">
-                <a:solidFill>
-                  <a:srgbClr val="FFFFFF"/>
-                </a:solidFill>
-              </a14:hiddenFill>
-            </a:ext>
-            <a:ext uri="{91240B29-F687-4F45-9708-019B960494DF}">
-              <a14:hiddenLine xmlns:a14="http://schemas.microsoft.com/office/drawing/2010/main" w="9525">
-                <a:solidFill>
-                  <a:srgbClr val="000000"/>
-                </a:solidFill>
-                <a:miter lim="800000"/>
-                <a:headEnd/>
-                <a:tailEnd/>
-              </a14:hiddenLine>
-            </a:ext>
-          </a:extLst>
-        </p:spPr>
-      </p:pic>
       <p:sp>
         <p:nvSpPr>
           <p:cNvPr id="61" name="Rectangle 60">
@@ -17172,36 +17112,6 @@
           </a:prstGeom>
         </p:spPr>
       </p:pic>
-      <p:pic>
-        <p:nvPicPr>
-          <p:cNvPr id="74" name="Picture 73">
-            <a:extLst>
-              <a:ext uri="{FF2B5EF4-FFF2-40B4-BE49-F238E27FC236}">
-                <a16:creationId xmlns:a16="http://schemas.microsoft.com/office/drawing/2014/main" id="{858EDC7C-8111-2E41-8EF6-139882BC04DE}"/>
-              </a:ext>
-            </a:extLst>
-          </p:cNvPr>
-          <p:cNvPicPr>
-            <a:picLocks noChangeAspect="1"/>
-          </p:cNvPicPr>
-          <p:nvPr/>
-        </p:nvPicPr>
-        <p:blipFill>
-          <a:blip r:embed="rId6"/>
-          <a:stretch>
-            <a:fillRect/>
-          </a:stretch>
-        </p:blipFill>
-        <p:spPr>
-          <a:xfrm>
-            <a:off x="7899573" y="2450782"/>
-            <a:ext cx="806955" cy="323116"/>
-          </a:xfrm>
-          <a:prstGeom prst="rect">
-            <a:avLst/>
-          </a:prstGeom>
-        </p:spPr>
-      </p:pic>
       <p:sp>
         <p:nvSpPr>
           <p:cNvPr id="75" name="Rectangle 74">
@@ -17334,8 +17244,8 @@
         </p:nvCxnSpPr>
         <p:spPr>
           <a:xfrm>
-            <a:off x="8901837" y="2128258"/>
-            <a:ext cx="900529" cy="483317"/>
+            <a:off x="8901837" y="2081764"/>
+            <a:ext cx="900529" cy="529811"/>
           </a:xfrm>
           <a:prstGeom prst="bentConnector3">
             <a:avLst>
@@ -17366,6 +17276,66 @@
           </a:fontRef>
         </p:style>
       </p:cxnSp>
+      <p:pic>
+        <p:nvPicPr>
+          <p:cNvPr id="3" name="Picture 2">
+            <a:extLst>
+              <a:ext uri="{FF2B5EF4-FFF2-40B4-BE49-F238E27FC236}">
+                <a16:creationId xmlns:a16="http://schemas.microsoft.com/office/drawing/2014/main" id="{270EB118-3E44-C24D-8887-9CBCFFE687C4}"/>
+              </a:ext>
+            </a:extLst>
+          </p:cNvPr>
+          <p:cNvPicPr>
+            <a:picLocks noChangeAspect="1"/>
+          </p:cNvPicPr>
+          <p:nvPr/>
+        </p:nvPicPr>
+        <p:blipFill>
+          <a:blip r:embed="rId11"/>
+          <a:stretch>
+            <a:fillRect/>
+          </a:stretch>
+        </p:blipFill>
+        <p:spPr>
+          <a:xfrm>
+            <a:off x="6864406" y="2242374"/>
+            <a:ext cx="367980" cy="367980"/>
+          </a:xfrm>
+          <a:prstGeom prst="rect">
+            <a:avLst/>
+          </a:prstGeom>
+        </p:spPr>
+      </p:pic>
+      <p:pic>
+        <p:nvPicPr>
+          <p:cNvPr id="33" name="Picture 32">
+            <a:extLst>
+              <a:ext uri="{FF2B5EF4-FFF2-40B4-BE49-F238E27FC236}">
+                <a16:creationId xmlns:a16="http://schemas.microsoft.com/office/drawing/2014/main" id="{803C5815-4B56-154E-BCB1-3A85D1559983}"/>
+              </a:ext>
+            </a:extLst>
+          </p:cNvPr>
+          <p:cNvPicPr>
+            <a:picLocks noChangeAspect="1"/>
+          </p:cNvPicPr>
+          <p:nvPr/>
+        </p:nvPicPr>
+        <p:blipFill>
+          <a:blip r:embed="rId12"/>
+          <a:stretch>
+            <a:fillRect/>
+          </a:stretch>
+        </p:blipFill>
+        <p:spPr>
+          <a:xfrm>
+            <a:off x="9708854" y="2898063"/>
+            <a:ext cx="719033" cy="772295"/>
+          </a:xfrm>
+          <a:prstGeom prst="rect">
+            <a:avLst/>
+          </a:prstGeom>
+        </p:spPr>
+      </p:pic>
     </p:spTree>
     <p:extLst>
       <p:ext uri="{BB962C8B-B14F-4D97-AF65-F5344CB8AC3E}">

</xml_diff>